<commit_message>
Added PDF version. Fixed title
git-svn-id: file://localhost/tmp/svn2git/svn@2987 defb5e50-622e-49ec-a68e-d72c7db87b45
</commit_message>
<xml_diff>
--- a/tutorial/general_tutorial/Installation.pptx
+++ b/tutorial/general_tutorial/Installation.pptx
@@ -203,7 +203,7 @@
             <a:fld id="{9A6AC4B2-6F12-454D-8DA7-7B9C78843B81}" type="datetimeFigureOut">
               <a:rPr lang="en-US" smtClean="0"/>
               <a:pPr/>
-              <a:t>9/17/10</a:t>
+              <a:t>9/20/10</a:t>
             </a:fld>
             <a:endParaRPr lang="en-US"/>
           </a:p>
@@ -366,7 +366,7 @@
             <a:fld id="{19F24AD4-A78B-B645-8B43-825B1EB2901C}" type="datetimeFigureOut">
               <a:rPr lang="en-US" smtClean="0"/>
               <a:pPr/>
-              <a:t>9/17/10</a:t>
+              <a:t>9/20/10</a:t>
             </a:fld>
             <a:endParaRPr lang="en-US"/>
           </a:p>
@@ -902,7 +902,7 @@
             <a:fld id="{ADB8239A-D789-5443-937F-338E3AE3D41C}" type="datetime1">
               <a:rPr lang="en-US" smtClean="0"/>
               <a:pPr/>
-              <a:t>9/17/10</a:t>
+              <a:t>9/20/10</a:t>
             </a:fld>
             <a:endParaRPr lang="en-US"/>
           </a:p>
@@ -1206,7 +1206,7 @@
             <a:fld id="{459EC1CE-E98D-704D-AD6F-6E3323A36483}" type="datetime1">
               <a:rPr lang="en-US" smtClean="0"/>
               <a:pPr/>
-              <a:t>9/17/10</a:t>
+              <a:t>9/20/10</a:t>
             </a:fld>
             <a:endParaRPr lang="en-US"/>
           </a:p>
@@ -1482,7 +1482,7 @@
             <a:fld id="{23E692A5-8B3E-1949-B0CC-6F0593ACFA8E}" type="datetime1">
               <a:rPr lang="en-US" smtClean="0"/>
               <a:pPr/>
-              <a:t>9/17/10</a:t>
+              <a:t>9/20/10</a:t>
             </a:fld>
             <a:endParaRPr lang="en-US"/>
           </a:p>
@@ -1774,7 +1774,7 @@
             <a:fld id="{C381DA14-A3C0-9C42-96F2-BEE3D5DE963D}" type="datetime1">
               <a:rPr lang="en-US" smtClean="0"/>
               <a:pPr/>
-              <a:t>9/17/10</a:t>
+              <a:t>9/20/10</a:t>
             </a:fld>
             <a:endParaRPr lang="en-US"/>
           </a:p>
@@ -2101,7 +2101,7 @@
             <a:fld id="{33319320-9A5F-694B-B7B5-C734EC93AAA2}" type="datetime1">
               <a:rPr lang="en-US" smtClean="0"/>
               <a:pPr/>
-              <a:t>9/17/10</a:t>
+              <a:t>9/20/10</a:t>
             </a:fld>
             <a:endParaRPr lang="en-US"/>
           </a:p>
@@ -2349,7 +2349,7 @@
             <a:fld id="{CF6CE397-A6E6-7547-B24A-92BB5049E0F2}" type="datetime1">
               <a:rPr lang="en-US" smtClean="0"/>
               <a:pPr/>
-              <a:t>9/17/10</a:t>
+              <a:t>9/20/10</a:t>
             </a:fld>
             <a:endParaRPr lang="en-US"/>
           </a:p>
@@ -2526,7 +2526,7 @@
             <a:fld id="{27AB7D46-BD5E-E641-9118-DCE28F3B83FA}" type="datetime1">
               <a:rPr lang="en-US" smtClean="0"/>
               <a:pPr/>
-              <a:t>9/17/10</a:t>
+              <a:t>9/20/10</a:t>
             </a:fld>
             <a:endParaRPr lang="en-US"/>
           </a:p>
@@ -2778,7 +2778,7 @@
             <a:fld id="{BC26097E-015C-3B4D-86C1-CD2AD30F0B81}" type="datetime1">
               <a:rPr lang="en-US" smtClean="0"/>
               <a:pPr/>
-              <a:t>9/17/10</a:t>
+              <a:t>9/20/10</a:t>
             </a:fld>
             <a:endParaRPr lang="en-US"/>
           </a:p>
@@ -3054,7 +3054,7 @@
             <a:fld id="{ED6649F4-2545-3040-B7BD-803CA59D50C7}" type="datetime1">
               <a:rPr lang="en-US" smtClean="0"/>
               <a:pPr/>
-              <a:t>9/17/10</a:t>
+              <a:t>9/20/10</a:t>
             </a:fld>
             <a:endParaRPr lang="en-US"/>
           </a:p>
@@ -3362,7 +3362,7 @@
             <a:fld id="{833A9088-CEDD-2F48-A9A0-611A3CC03FE9}" type="datetime1">
               <a:rPr lang="en-US" smtClean="0"/>
               <a:pPr/>
-              <a:t>9/17/10</a:t>
+              <a:t>9/20/10</a:t>
             </a:fld>
             <a:endParaRPr lang="en-US"/>
           </a:p>
@@ -3656,7 +3656,7 @@
             <a:fld id="{AED87ACF-EB3C-EA42-8610-542FB50388EB}" type="datetime1">
               <a:rPr lang="en-US" smtClean="0"/>
               <a:pPr/>
-              <a:t>9/17/10</a:t>
+              <a:t>9/20/10</a:t>
             </a:fld>
             <a:endParaRPr lang="en-US"/>
           </a:p>
@@ -4088,7 +4088,7 @@
             <a:fld id="{0E0DC31B-692F-774E-A937-DA560DE61DA8}" type="datetime1">
               <a:rPr lang="en-US" smtClean="0"/>
               <a:pPr/>
-              <a:t>9/17/10</a:t>
+              <a:t>9/20/10</a:t>
             </a:fld>
             <a:endParaRPr lang="en-US"/>
           </a:p>
@@ -4436,7 +4436,7 @@
             <a:fld id="{95DEFDAE-5BDC-1B4F-BC4C-23C867CEBC21}" type="datetime1">
               <a:rPr lang="en-US" smtClean="0"/>
               <a:pPr/>
-              <a:t>9/17/10</a:t>
+              <a:t>9/20/10</a:t>
             </a:fld>
             <a:endParaRPr lang="en-US"/>
           </a:p>
@@ -4528,7 +4528,7 @@
             <a:fld id="{9F53C516-787B-9A45-AFCF-5D75DD78DEBE}" type="datetime1">
               <a:rPr lang="en-US" smtClean="0"/>
               <a:pPr/>
-              <a:t>9/17/10</a:t>
+              <a:t>9/20/10</a:t>
             </a:fld>
             <a:endParaRPr lang="en-US"/>
           </a:p>
@@ -4867,7 +4867,7 @@
             <a:fld id="{F19CAA94-9393-BB4A-8CB6-008B1351A132}" type="datetime1">
               <a:rPr lang="en-US" smtClean="0"/>
               <a:pPr/>
-              <a:t>9/17/10</a:t>
+              <a:t>9/20/10</a:t>
             </a:fld>
             <a:endParaRPr lang="en-US"/>
           </a:p>
@@ -5081,7 +5081,7 @@
             <a:fld id="{A3476A5E-2ED6-7749-A8C1-D0B1EEEB97E0}" type="datetime1">
               <a:rPr lang="en-US" smtClean="0"/>
               <a:pPr/>
-              <a:t>9/17/10</a:t>
+              <a:t>9/20/10</a:t>
             </a:fld>
             <a:endParaRPr lang="en-US"/>
           </a:p>
@@ -5634,6 +5634,10 @@
           <a:bodyPr tIns="274320"/>
           <a:lstStyle/>
           <a:p>
+            <a:r>
+              <a:rPr lang="en-US" dirty="0" smtClean="0"/>
+              <a:t>Installation and Configuration</a:t>
+            </a:r>
             <a:endParaRPr lang="en-US" dirty="0"/>
           </a:p>
         </p:txBody>
@@ -7055,14 +7059,7 @@
                 <a:latin typeface="Andale Mono"/>
                 <a:cs typeface="Andale Mono"/>
               </a:rPr>
-              <a:t>export </a:t>
-            </a:r>
-            <a:r>
-              <a:rPr lang="en-US" sz="1200" dirty="0" smtClean="0">
-                <a:latin typeface="Andale Mono"/>
-                <a:cs typeface="Andale Mono"/>
-              </a:rPr>
-              <a:t>SAGA_LOCATION=/install/location/dir/</a:t>
+              <a:t>export SAGA_LOCATION=/install/location/dir/</a:t>
             </a:r>
           </a:p>
         </p:txBody>
@@ -7143,31 +7140,7 @@
                 <a:latin typeface="Andale Mono"/>
                 <a:cs typeface="Andale Mono"/>
               </a:rPr>
-              <a:t>export</a:t>
-            </a:r>
-            <a:r>
-              <a:rPr lang="en-US" sz="1200" dirty="0" smtClean="0">
-                <a:solidFill>
-                  <a:schemeClr val="bg1">
-                    <a:lumMod val="50000"/>
-                  </a:schemeClr>
-                </a:solidFill>
-                <a:latin typeface="Andale Mono"/>
-                <a:cs typeface="Andale Mono"/>
-              </a:rPr>
-              <a:t> DYLD_LIBRARY_PATH</a:t>
-            </a:r>
-            <a:r>
-              <a:rPr lang="en-US" sz="1200" dirty="0" smtClean="0">
-                <a:solidFill>
-                  <a:schemeClr val="bg1">
-                    <a:lumMod val="50000"/>
-                  </a:schemeClr>
-                </a:solidFill>
-                <a:latin typeface="Andale Mono"/>
-                <a:cs typeface="Andale Mono"/>
-              </a:rPr>
-              <a:t>=${SAGA_LOCATION}/</a:t>
+              <a:t>export DYLD_LIBRARY_PATH=${SAGA_LOCATION}/</a:t>
             </a:r>
             <a:r>
               <a:rPr lang="en-US" sz="1200" dirty="0" err="1" smtClean="0">
@@ -7179,19 +7152,7 @@
                 <a:latin typeface="Andale Mono"/>
                 <a:cs typeface="Andale Mono"/>
               </a:rPr>
-              <a:t>lib:</a:t>
-            </a:r>
-            <a:r>
-              <a:rPr lang="en-US" sz="1200" dirty="0" err="1" smtClean="0">
-                <a:solidFill>
-                  <a:schemeClr val="bg1">
-                    <a:lumMod val="50000"/>
-                  </a:schemeClr>
-                </a:solidFill>
-                <a:latin typeface="Andale Mono"/>
-                <a:cs typeface="Andale Mono"/>
-              </a:rPr>
-              <a:t>$DYLD_LIBRARY_PATH</a:t>
+              <a:t>lib:$DYLD_LIBRARY_PATH</a:t>
             </a:r>
             <a:r>
               <a:rPr lang="en-US" sz="1200" dirty="0" smtClean="0">
@@ -7242,14 +7203,7 @@
                 <a:latin typeface="Andale Mono"/>
                 <a:cs typeface="Andale Mono"/>
               </a:rPr>
-              <a:t>export PYTHONPATH=${SAGA_LOCATION</a:t>
-            </a:r>
-            <a:r>
-              <a:rPr lang="en-US" sz="1200" dirty="0" smtClean="0">
-                <a:latin typeface="Andale Mono"/>
-                <a:cs typeface="Andale Mono"/>
-              </a:rPr>
-              <a:t>/lib/</a:t>
+              <a:t>export PYTHONPATH=${SAGA_LOCATION/lib/</a:t>
             </a:r>
             <a:r>
               <a:rPr lang="en-US" sz="1200" dirty="0" err="1" smtClean="0">
@@ -7263,21 +7217,7 @@
                 <a:latin typeface="Andale Mono"/>
                 <a:cs typeface="Andale Mono"/>
               </a:rPr>
-              <a:t>/</a:t>
-            </a:r>
-            <a:r>
-              <a:rPr lang="en-US" sz="1200" dirty="0" smtClean="0">
-                <a:latin typeface="Andale Mono"/>
-                <a:cs typeface="Andale Mono"/>
-              </a:rPr>
-              <a:t>site-packages</a:t>
-            </a:r>
-            <a:r>
-              <a:rPr lang="en-US" sz="1200" dirty="0" smtClean="0">
-                <a:latin typeface="Andale Mono"/>
-                <a:cs typeface="Andale Mono"/>
-              </a:rPr>
-              <a:t>/:${PYTHONPATH}</a:t>
+              <a:t>/site-packages/:${PYTHONPATH}</a:t>
             </a:r>
             <a:endParaRPr lang="en-US" sz="1200" dirty="0" smtClean="0">
               <a:solidFill>
@@ -7368,7 +7308,6 @@
               <a:rPr lang="en-US" dirty="0" smtClean="0"/>
               <a:t>Import the SAGA module into Python</a:t>
             </a:r>
-            <a:endParaRPr lang="en-US" dirty="0" smtClean="0"/>
           </a:p>
         </p:txBody>
       </p:sp>
@@ -7505,13 +7444,6 @@
               </a:rPr>
               <a:t>&lt;module 'saga' from '/opt/saga-svn/lib/python2.6.1/site-packages/saga/__init__.pyc'&gt;</a:t>
             </a:r>
-            <a:endParaRPr lang="en-US" sz="1200" dirty="0" smtClean="0">
-              <a:solidFill>
-                <a:srgbClr val="7F7F7F"/>
-              </a:solidFill>
-              <a:latin typeface="Andale Mono"/>
-              <a:cs typeface="Andale Mono"/>
-            </a:endParaRPr>
           </a:p>
         </p:txBody>
       </p:sp>
@@ -7563,35 +7495,14 @@
                 <a:latin typeface="Andale Mono"/>
                 <a:cs typeface="Andale Mono"/>
               </a:rPr>
-              <a:t>$ </a:t>
-            </a:r>
-            <a:r>
-              <a:rPr lang="en-US" sz="1200" dirty="0" smtClean="0">
-                <a:latin typeface="Andale Mono"/>
-                <a:cs typeface="Andale Mono"/>
-              </a:rPr>
-              <a:t>SAGA_LOCATION/bin</a:t>
-            </a:r>
-            <a:r>
-              <a:rPr lang="en-US" sz="1200" dirty="0" smtClean="0">
-                <a:latin typeface="Andale Mono"/>
-                <a:cs typeface="Andale Mono"/>
-              </a:rPr>
-              <a:t>/saga-file cat file://</a:t>
+              <a:t>$ SAGA_LOCATION/bin/saga-file cat file://</a:t>
             </a:r>
             <a:r>
               <a:rPr lang="en-US" sz="1200" dirty="0" err="1" smtClean="0">
                 <a:latin typeface="Andale Mono"/>
                 <a:cs typeface="Andale Mono"/>
               </a:rPr>
-              <a:t>localhost/etc/</a:t>
-            </a:r>
-            <a:r>
-              <a:rPr lang="en-US" sz="1200" dirty="0" err="1" smtClean="0">
-                <a:latin typeface="Andale Mono"/>
-                <a:cs typeface="Andale Mono"/>
-              </a:rPr>
-              <a:t>passwd</a:t>
+              <a:t>localhost/etc/passwd</a:t>
             </a:r>
             <a:endParaRPr lang="en-US" sz="1200" dirty="0" smtClean="0">
               <a:latin typeface="Andale Mono"/>

</xml_diff>

<commit_message>
Fixing a minor bug in slide 10
  Ole: Added a slide for Mephisto. feel free to delete. 
  


git-svn-id: file://localhost/tmp/svn2git/svn@3198 defb5e50-622e-49ec-a68e-d72c7db87b45
</commit_message>
<xml_diff>
--- a/tutorial/general_tutorial/Installation.pptx
+++ b/tutorial/general_tutorial/Installation.pptx
@@ -5,10 +5,10 @@
     <p:sldMasterId id="2147483660" r:id="rId1"/>
   </p:sldMasterIdLst>
   <p:notesMasterIdLst>
-    <p:notesMasterId r:id="rId13"/>
+    <p:notesMasterId r:id="rId14"/>
   </p:notesMasterIdLst>
   <p:handoutMasterIdLst>
-    <p:handoutMasterId r:id="rId14"/>
+    <p:handoutMasterId r:id="rId15"/>
   </p:handoutMasterIdLst>
   <p:sldIdLst>
     <p:sldId id="256" r:id="rId2"/>
@@ -22,6 +22,7 @@
     <p:sldId id="267" r:id="rId10"/>
     <p:sldId id="264" r:id="rId11"/>
     <p:sldId id="265" r:id="rId12"/>
+    <p:sldId id="269" r:id="rId13"/>
   </p:sldIdLst>
   <p:sldSz cx="9144000" cy="6858000" type="screen4x3"/>
   <p:notesSz cx="6858000" cy="9144000"/>
@@ -206,7 +207,7 @@
             <a:fld id="{9A6AC4B2-6F12-454D-8DA7-7B9C78843B81}" type="datetimeFigureOut">
               <a:rPr lang="en-US" smtClean="0"/>
               <a:pPr/>
-              <a:t>10/20/10</a:t>
+              <a:t>11/15/10</a:t>
             </a:fld>
             <a:endParaRPr lang="en-US"/>
           </a:p>
@@ -282,7 +283,7 @@
     </p:spTree>
     <p:extLst>
       <p:ext uri="{BB962C8B-B14F-4D97-AF65-F5344CB8AC3E}">
-        <p14:creationId xmlns:p14="http://schemas.microsoft.com/office/powerpoint/2010/main" xmlns:p="http://schemas.openxmlformats.org/presentationml/2006/main" xmlns:r="http://schemas.openxmlformats.org/officeDocument/2006/relationships" xmlns:a="http://schemas.openxmlformats.org/drawingml/2006/main" xmlns="" val="4188242058"/>
+        <p14:creationId xmlns="" xmlns:a="http://schemas.openxmlformats.org/drawingml/2006/main" xmlns:r="http://schemas.openxmlformats.org/officeDocument/2006/relationships" xmlns:p="http://schemas.openxmlformats.org/presentationml/2006/main" xmlns:p14="http://schemas.microsoft.com/office/powerpoint/2010/main" xmlns:mv="urn:schemas-microsoft-com:mac:vml" xmlns:mc="http://schemas.openxmlformats.org/markup-compatibility/2006" val="4188242058"/>
       </p:ext>
     </p:extLst>
   </p:cSld>
@@ -374,7 +375,7 @@
             <a:fld id="{19F24AD4-A78B-B645-8B43-825B1EB2901C}" type="datetimeFigureOut">
               <a:rPr lang="en-US" smtClean="0"/>
               <a:pPr/>
-              <a:t>10/20/10</a:t>
+              <a:t>11/15/10</a:t>
             </a:fld>
             <a:endParaRPr lang="en-US"/>
           </a:p>
@@ -545,7 +546,7 @@
     </p:spTree>
     <p:extLst>
       <p:ext uri="{BB962C8B-B14F-4D97-AF65-F5344CB8AC3E}">
-        <p14:creationId xmlns:p14="http://schemas.microsoft.com/office/powerpoint/2010/main" xmlns:p="http://schemas.openxmlformats.org/presentationml/2006/main" xmlns:r="http://schemas.openxmlformats.org/officeDocument/2006/relationships" xmlns:a="http://schemas.openxmlformats.org/drawingml/2006/main" xmlns="" val="2951771260"/>
+        <p14:creationId xmlns="" xmlns:a="http://schemas.openxmlformats.org/drawingml/2006/main" xmlns:r="http://schemas.openxmlformats.org/officeDocument/2006/relationships" xmlns:p="http://schemas.openxmlformats.org/presentationml/2006/main" xmlns:p14="http://schemas.microsoft.com/office/powerpoint/2010/main" xmlns:mv="urn:schemas-microsoft-com:mac:vml" xmlns:mc="http://schemas.openxmlformats.org/markup-compatibility/2006" val="2951771260"/>
       </p:ext>
     </p:extLst>
   </p:cSld>
@@ -915,7 +916,7 @@
             <a:fld id="{ADB8239A-D789-5443-937F-338E3AE3D41C}" type="datetime1">
               <a:rPr lang="en-US" smtClean="0"/>
               <a:pPr/>
-              <a:t>10/20/10</a:t>
+              <a:t>11/15/10</a:t>
             </a:fld>
             <a:endParaRPr lang="en-US"/>
           </a:p>
@@ -1219,7 +1220,7 @@
             <a:fld id="{459EC1CE-E98D-704D-AD6F-6E3323A36483}" type="datetime1">
               <a:rPr lang="en-US" smtClean="0"/>
               <a:pPr/>
-              <a:t>10/20/10</a:t>
+              <a:t>11/15/10</a:t>
             </a:fld>
             <a:endParaRPr lang="en-US"/>
           </a:p>
@@ -1495,7 +1496,7 @@
             <a:fld id="{23E692A5-8B3E-1949-B0CC-6F0593ACFA8E}" type="datetime1">
               <a:rPr lang="en-US" smtClean="0"/>
               <a:pPr/>
-              <a:t>10/20/10</a:t>
+              <a:t>11/15/10</a:t>
             </a:fld>
             <a:endParaRPr lang="en-US"/>
           </a:p>
@@ -1787,7 +1788,7 @@
             <a:fld id="{C381DA14-A3C0-9C42-96F2-BEE3D5DE963D}" type="datetime1">
               <a:rPr lang="en-US" smtClean="0"/>
               <a:pPr/>
-              <a:t>10/20/10</a:t>
+              <a:t>11/15/10</a:t>
             </a:fld>
             <a:endParaRPr lang="en-US"/>
           </a:p>
@@ -2114,7 +2115,7 @@
             <a:fld id="{33319320-9A5F-694B-B7B5-C734EC93AAA2}" type="datetime1">
               <a:rPr lang="en-US" smtClean="0"/>
               <a:pPr/>
-              <a:t>10/20/10</a:t>
+              <a:t>11/15/10</a:t>
             </a:fld>
             <a:endParaRPr lang="en-US"/>
           </a:p>
@@ -2362,7 +2363,7 @@
             <a:fld id="{CF6CE397-A6E6-7547-B24A-92BB5049E0F2}" type="datetime1">
               <a:rPr lang="en-US" smtClean="0"/>
               <a:pPr/>
-              <a:t>10/20/10</a:t>
+              <a:t>11/15/10</a:t>
             </a:fld>
             <a:endParaRPr lang="en-US"/>
           </a:p>
@@ -2539,7 +2540,7 @@
             <a:fld id="{27AB7D46-BD5E-E641-9118-DCE28F3B83FA}" type="datetime1">
               <a:rPr lang="en-US" smtClean="0"/>
               <a:pPr/>
-              <a:t>10/20/10</a:t>
+              <a:t>11/15/10</a:t>
             </a:fld>
             <a:endParaRPr lang="en-US"/>
           </a:p>
@@ -2791,7 +2792,7 @@
             <a:fld id="{BC26097E-015C-3B4D-86C1-CD2AD30F0B81}" type="datetime1">
               <a:rPr lang="en-US" smtClean="0"/>
               <a:pPr/>
-              <a:t>10/20/10</a:t>
+              <a:t>11/15/10</a:t>
             </a:fld>
             <a:endParaRPr lang="en-US"/>
           </a:p>
@@ -3067,7 +3068,7 @@
             <a:fld id="{ED6649F4-2545-3040-B7BD-803CA59D50C7}" type="datetime1">
               <a:rPr lang="en-US" smtClean="0"/>
               <a:pPr/>
-              <a:t>10/20/10</a:t>
+              <a:t>11/15/10</a:t>
             </a:fld>
             <a:endParaRPr lang="en-US"/>
           </a:p>
@@ -3375,7 +3376,7 @@
             <a:fld id="{833A9088-CEDD-2F48-A9A0-611A3CC03FE9}" type="datetime1">
               <a:rPr lang="en-US" smtClean="0"/>
               <a:pPr/>
-              <a:t>10/20/10</a:t>
+              <a:t>11/15/10</a:t>
             </a:fld>
             <a:endParaRPr lang="en-US"/>
           </a:p>
@@ -3669,7 +3670,7 @@
             <a:fld id="{AED87ACF-EB3C-EA42-8610-542FB50388EB}" type="datetime1">
               <a:rPr lang="en-US" smtClean="0"/>
               <a:pPr/>
-              <a:t>10/20/10</a:t>
+              <a:t>11/15/10</a:t>
             </a:fld>
             <a:endParaRPr lang="en-US"/>
           </a:p>
@@ -4101,7 +4102,7 @@
             <a:fld id="{0E0DC31B-692F-774E-A937-DA560DE61DA8}" type="datetime1">
               <a:rPr lang="en-US" smtClean="0"/>
               <a:pPr/>
-              <a:t>10/20/10</a:t>
+              <a:t>11/15/10</a:t>
             </a:fld>
             <a:endParaRPr lang="en-US"/>
           </a:p>
@@ -4449,7 +4450,7 @@
             <a:fld id="{95DEFDAE-5BDC-1B4F-BC4C-23C867CEBC21}" type="datetime1">
               <a:rPr lang="en-US" smtClean="0"/>
               <a:pPr/>
-              <a:t>10/20/10</a:t>
+              <a:t>11/15/10</a:t>
             </a:fld>
             <a:endParaRPr lang="en-US"/>
           </a:p>
@@ -4541,7 +4542,7 @@
             <a:fld id="{9F53C516-787B-9A45-AFCF-5D75DD78DEBE}" type="datetime1">
               <a:rPr lang="en-US" smtClean="0"/>
               <a:pPr/>
-              <a:t>10/20/10</a:t>
+              <a:t>11/15/10</a:t>
             </a:fld>
             <a:endParaRPr lang="en-US"/>
           </a:p>
@@ -4880,7 +4881,7 @@
             <a:fld id="{F19CAA94-9393-BB4A-8CB6-008B1351A132}" type="datetime1">
               <a:rPr lang="en-US" smtClean="0"/>
               <a:pPr/>
-              <a:t>10/20/10</a:t>
+              <a:t>11/15/10</a:t>
             </a:fld>
             <a:endParaRPr lang="en-US"/>
           </a:p>
@@ -5094,7 +5095,7 @@
             <a:fld id="{A3476A5E-2ED6-7749-A8C1-D0B1EEEB97E0}" type="datetime1">
               <a:rPr lang="en-US" smtClean="0"/>
               <a:pPr/>
-              <a:t>10/20/10</a:t>
+              <a:t>11/15/10</a:t>
             </a:fld>
             <a:endParaRPr lang="en-US"/>
           </a:p>
@@ -6060,7 +6061,21 @@
                 <a:latin typeface="Andale Mono"/>
                 <a:cs typeface="Andale Mono"/>
               </a:rPr>
-              <a:t>export PYTHONPATH=${SAGA_LOCATION/lib/</a:t>
+              <a:t>export PYTHONPATH=${</a:t>
+            </a:r>
+            <a:r>
+              <a:rPr lang="en-US" sz="1200" dirty="0" smtClean="0">
+                <a:latin typeface="Andale Mono"/>
+                <a:cs typeface="Andale Mono"/>
+              </a:rPr>
+              <a:t>SAGA_LOCATION}/</a:t>
+            </a:r>
+            <a:r>
+              <a:rPr lang="en-US" sz="1200" dirty="0" smtClean="0">
+                <a:latin typeface="Andale Mono"/>
+                <a:cs typeface="Andale Mono"/>
+              </a:rPr>
+              <a:t>lib/</a:t>
             </a:r>
             <a:r>
               <a:rPr lang="en-US" sz="1200" dirty="0" err="1" smtClean="0">
@@ -6412,6 +6427,184 @@
 </p:sld>
 </file>
 
+<file path=ppt/slides/slide12.xml><?xml version="1.0" encoding="utf-8"?>
+<p:sld xmlns:a="http://schemas.openxmlformats.org/drawingml/2006/main" xmlns:r="http://schemas.openxmlformats.org/officeDocument/2006/relationships" xmlns:mc="http://schemas.openxmlformats.org/markup-compatibility/2006" xmlns:mv="urn:schemas-microsoft-com:mac:vml" xmlns:p="http://schemas.openxmlformats.org/presentationml/2006/main" mc:Ignorable="mv" mc:PreserveAttributes="mv:*">
+  <p:cSld>
+    <p:spTree>
+      <p:nvGrpSpPr>
+        <p:cNvPr id="1" name=""/>
+        <p:cNvGrpSpPr/>
+        <p:nvPr/>
+      </p:nvGrpSpPr>
+      <p:grpSpPr>
+        <a:xfrm>
+          <a:off x="0" y="0"/>
+          <a:ext cx="0" cy="0"/>
+          <a:chOff x="0" y="0"/>
+          <a:chExt cx="0" cy="0"/>
+        </a:xfrm>
+      </p:grpSpPr>
+      <p:sp>
+        <p:nvSpPr>
+          <p:cNvPr id="2" name="Title 1"/>
+          <p:cNvSpPr>
+            <a:spLocks noGrp="1"/>
+          </p:cNvSpPr>
+          <p:nvPr>
+            <p:ph type="title"/>
+          </p:nvPr>
+        </p:nvSpPr>
+        <p:spPr/>
+        <p:txBody>
+          <a:bodyPr>
+            <a:normAutofit/>
+          </a:bodyPr>
+          <a:lstStyle/>
+          <a:p>
+            <a:r>
+              <a:rPr lang="en-US" dirty="0" err="1" smtClean="0"/>
+              <a:t>Mepisto</a:t>
+            </a:r>
+            <a:endParaRPr lang="en-US" dirty="0"/>
+          </a:p>
+        </p:txBody>
+      </p:sp>
+      <p:sp>
+        <p:nvSpPr>
+          <p:cNvPr id="3" name="Content Placeholder 2"/>
+          <p:cNvSpPr>
+            <a:spLocks noGrp="1"/>
+          </p:cNvSpPr>
+          <p:nvPr>
+            <p:ph idx="1"/>
+          </p:nvPr>
+        </p:nvSpPr>
+        <p:spPr/>
+        <p:txBody>
+          <a:bodyPr/>
+          <a:lstStyle/>
+          <a:p>
+            <a:r>
+              <a:rPr lang="en-US" dirty="0" smtClean="0"/>
+              <a:t>To simplify installation we have </a:t>
+            </a:r>
+            <a:r>
+              <a:rPr lang="en-US" dirty="0" err="1" smtClean="0"/>
+              <a:t>Mephisto</a:t>
+            </a:r>
+            <a:r>
+              <a:rPr lang="en-US" dirty="0" smtClean="0"/>
+              <a:t>:</a:t>
+            </a:r>
+          </a:p>
+          <a:p>
+            <a:pPr lvl="1"/>
+            <a:r>
+              <a:rPr lang="en-US" dirty="0" smtClean="0">
+                <a:hlinkClick r:id="rId2"/>
+              </a:rPr>
+              <a:t>http://faust.cct.lsu.edu/trac/mephisto</a:t>
+            </a:r>
+            <a:endParaRPr lang="en-US" dirty="0" smtClean="0"/>
+          </a:p>
+          <a:p>
+            <a:r>
+              <a:rPr lang="en-US" dirty="0" smtClean="0"/>
+              <a:t>But read warning at (bottom of):</a:t>
+            </a:r>
+          </a:p>
+          <a:p>
+            <a:pPr lvl="1"/>
+            <a:r>
+              <a:rPr lang="en-US" dirty="0" smtClean="0"/>
+              <a:t> </a:t>
+            </a:r>
+            <a:r>
+              <a:rPr lang="en-US" dirty="0" smtClean="0">
+                <a:hlinkClick r:id="rId3"/>
+              </a:rPr>
+              <a:t>http://saga.cct.lsu.edu/software/cpp/download</a:t>
+            </a:r>
+            <a:endParaRPr lang="en-US" dirty="0" smtClean="0"/>
+          </a:p>
+          <a:p>
+            <a:r>
+              <a:rPr lang="en-US" dirty="0" err="1" smtClean="0"/>
+              <a:t>svn</a:t>
+            </a:r>
+            <a:r>
+              <a:rPr lang="en-US" dirty="0" smtClean="0"/>
+              <a:t> co </a:t>
+            </a:r>
+            <a:r>
+              <a:rPr lang="en-US" dirty="0" smtClean="0">
+                <a:hlinkClick r:id="rId4"/>
+              </a:rPr>
+              <a:t>https://svn.cct.lsu.edu/repos/saga-projects/applications/mephisto/</a:t>
+            </a:r>
+            <a:endParaRPr lang="en-US" dirty="0" smtClean="0"/>
+          </a:p>
+          <a:p>
+            <a:pPr lvl="1"/>
+            <a:r>
+              <a:rPr lang="en-US" dirty="0" err="1" smtClean="0"/>
+              <a:t>cd</a:t>
+            </a:r>
+            <a:r>
+              <a:rPr lang="en-US" dirty="0" smtClean="0"/>
+              <a:t> trunk</a:t>
+            </a:r>
+          </a:p>
+          <a:p>
+            <a:pPr lvl="1"/>
+            <a:r>
+              <a:rPr lang="en-US" dirty="0" smtClean="0"/>
+              <a:t>Perl </a:t>
+            </a:r>
+            <a:r>
+              <a:rPr lang="en-US" dirty="0" err="1" smtClean="0"/>
+              <a:t>mephisto.pl</a:t>
+            </a:r>
+            <a:r>
+              <a:rPr lang="en-US" dirty="0" smtClean="0"/>
+              <a:t> install –target-dir=/</a:t>
+            </a:r>
+            <a:r>
+              <a:rPr lang="en-US" dirty="0" err="1" smtClean="0"/>
+              <a:t>usr</a:t>
+            </a:r>
+            <a:r>
+              <a:rPr lang="en-US" dirty="0" smtClean="0"/>
+              <a:t>/local</a:t>
+            </a:r>
+          </a:p>
+          <a:p>
+            <a:pPr lvl="2"/>
+            <a:r>
+              <a:rPr lang="en-US" dirty="0" smtClean="0"/>
+              <a:t>On FG might use $HOME/saga [just a suggestion]</a:t>
+            </a:r>
+          </a:p>
+          <a:p>
+            <a:pPr lvl="1"/>
+            <a:endParaRPr lang="en-US" dirty="0" smtClean="0"/>
+          </a:p>
+          <a:p>
+            <a:endParaRPr lang="en-US" dirty="0" smtClean="0"/>
+          </a:p>
+          <a:p>
+            <a:endParaRPr lang="en-US" dirty="0"/>
+          </a:p>
+        </p:txBody>
+      </p:sp>
+    </p:spTree>
+  </p:cSld>
+  <p:clrMapOvr>
+    <a:masterClrMapping/>
+  </p:clrMapOvr>
+</p:sld>
+</file>
+
 <file path=ppt/slides/slide2.xml><?xml version="1.0" encoding="utf-8"?>
 <p:sld xmlns:a="http://schemas.openxmlformats.org/drawingml/2006/main" xmlns:r="http://schemas.openxmlformats.org/officeDocument/2006/relationships" xmlns:mc="http://schemas.openxmlformats.org/markup-compatibility/2006" xmlns:mv="urn:schemas-microsoft-com:mac:vml" xmlns:p="http://schemas.openxmlformats.org/presentationml/2006/main" mc:Ignorable="mv" mc:PreserveAttributes="mv:*">
   <p:cSld>
@@ -6639,7 +6832,6 @@
               <a:rPr lang="en-US" dirty="0" smtClean="0"/>
               <a:t>TODO</a:t>
             </a:r>
-            <a:endParaRPr lang="en-US" dirty="0" smtClean="0"/>
           </a:p>
         </p:txBody>
       </p:sp>
@@ -7919,7 +8111,7 @@
     </p:spTree>
     <p:extLst>
       <p:ext uri="{BB962C8B-B14F-4D97-AF65-F5344CB8AC3E}">
-        <p14:creationId xmlns:p14="http://schemas.microsoft.com/office/powerpoint/2010/main" xmlns:p="http://schemas.openxmlformats.org/presentationml/2006/main" xmlns:r="http://schemas.openxmlformats.org/officeDocument/2006/relationships" xmlns:a="http://schemas.openxmlformats.org/drawingml/2006/main" xmlns="" val="3402884851"/>
+        <p14:creationId xmlns="" xmlns:a="http://schemas.openxmlformats.org/drawingml/2006/main" xmlns:r="http://schemas.openxmlformats.org/officeDocument/2006/relationships" xmlns:p="http://schemas.openxmlformats.org/presentationml/2006/main" xmlns:p14="http://schemas.microsoft.com/office/powerpoint/2010/main" xmlns:mv="urn:schemas-microsoft-com:mac:vml" xmlns:mc="http://schemas.openxmlformats.org/markup-compatibility/2006" val="3402884851"/>
       </p:ext>
     </p:extLst>
   </p:cSld>
@@ -8056,7 +8248,7 @@
     </p:spTree>
     <p:extLst>
       <p:ext uri="{BB962C8B-B14F-4D97-AF65-F5344CB8AC3E}">
-        <p14:creationId xmlns:p14="http://schemas.microsoft.com/office/powerpoint/2010/main" xmlns:p="http://schemas.openxmlformats.org/presentationml/2006/main" xmlns:r="http://schemas.openxmlformats.org/officeDocument/2006/relationships" xmlns:a="http://schemas.openxmlformats.org/drawingml/2006/main" xmlns="" val="1068611830"/>
+        <p14:creationId xmlns="" xmlns:a="http://schemas.openxmlformats.org/drawingml/2006/main" xmlns:r="http://schemas.openxmlformats.org/officeDocument/2006/relationships" xmlns:p="http://schemas.openxmlformats.org/presentationml/2006/main" xmlns:p14="http://schemas.microsoft.com/office/powerpoint/2010/main" xmlns:mv="urn:schemas-microsoft-com:mac:vml" xmlns:mc="http://schemas.openxmlformats.org/markup-compatibility/2006" val="1068611830"/>
       </p:ext>
     </p:extLst>
   </p:cSld>

</xml_diff>

<commit_message>
Insignificant/accidental change in Installation.pptx
  In README, futuregrid --> Cyder



git-svn-id: file://localhost/tmp/svn2git/svn@3245 defb5e50-622e-49ec-a68e-d72c7db87b45
</commit_message>
<xml_diff>
--- a/tutorial/general_tutorial/Installation.pptx
+++ b/tutorial/general_tutorial/Installation.pptx
@@ -208,7 +208,7 @@
             <a:fld id="{9A6AC4B2-6F12-454D-8DA7-7B9C78843B81}" type="datetimeFigureOut">
               <a:rPr lang="en-US" smtClean="0"/>
               <a:pPr/>
-              <a:t>11/25/10</a:t>
+              <a:t>11/27/10</a:t>
             </a:fld>
             <a:endParaRPr lang="en-US"/>
           </a:p>
@@ -284,7 +284,7 @@
     </p:spTree>
     <p:extLst>
       <p:ext uri="{BB962C8B-B14F-4D97-AF65-F5344CB8AC3E}">
-        <p14:creationId xmlns:mc="http://schemas.openxmlformats.org/markup-compatibility/2006" xmlns:mv="urn:schemas-microsoft-com:mac:vml" xmlns:p14="http://schemas.microsoft.com/office/powerpoint/2010/main" xmlns:p="http://schemas.openxmlformats.org/presentationml/2006/main" xmlns:r="http://schemas.openxmlformats.org/officeDocument/2006/relationships" xmlns:a="http://schemas.openxmlformats.org/drawingml/2006/main" xmlns="" val="4188242058"/>
+        <p14:creationId xmlns="" xmlns:a="http://schemas.openxmlformats.org/drawingml/2006/main" xmlns:r="http://schemas.openxmlformats.org/officeDocument/2006/relationships" xmlns:p="http://schemas.openxmlformats.org/presentationml/2006/main" xmlns:p14="http://schemas.microsoft.com/office/powerpoint/2010/main" xmlns:mv="urn:schemas-microsoft-com:mac:vml" xmlns:mc="http://schemas.openxmlformats.org/markup-compatibility/2006" val="4188242058"/>
       </p:ext>
     </p:extLst>
   </p:cSld>
@@ -376,7 +376,7 @@
             <a:fld id="{19F24AD4-A78B-B645-8B43-825B1EB2901C}" type="datetimeFigureOut">
               <a:rPr lang="en-US" smtClean="0"/>
               <a:pPr/>
-              <a:t>11/25/10</a:t>
+              <a:t>11/27/10</a:t>
             </a:fld>
             <a:endParaRPr lang="en-US"/>
           </a:p>
@@ -547,7 +547,7 @@
     </p:spTree>
     <p:extLst>
       <p:ext uri="{BB962C8B-B14F-4D97-AF65-F5344CB8AC3E}">
-        <p14:creationId xmlns:mc="http://schemas.openxmlformats.org/markup-compatibility/2006" xmlns:mv="urn:schemas-microsoft-com:mac:vml" xmlns:p14="http://schemas.microsoft.com/office/powerpoint/2010/main" xmlns:p="http://schemas.openxmlformats.org/presentationml/2006/main" xmlns:r="http://schemas.openxmlformats.org/officeDocument/2006/relationships" xmlns:a="http://schemas.openxmlformats.org/drawingml/2006/main" xmlns="" val="2951771260"/>
+        <p14:creationId xmlns="" xmlns:a="http://schemas.openxmlformats.org/drawingml/2006/main" xmlns:r="http://schemas.openxmlformats.org/officeDocument/2006/relationships" xmlns:p="http://schemas.openxmlformats.org/presentationml/2006/main" xmlns:p14="http://schemas.microsoft.com/office/powerpoint/2010/main" xmlns:mv="urn:schemas-microsoft-com:mac:vml" xmlns:mc="http://schemas.openxmlformats.org/markup-compatibility/2006" val="2951771260"/>
       </p:ext>
     </p:extLst>
   </p:cSld>
@@ -917,7 +917,7 @@
             <a:fld id="{ADB8239A-D789-5443-937F-338E3AE3D41C}" type="datetime1">
               <a:rPr lang="en-US" smtClean="0"/>
               <a:pPr/>
-              <a:t>11/25/10</a:t>
+              <a:t>11/27/10</a:t>
             </a:fld>
             <a:endParaRPr lang="en-US"/>
           </a:p>
@@ -1221,7 +1221,7 @@
             <a:fld id="{459EC1CE-E98D-704D-AD6F-6E3323A36483}" type="datetime1">
               <a:rPr lang="en-US" smtClean="0"/>
               <a:pPr/>
-              <a:t>11/25/10</a:t>
+              <a:t>11/27/10</a:t>
             </a:fld>
             <a:endParaRPr lang="en-US"/>
           </a:p>
@@ -1497,7 +1497,7 @@
             <a:fld id="{23E692A5-8B3E-1949-B0CC-6F0593ACFA8E}" type="datetime1">
               <a:rPr lang="en-US" smtClean="0"/>
               <a:pPr/>
-              <a:t>11/25/10</a:t>
+              <a:t>11/27/10</a:t>
             </a:fld>
             <a:endParaRPr lang="en-US"/>
           </a:p>
@@ -1789,7 +1789,7 @@
             <a:fld id="{C381DA14-A3C0-9C42-96F2-BEE3D5DE963D}" type="datetime1">
               <a:rPr lang="en-US" smtClean="0"/>
               <a:pPr/>
-              <a:t>11/25/10</a:t>
+              <a:t>11/27/10</a:t>
             </a:fld>
             <a:endParaRPr lang="en-US"/>
           </a:p>
@@ -2116,7 +2116,7 @@
             <a:fld id="{33319320-9A5F-694B-B7B5-C734EC93AAA2}" type="datetime1">
               <a:rPr lang="en-US" smtClean="0"/>
               <a:pPr/>
-              <a:t>11/25/10</a:t>
+              <a:t>11/27/10</a:t>
             </a:fld>
             <a:endParaRPr lang="en-US"/>
           </a:p>
@@ -2364,7 +2364,7 @@
             <a:fld id="{CF6CE397-A6E6-7547-B24A-92BB5049E0F2}" type="datetime1">
               <a:rPr lang="en-US" smtClean="0"/>
               <a:pPr/>
-              <a:t>11/25/10</a:t>
+              <a:t>11/27/10</a:t>
             </a:fld>
             <a:endParaRPr lang="en-US"/>
           </a:p>
@@ -2541,7 +2541,7 @@
             <a:fld id="{27AB7D46-BD5E-E641-9118-DCE28F3B83FA}" type="datetime1">
               <a:rPr lang="en-US" smtClean="0"/>
               <a:pPr/>
-              <a:t>11/25/10</a:t>
+              <a:t>11/27/10</a:t>
             </a:fld>
             <a:endParaRPr lang="en-US"/>
           </a:p>
@@ -2793,7 +2793,7 @@
             <a:fld id="{BC26097E-015C-3B4D-86C1-CD2AD30F0B81}" type="datetime1">
               <a:rPr lang="en-US" smtClean="0"/>
               <a:pPr/>
-              <a:t>11/25/10</a:t>
+              <a:t>11/27/10</a:t>
             </a:fld>
             <a:endParaRPr lang="en-US"/>
           </a:p>
@@ -3069,7 +3069,7 @@
             <a:fld id="{ED6649F4-2545-3040-B7BD-803CA59D50C7}" type="datetime1">
               <a:rPr lang="en-US" smtClean="0"/>
               <a:pPr/>
-              <a:t>11/25/10</a:t>
+              <a:t>11/27/10</a:t>
             </a:fld>
             <a:endParaRPr lang="en-US"/>
           </a:p>
@@ -3377,7 +3377,7 @@
             <a:fld id="{833A9088-CEDD-2F48-A9A0-611A3CC03FE9}" type="datetime1">
               <a:rPr lang="en-US" smtClean="0"/>
               <a:pPr/>
-              <a:t>11/25/10</a:t>
+              <a:t>11/27/10</a:t>
             </a:fld>
             <a:endParaRPr lang="en-US"/>
           </a:p>
@@ -3671,7 +3671,7 @@
             <a:fld id="{AED87ACF-EB3C-EA42-8610-542FB50388EB}" type="datetime1">
               <a:rPr lang="en-US" smtClean="0"/>
               <a:pPr/>
-              <a:t>11/25/10</a:t>
+              <a:t>11/27/10</a:t>
             </a:fld>
             <a:endParaRPr lang="en-US"/>
           </a:p>
@@ -4103,7 +4103,7 @@
             <a:fld id="{0E0DC31B-692F-774E-A937-DA560DE61DA8}" type="datetime1">
               <a:rPr lang="en-US" smtClean="0"/>
               <a:pPr/>
-              <a:t>11/25/10</a:t>
+              <a:t>11/27/10</a:t>
             </a:fld>
             <a:endParaRPr lang="en-US"/>
           </a:p>
@@ -4451,7 +4451,7 @@
             <a:fld id="{95DEFDAE-5BDC-1B4F-BC4C-23C867CEBC21}" type="datetime1">
               <a:rPr lang="en-US" smtClean="0"/>
               <a:pPr/>
-              <a:t>11/25/10</a:t>
+              <a:t>11/27/10</a:t>
             </a:fld>
             <a:endParaRPr lang="en-US"/>
           </a:p>
@@ -4543,7 +4543,7 @@
             <a:fld id="{9F53C516-787B-9A45-AFCF-5D75DD78DEBE}" type="datetime1">
               <a:rPr lang="en-US" smtClean="0"/>
               <a:pPr/>
-              <a:t>11/25/10</a:t>
+              <a:t>11/27/10</a:t>
             </a:fld>
             <a:endParaRPr lang="en-US"/>
           </a:p>
@@ -4882,7 +4882,7 @@
             <a:fld id="{F19CAA94-9393-BB4A-8CB6-008B1351A132}" type="datetime1">
               <a:rPr lang="en-US" smtClean="0"/>
               <a:pPr/>
-              <a:t>11/25/10</a:t>
+              <a:t>11/27/10</a:t>
             </a:fld>
             <a:endParaRPr lang="en-US"/>
           </a:p>
@@ -5096,7 +5096,7 @@
             <a:fld id="{A3476A5E-2ED6-7749-A8C1-D0B1EEEB97E0}" type="datetime1">
               <a:rPr lang="en-US" smtClean="0"/>
               <a:pPr/>
-              <a:t>11/25/10</a:t>
+              <a:t>11/27/10</a:t>
             </a:fld>
             <a:endParaRPr lang="en-US"/>
           </a:p>
@@ -5651,19 +5651,7 @@
           <a:p>
             <a:r>
               <a:rPr lang="en-US" dirty="0" smtClean="0"/>
-              <a:t>SAGA </a:t>
-            </a:r>
-            <a:r>
-              <a:rPr lang="en-US" dirty="0" smtClean="0"/>
-              <a:t>Components</a:t>
-            </a:r>
-            <a:r>
-              <a:rPr lang="en-US" dirty="0" smtClean="0"/>
-              <a:t>:</a:t>
-            </a:r>
-            <a:r>
-              <a:rPr lang="en-US" dirty="0" smtClean="0"/>
-              <a:t> Installation and Deployment</a:t>
+              <a:t>SAGA Components: Installation and Deployment</a:t>
             </a:r>
             <a:endParaRPr lang="en-US" dirty="0"/>
           </a:p>
@@ -6056,7 +6044,7 @@
     </p:spTree>
     <p:extLst>
       <p:ext uri="{BB962C8B-B14F-4D97-AF65-F5344CB8AC3E}">
-        <p14:creationId xmlns:mc="http://schemas.openxmlformats.org/markup-compatibility/2006" xmlns:mv="urn:schemas-microsoft-com:mac:vml" xmlns:p14="http://schemas.microsoft.com/office/powerpoint/2010/main" xmlns:p="http://schemas.openxmlformats.org/presentationml/2006/main" xmlns:r="http://schemas.openxmlformats.org/officeDocument/2006/relationships" xmlns:a="http://schemas.openxmlformats.org/drawingml/2006/main" xmlns="" val="3402884851"/>
+        <p14:creationId xmlns="" xmlns:a="http://schemas.openxmlformats.org/drawingml/2006/main" xmlns:r="http://schemas.openxmlformats.org/officeDocument/2006/relationships" xmlns:p="http://schemas.openxmlformats.org/presentationml/2006/main" xmlns:p14="http://schemas.microsoft.com/office/powerpoint/2010/main" xmlns:mv="urn:schemas-microsoft-com:mac:vml" xmlns:mc="http://schemas.openxmlformats.org/markup-compatibility/2006" val="3402884851"/>
       </p:ext>
     </p:extLst>
   </p:cSld>
@@ -6193,7 +6181,7 @@
     </p:spTree>
     <p:extLst>
       <p:ext uri="{BB962C8B-B14F-4D97-AF65-F5344CB8AC3E}">
-        <p14:creationId xmlns:mc="http://schemas.openxmlformats.org/markup-compatibility/2006" xmlns:mv="urn:schemas-microsoft-com:mac:vml" xmlns:p14="http://schemas.microsoft.com/office/powerpoint/2010/main" xmlns:p="http://schemas.openxmlformats.org/presentationml/2006/main" xmlns:r="http://schemas.openxmlformats.org/officeDocument/2006/relationships" xmlns:a="http://schemas.openxmlformats.org/drawingml/2006/main" xmlns="" val="1068611830"/>
+        <p14:creationId xmlns="" xmlns:a="http://schemas.openxmlformats.org/drawingml/2006/main" xmlns:r="http://schemas.openxmlformats.org/officeDocument/2006/relationships" xmlns:p="http://schemas.openxmlformats.org/presentationml/2006/main" xmlns:p14="http://schemas.microsoft.com/office/powerpoint/2010/main" xmlns:mv="urn:schemas-microsoft-com:mac:vml" xmlns:mc="http://schemas.openxmlformats.org/markup-compatibility/2006" val="1068611830"/>
       </p:ext>
     </p:extLst>
   </p:cSld>
@@ -6885,7 +6873,7 @@
           <a:p>
             <a:r>
               <a:rPr lang="en-US" dirty="0" smtClean="0"/>
-              <a:t>Agenda</a:t>
+              <a:t>Outline</a:t>
             </a:r>
             <a:endParaRPr lang="en-US" dirty="0"/>
           </a:p>
@@ -7016,15 +7004,7 @@
           <a:p>
             <a:r>
               <a:rPr lang="en-US" dirty="0" smtClean="0"/>
-              <a:t>Mephisto</a:t>
-            </a:r>
-            <a:r>
-              <a:rPr lang="en-US" dirty="0" smtClean="0"/>
-              <a:t>:</a:t>
-            </a:r>
-            <a:r>
-              <a:rPr lang="en-US" dirty="0" smtClean="0"/>
-              <a:t> The Easy Way Out</a:t>
+              <a:t>Mephisto: The Easy Way Out</a:t>
             </a:r>
             <a:endParaRPr lang="en-US" dirty="0"/>
           </a:p>

</xml_diff>

<commit_message>
snapshot. more work required.
git-svn-id: file://localhost/tmp/svn2git/svn@3260 defb5e50-622e-49ec-a68e-d72c7db87b45
</commit_message>
<xml_diff>
--- a/tutorial/general_tutorial/Installation.pptx
+++ b/tutorial/general_tutorial/Installation.pptx
@@ -5,25 +5,29 @@
     <p:sldMasterId id="2147483660" r:id="rId1"/>
   </p:sldMasterIdLst>
   <p:notesMasterIdLst>
-    <p:notesMasterId r:id="rId15"/>
+    <p:notesMasterId r:id="rId19"/>
   </p:notesMasterIdLst>
   <p:handoutMasterIdLst>
-    <p:handoutMasterId r:id="rId16"/>
+    <p:handoutMasterId r:id="rId20"/>
   </p:handoutMasterIdLst>
   <p:sldIdLst>
     <p:sldId id="256" r:id="rId2"/>
     <p:sldId id="270" r:id="rId3"/>
-    <p:sldId id="269" r:id="rId4"/>
-    <p:sldId id="260" r:id="rId5"/>
-    <p:sldId id="268" r:id="rId6"/>
-    <p:sldId id="259" r:id="rId7"/>
-    <p:sldId id="261" r:id="rId8"/>
-    <p:sldId id="262" r:id="rId9"/>
-    <p:sldId id="263" r:id="rId10"/>
-    <p:sldId id="266" r:id="rId11"/>
-    <p:sldId id="267" r:id="rId12"/>
-    <p:sldId id="264" r:id="rId13"/>
-    <p:sldId id="265" r:id="rId14"/>
+    <p:sldId id="271" r:id="rId4"/>
+    <p:sldId id="272" r:id="rId5"/>
+    <p:sldId id="273" r:id="rId6"/>
+    <p:sldId id="274" r:id="rId7"/>
+    <p:sldId id="269" r:id="rId8"/>
+    <p:sldId id="260" r:id="rId9"/>
+    <p:sldId id="268" r:id="rId10"/>
+    <p:sldId id="259" r:id="rId11"/>
+    <p:sldId id="261" r:id="rId12"/>
+    <p:sldId id="262" r:id="rId13"/>
+    <p:sldId id="263" r:id="rId14"/>
+    <p:sldId id="266" r:id="rId15"/>
+    <p:sldId id="267" r:id="rId16"/>
+    <p:sldId id="264" r:id="rId17"/>
+    <p:sldId id="265" r:id="rId18"/>
   </p:sldIdLst>
   <p:sldSz cx="9144000" cy="6858000" type="screen4x3"/>
   <p:notesSz cx="6858000" cy="9144000"/>
@@ -208,7 +212,7 @@
             <a:fld id="{9A6AC4B2-6F12-454D-8DA7-7B9C78843B81}" type="datetimeFigureOut">
               <a:rPr lang="en-US" smtClean="0"/>
               <a:pPr/>
-              <a:t>11/27/10</a:t>
+              <a:t>11/28/10</a:t>
             </a:fld>
             <a:endParaRPr lang="en-US"/>
           </a:p>
@@ -284,7 +288,7 @@
     </p:spTree>
     <p:extLst>
       <p:ext uri="{BB962C8B-B14F-4D97-AF65-F5344CB8AC3E}">
-        <p14:creationId xmlns="" xmlns:a="http://schemas.openxmlformats.org/drawingml/2006/main" xmlns:r="http://schemas.openxmlformats.org/officeDocument/2006/relationships" xmlns:p="http://schemas.openxmlformats.org/presentationml/2006/main" xmlns:p14="http://schemas.microsoft.com/office/powerpoint/2010/main" xmlns:mv="urn:schemas-microsoft-com:mac:vml" xmlns:mc="http://schemas.openxmlformats.org/markup-compatibility/2006" val="4188242058"/>
+        <p14:creationId xmlns:mc="http://schemas.openxmlformats.org/markup-compatibility/2006" xmlns:mv="urn:schemas-microsoft-com:mac:vml" xmlns:p14="http://schemas.microsoft.com/office/powerpoint/2010/main" xmlns:p="http://schemas.openxmlformats.org/presentationml/2006/main" xmlns:r="http://schemas.openxmlformats.org/officeDocument/2006/relationships" xmlns:a="http://schemas.openxmlformats.org/drawingml/2006/main" xmlns="" val="4188242058"/>
       </p:ext>
     </p:extLst>
   </p:cSld>
@@ -376,7 +380,7 @@
             <a:fld id="{19F24AD4-A78B-B645-8B43-825B1EB2901C}" type="datetimeFigureOut">
               <a:rPr lang="en-US" smtClean="0"/>
               <a:pPr/>
-              <a:t>11/27/10</a:t>
+              <a:t>11/28/10</a:t>
             </a:fld>
             <a:endParaRPr lang="en-US"/>
           </a:p>
@@ -547,7 +551,7 @@
     </p:spTree>
     <p:extLst>
       <p:ext uri="{BB962C8B-B14F-4D97-AF65-F5344CB8AC3E}">
-        <p14:creationId xmlns="" xmlns:a="http://schemas.openxmlformats.org/drawingml/2006/main" xmlns:r="http://schemas.openxmlformats.org/officeDocument/2006/relationships" xmlns:p="http://schemas.openxmlformats.org/presentationml/2006/main" xmlns:p14="http://schemas.microsoft.com/office/powerpoint/2010/main" xmlns:mv="urn:schemas-microsoft-com:mac:vml" xmlns:mc="http://schemas.openxmlformats.org/markup-compatibility/2006" val="2951771260"/>
+        <p14:creationId xmlns:mc="http://schemas.openxmlformats.org/markup-compatibility/2006" xmlns:mv="urn:schemas-microsoft-com:mac:vml" xmlns:p14="http://schemas.microsoft.com/office/powerpoint/2010/main" xmlns:p="http://schemas.openxmlformats.org/presentationml/2006/main" xmlns:r="http://schemas.openxmlformats.org/officeDocument/2006/relationships" xmlns:a="http://schemas.openxmlformats.org/drawingml/2006/main" xmlns="" val="2951771260"/>
       </p:ext>
     </p:extLst>
   </p:cSld>
@@ -917,7 +921,7 @@
             <a:fld id="{ADB8239A-D789-5443-937F-338E3AE3D41C}" type="datetime1">
               <a:rPr lang="en-US" smtClean="0"/>
               <a:pPr/>
-              <a:t>11/27/10</a:t>
+              <a:t>11/28/10</a:t>
             </a:fld>
             <a:endParaRPr lang="en-US"/>
           </a:p>
@@ -1221,7 +1225,7 @@
             <a:fld id="{459EC1CE-E98D-704D-AD6F-6E3323A36483}" type="datetime1">
               <a:rPr lang="en-US" smtClean="0"/>
               <a:pPr/>
-              <a:t>11/27/10</a:t>
+              <a:t>11/28/10</a:t>
             </a:fld>
             <a:endParaRPr lang="en-US"/>
           </a:p>
@@ -1497,7 +1501,7 @@
             <a:fld id="{23E692A5-8B3E-1949-B0CC-6F0593ACFA8E}" type="datetime1">
               <a:rPr lang="en-US" smtClean="0"/>
               <a:pPr/>
-              <a:t>11/27/10</a:t>
+              <a:t>11/28/10</a:t>
             </a:fld>
             <a:endParaRPr lang="en-US"/>
           </a:p>
@@ -1789,7 +1793,7 @@
             <a:fld id="{C381DA14-A3C0-9C42-96F2-BEE3D5DE963D}" type="datetime1">
               <a:rPr lang="en-US" smtClean="0"/>
               <a:pPr/>
-              <a:t>11/27/10</a:t>
+              <a:t>11/28/10</a:t>
             </a:fld>
             <a:endParaRPr lang="en-US"/>
           </a:p>
@@ -2116,7 +2120,7 @@
             <a:fld id="{33319320-9A5F-694B-B7B5-C734EC93AAA2}" type="datetime1">
               <a:rPr lang="en-US" smtClean="0"/>
               <a:pPr/>
-              <a:t>11/27/10</a:t>
+              <a:t>11/28/10</a:t>
             </a:fld>
             <a:endParaRPr lang="en-US"/>
           </a:p>
@@ -2364,7 +2368,7 @@
             <a:fld id="{CF6CE397-A6E6-7547-B24A-92BB5049E0F2}" type="datetime1">
               <a:rPr lang="en-US" smtClean="0"/>
               <a:pPr/>
-              <a:t>11/27/10</a:t>
+              <a:t>11/28/10</a:t>
             </a:fld>
             <a:endParaRPr lang="en-US"/>
           </a:p>
@@ -2541,7 +2545,7 @@
             <a:fld id="{27AB7D46-BD5E-E641-9118-DCE28F3B83FA}" type="datetime1">
               <a:rPr lang="en-US" smtClean="0"/>
               <a:pPr/>
-              <a:t>11/27/10</a:t>
+              <a:t>11/28/10</a:t>
             </a:fld>
             <a:endParaRPr lang="en-US"/>
           </a:p>
@@ -2793,7 +2797,7 @@
             <a:fld id="{BC26097E-015C-3B4D-86C1-CD2AD30F0B81}" type="datetime1">
               <a:rPr lang="en-US" smtClean="0"/>
               <a:pPr/>
-              <a:t>11/27/10</a:t>
+              <a:t>11/28/10</a:t>
             </a:fld>
             <a:endParaRPr lang="en-US"/>
           </a:p>
@@ -3069,7 +3073,7 @@
             <a:fld id="{ED6649F4-2545-3040-B7BD-803CA59D50C7}" type="datetime1">
               <a:rPr lang="en-US" smtClean="0"/>
               <a:pPr/>
-              <a:t>11/27/10</a:t>
+              <a:t>11/28/10</a:t>
             </a:fld>
             <a:endParaRPr lang="en-US"/>
           </a:p>
@@ -3377,7 +3381,7 @@
             <a:fld id="{833A9088-CEDD-2F48-A9A0-611A3CC03FE9}" type="datetime1">
               <a:rPr lang="en-US" smtClean="0"/>
               <a:pPr/>
-              <a:t>11/27/10</a:t>
+              <a:t>11/28/10</a:t>
             </a:fld>
             <a:endParaRPr lang="en-US"/>
           </a:p>
@@ -3671,7 +3675,7 @@
             <a:fld id="{AED87ACF-EB3C-EA42-8610-542FB50388EB}" type="datetime1">
               <a:rPr lang="en-US" smtClean="0"/>
               <a:pPr/>
-              <a:t>11/27/10</a:t>
+              <a:t>11/28/10</a:t>
             </a:fld>
             <a:endParaRPr lang="en-US"/>
           </a:p>
@@ -4103,7 +4107,7 @@
             <a:fld id="{0E0DC31B-692F-774E-A937-DA560DE61DA8}" type="datetime1">
               <a:rPr lang="en-US" smtClean="0"/>
               <a:pPr/>
-              <a:t>11/27/10</a:t>
+              <a:t>11/28/10</a:t>
             </a:fld>
             <a:endParaRPr lang="en-US"/>
           </a:p>
@@ -4451,7 +4455,7 @@
             <a:fld id="{95DEFDAE-5BDC-1B4F-BC4C-23C867CEBC21}" type="datetime1">
               <a:rPr lang="en-US" smtClean="0"/>
               <a:pPr/>
-              <a:t>11/27/10</a:t>
+              <a:t>11/28/10</a:t>
             </a:fld>
             <a:endParaRPr lang="en-US"/>
           </a:p>
@@ -4543,7 +4547,7 @@
             <a:fld id="{9F53C516-787B-9A45-AFCF-5D75DD78DEBE}" type="datetime1">
               <a:rPr lang="en-US" smtClean="0"/>
               <a:pPr/>
-              <a:t>11/27/10</a:t>
+              <a:t>11/28/10</a:t>
             </a:fld>
             <a:endParaRPr lang="en-US"/>
           </a:p>
@@ -4882,7 +4886,7 @@
             <a:fld id="{F19CAA94-9393-BB4A-8CB6-008B1351A132}" type="datetime1">
               <a:rPr lang="en-US" smtClean="0"/>
               <a:pPr/>
-              <a:t>11/27/10</a:t>
+              <a:t>11/28/10</a:t>
             </a:fld>
             <a:endParaRPr lang="en-US"/>
           </a:p>
@@ -5096,7 +5100,7 @@
             <a:fld id="{A3476A5E-2ED6-7749-A8C1-D0B1EEEB97E0}" type="datetime1">
               <a:rPr lang="en-US" smtClean="0"/>
               <a:pPr/>
-              <a:t>11/27/10</a:t>
+              <a:t>11/28/10</a:t>
             </a:fld>
             <a:endParaRPr lang="en-US"/>
           </a:p>
@@ -5800,6 +5804,996 @@
           <a:p>
             <a:r>
               <a:rPr lang="en-US" dirty="0" smtClean="0"/>
+              <a:t>Installation</a:t>
+            </a:r>
+            <a:endParaRPr lang="en-US" dirty="0"/>
+          </a:p>
+        </p:txBody>
+      </p:sp>
+      <p:sp>
+        <p:nvSpPr>
+          <p:cNvPr id="3" name="Content Placeholder 2"/>
+          <p:cNvSpPr>
+            <a:spLocks noGrp="1"/>
+          </p:cNvSpPr>
+          <p:nvPr>
+            <p:ph idx="1"/>
+          </p:nvPr>
+        </p:nvSpPr>
+        <p:spPr/>
+        <p:txBody>
+          <a:bodyPr/>
+          <a:lstStyle/>
+          <a:p>
+            <a:r>
+              <a:rPr lang="en-US" dirty="0" smtClean="0"/>
+              <a:t>SAGA is written in C++ and a little bit of Python. To build and install it, you’ll need at least:</a:t>
+            </a:r>
+          </a:p>
+          <a:p>
+            <a:pPr lvl="1"/>
+            <a:r>
+              <a:rPr lang="en-US" dirty="0" smtClean="0"/>
+              <a:t>C++ compiler and library</a:t>
+            </a:r>
+          </a:p>
+          <a:p>
+            <a:pPr lvl="1"/>
+            <a:r>
+              <a:rPr lang="en-US" dirty="0" smtClean="0"/>
+              <a:t>make tools</a:t>
+            </a:r>
+          </a:p>
+          <a:p>
+            <a:pPr lvl="1"/>
+            <a:r>
+              <a:rPr lang="en-US" dirty="0" smtClean="0"/>
+              <a:t>Python (optional)</a:t>
+            </a:r>
+          </a:p>
+          <a:p>
+            <a:r>
+              <a:rPr lang="en-US" dirty="0" smtClean="0"/>
+              <a:t>All SAGA components </a:t>
+            </a:r>
+            <a:r>
+              <a:rPr lang="en-US" b="1" dirty="0" smtClean="0"/>
+              <a:t>require </a:t>
+            </a:r>
+            <a:r>
+              <a:rPr lang="en-US" dirty="0" smtClean="0"/>
+              <a:t>the Boost C++ libraries</a:t>
+            </a:r>
+            <a:br>
+              <a:rPr lang="en-US" dirty="0" smtClean="0"/>
+            </a:br>
+            <a:r>
+              <a:rPr lang="en-US" dirty="0" smtClean="0"/>
+              <a:t>(&gt;= 1.33.1). They are available as binary packages on many (Linux) systems. The source installer can be downloaded at </a:t>
+            </a:r>
+            <a:r>
+              <a:rPr lang="en-US" dirty="0" smtClean="0">
+                <a:hlinkClick r:id="rId2"/>
+              </a:rPr>
+              <a:t>http://www.boost.org</a:t>
+            </a:r>
+            <a:endParaRPr lang="en-US" dirty="0" smtClean="0"/>
+          </a:p>
+          <a:p>
+            <a:r>
+              <a:rPr lang="en-US" dirty="0" smtClean="0"/>
+              <a:t>Adaptors require additional libraries / tools to be installed (e.g. </a:t>
+            </a:r>
+            <a:r>
+              <a:rPr lang="en-US" dirty="0" err="1" smtClean="0"/>
+              <a:t>Globus</a:t>
+            </a:r>
+            <a:r>
+              <a:rPr lang="en-US" dirty="0" smtClean="0"/>
+              <a:t> </a:t>
+            </a:r>
+            <a:r>
+              <a:rPr lang="en-US" dirty="0" err="1" smtClean="0"/>
+              <a:t>libs</a:t>
+            </a:r>
+            <a:r>
+              <a:rPr lang="en-US" dirty="0" smtClean="0"/>
+              <a:t>, </a:t>
+            </a:r>
+            <a:r>
+              <a:rPr lang="en-US" dirty="0" err="1" smtClean="0"/>
+              <a:t>PostgreSQL</a:t>
+            </a:r>
+            <a:r>
+              <a:rPr lang="en-US" dirty="0" smtClean="0"/>
+              <a:t> client </a:t>
+            </a:r>
+            <a:r>
+              <a:rPr lang="en-US" dirty="0" err="1" smtClean="0"/>
+              <a:t>libs</a:t>
+            </a:r>
+            <a:r>
+              <a:rPr lang="en-US" dirty="0" smtClean="0"/>
+              <a:t>, etc…)</a:t>
+            </a:r>
+          </a:p>
+          <a:p>
+            <a:endParaRPr lang="en-US" dirty="0"/>
+          </a:p>
+        </p:txBody>
+      </p:sp>
+    </p:spTree>
+  </p:cSld>
+  <p:clrMapOvr>
+    <a:masterClrMapping/>
+  </p:clrMapOvr>
+</p:sld>
+</file>
+
+<file path=ppt/slides/slide11.xml><?xml version="1.0" encoding="utf-8"?>
+<p:sld xmlns:a="http://schemas.openxmlformats.org/drawingml/2006/main" xmlns:r="http://schemas.openxmlformats.org/officeDocument/2006/relationships" xmlns:mc="http://schemas.openxmlformats.org/markup-compatibility/2006" xmlns:mv="urn:schemas-microsoft-com:mac:vml" xmlns:p="http://schemas.openxmlformats.org/presentationml/2006/main" mc:Ignorable="mv" mc:PreserveAttributes="mv:*">
+  <p:cSld>
+    <p:spTree>
+      <p:nvGrpSpPr>
+        <p:cNvPr id="1" name=""/>
+        <p:cNvGrpSpPr/>
+        <p:nvPr/>
+      </p:nvGrpSpPr>
+      <p:grpSpPr>
+        <a:xfrm>
+          <a:off x="0" y="0"/>
+          <a:ext cx="0" cy="0"/>
+          <a:chOff x="0" y="0"/>
+          <a:chExt cx="0" cy="0"/>
+        </a:xfrm>
+      </p:grpSpPr>
+      <p:sp>
+        <p:nvSpPr>
+          <p:cNvPr id="2" name="Title 1"/>
+          <p:cNvSpPr>
+            <a:spLocks noGrp="1"/>
+          </p:cNvSpPr>
+          <p:nvPr>
+            <p:ph type="title"/>
+          </p:nvPr>
+        </p:nvSpPr>
+        <p:spPr/>
+        <p:txBody>
+          <a:bodyPr/>
+          <a:lstStyle/>
+          <a:p>
+            <a:r>
+              <a:rPr lang="en-US" dirty="0" smtClean="0"/>
+              <a:t>Installation (Core Components)</a:t>
+            </a:r>
+            <a:endParaRPr lang="en-US" dirty="0"/>
+          </a:p>
+        </p:txBody>
+      </p:sp>
+      <p:sp>
+        <p:nvSpPr>
+          <p:cNvPr id="3" name="Content Placeholder 2"/>
+          <p:cNvSpPr>
+            <a:spLocks noGrp="1"/>
+          </p:cNvSpPr>
+          <p:nvPr>
+            <p:ph idx="1"/>
+          </p:nvPr>
+        </p:nvSpPr>
+        <p:spPr/>
+        <p:txBody>
+          <a:bodyPr/>
+          <a:lstStyle/>
+          <a:p>
+            <a:r>
+              <a:rPr lang="en-US" dirty="0" smtClean="0"/>
+              <a:t>Prerequisites: Boost C++ libraries and the </a:t>
+            </a:r>
+            <a:r>
+              <a:rPr lang="en-US" dirty="0" err="1" smtClean="0"/>
+              <a:t>PostgreSQL</a:t>
+            </a:r>
+            <a:r>
+              <a:rPr lang="en-US" dirty="0" smtClean="0"/>
+              <a:t> client libraries if you want to use the default advert and replica adaptors</a:t>
+            </a:r>
+          </a:p>
+          <a:p>
+            <a:r>
+              <a:rPr lang="en-US" dirty="0" smtClean="0"/>
+              <a:t>Download and unpack the Core Components. Decide where you want to install SAGA (local/global). </a:t>
+            </a:r>
+            <a:br>
+              <a:rPr lang="en-US" dirty="0" smtClean="0"/>
+            </a:br>
+            <a:r>
+              <a:rPr lang="en-US" dirty="0" smtClean="0"/>
+              <a:t>Run </a:t>
+            </a:r>
+            <a:r>
+              <a:rPr lang="en-US" b="1" dirty="0" smtClean="0"/>
+              <a:t>configure </a:t>
+            </a:r>
+            <a:r>
+              <a:rPr lang="en-US" dirty="0" smtClean="0"/>
+              <a:t>and </a:t>
+            </a:r>
+            <a:r>
+              <a:rPr lang="en-US" b="1" dirty="0" smtClean="0"/>
+              <a:t>make</a:t>
+            </a:r>
+            <a:r>
+              <a:rPr lang="en-US" dirty="0" smtClean="0"/>
+              <a:t>:</a:t>
+            </a:r>
+          </a:p>
+        </p:txBody>
+      </p:sp>
+      <p:sp>
+        <p:nvSpPr>
+          <p:cNvPr id="6" name="TextBox 5"/>
+          <p:cNvSpPr txBox="1"/>
+          <p:nvPr/>
+        </p:nvSpPr>
+        <p:spPr>
+          <a:xfrm>
+            <a:off x="1481601" y="4542827"/>
+            <a:ext cx="7243299" cy="1384995"/>
+          </a:xfrm>
+          <a:prstGeom prst="rect">
+            <a:avLst/>
+          </a:prstGeom>
+          <a:solidFill>
+            <a:srgbClr val="D7D9CD"/>
+          </a:solidFill>
+          <a:ln>
+            <a:solidFill>
+              <a:srgbClr val="8BADBD"/>
+            </a:solidFill>
+          </a:ln>
+        </p:spPr>
+        <p:style>
+          <a:lnRef idx="2">
+            <a:schemeClr val="accent4"/>
+          </a:lnRef>
+          <a:fillRef idx="1">
+            <a:schemeClr val="lt1"/>
+          </a:fillRef>
+          <a:effectRef idx="0">
+            <a:schemeClr val="accent4"/>
+          </a:effectRef>
+          <a:fontRef idx="minor">
+            <a:schemeClr val="dk1"/>
+          </a:fontRef>
+        </p:style>
+        <p:txBody>
+          <a:bodyPr wrap="square" rtlCol="0">
+            <a:spAutoFit/>
+          </a:bodyPr>
+          <a:lstStyle/>
+          <a:p>
+            <a:r>
+              <a:rPr lang="en-US" sz="1200" dirty="0" smtClean="0">
+                <a:latin typeface="Andale Mono"/>
+                <a:cs typeface="Andale Mono"/>
+              </a:rPr>
+              <a:t>$&gt; export SAGA_LOCATION=/install/location/dir/</a:t>
+            </a:r>
+          </a:p>
+          <a:p>
+            <a:endParaRPr lang="en-US" sz="1200" dirty="0" smtClean="0">
+              <a:latin typeface="Andale Mono"/>
+              <a:cs typeface="Andale Mono"/>
+            </a:endParaRPr>
+          </a:p>
+          <a:p>
+            <a:r>
+              <a:rPr lang="en-US" sz="1200" dirty="0" smtClean="0">
+                <a:latin typeface="Andale Mono"/>
+                <a:cs typeface="Andale Mono"/>
+              </a:rPr>
+              <a:t>$&gt; ./configure --prefix=SAGA_LOCATION </a:t>
+            </a:r>
+            <a:r>
+              <a:rPr lang="en-US" sz="1200" dirty="0" smtClean="0">
+                <a:solidFill>
+                  <a:schemeClr val="bg1">
+                    <a:lumMod val="50000"/>
+                  </a:schemeClr>
+                </a:solidFill>
+                <a:latin typeface="Andale Mono"/>
+                <a:cs typeface="Andale Mono"/>
+              </a:rPr>
+              <a:t>--with-boost= --with-</a:t>
+            </a:r>
+            <a:r>
+              <a:rPr lang="en-US" sz="1200" dirty="0" err="1" smtClean="0">
+                <a:solidFill>
+                  <a:schemeClr val="bg1">
+                    <a:lumMod val="50000"/>
+                  </a:schemeClr>
+                </a:solidFill>
+                <a:latin typeface="Andale Mono"/>
+                <a:cs typeface="Andale Mono"/>
+              </a:rPr>
+              <a:t>postgresql</a:t>
+            </a:r>
+            <a:r>
+              <a:rPr lang="en-US" sz="1200" dirty="0" smtClean="0">
+                <a:solidFill>
+                  <a:schemeClr val="bg1">
+                    <a:lumMod val="50000"/>
+                  </a:schemeClr>
+                </a:solidFill>
+                <a:latin typeface="Andale Mono"/>
+                <a:cs typeface="Andale Mono"/>
+              </a:rPr>
+              <a:t>=</a:t>
+            </a:r>
+          </a:p>
+          <a:p>
+            <a:endParaRPr lang="en-US" sz="1200" dirty="0" smtClean="0">
+              <a:latin typeface="Andale Mono"/>
+              <a:cs typeface="Andale Mono"/>
+            </a:endParaRPr>
+          </a:p>
+          <a:p>
+            <a:r>
+              <a:rPr lang="en-US" sz="1200" dirty="0" smtClean="0">
+                <a:latin typeface="Andale Mono"/>
+                <a:cs typeface="Andale Mono"/>
+              </a:rPr>
+              <a:t>$&gt; make</a:t>
+            </a:r>
+          </a:p>
+          <a:p>
+            <a:endParaRPr lang="en-US" sz="1200" dirty="0" smtClean="0">
+              <a:latin typeface="Andale Mono"/>
+              <a:cs typeface="Andale Mono"/>
+            </a:endParaRPr>
+          </a:p>
+          <a:p>
+            <a:r>
+              <a:rPr lang="en-US" sz="1200" dirty="0" smtClean="0">
+                <a:latin typeface="Andale Mono"/>
+                <a:cs typeface="Andale Mono"/>
+              </a:rPr>
+              <a:t>$&gt; make install</a:t>
+            </a:r>
+          </a:p>
+        </p:txBody>
+      </p:sp>
+    </p:spTree>
+  </p:cSld>
+  <p:clrMapOvr>
+    <a:masterClrMapping/>
+  </p:clrMapOvr>
+</p:sld>
+</file>
+
+<file path=ppt/slides/slide12.xml><?xml version="1.0" encoding="utf-8"?>
+<p:sld xmlns:a="http://schemas.openxmlformats.org/drawingml/2006/main" xmlns:r="http://schemas.openxmlformats.org/officeDocument/2006/relationships" xmlns:mc="http://schemas.openxmlformats.org/markup-compatibility/2006" xmlns:mv="urn:schemas-microsoft-com:mac:vml" xmlns:p="http://schemas.openxmlformats.org/presentationml/2006/main" mc:Ignorable="mv" mc:PreserveAttributes="mv:*">
+  <p:cSld>
+    <p:spTree>
+      <p:nvGrpSpPr>
+        <p:cNvPr id="1" name=""/>
+        <p:cNvGrpSpPr/>
+        <p:nvPr/>
+      </p:nvGrpSpPr>
+      <p:grpSpPr>
+        <a:xfrm>
+          <a:off x="0" y="0"/>
+          <a:ext cx="0" cy="0"/>
+          <a:chOff x="0" y="0"/>
+          <a:chExt cx="0" cy="0"/>
+        </a:xfrm>
+      </p:grpSpPr>
+      <p:sp>
+        <p:nvSpPr>
+          <p:cNvPr id="2" name="Title 1"/>
+          <p:cNvSpPr>
+            <a:spLocks noGrp="1"/>
+          </p:cNvSpPr>
+          <p:nvPr>
+            <p:ph type="title"/>
+          </p:nvPr>
+        </p:nvSpPr>
+        <p:spPr/>
+        <p:txBody>
+          <a:bodyPr/>
+          <a:lstStyle/>
+          <a:p>
+            <a:r>
+              <a:rPr lang="en-US" dirty="0" smtClean="0"/>
+              <a:t>Installation (Python Bindings)</a:t>
+            </a:r>
+            <a:endParaRPr lang="en-US" dirty="0"/>
+          </a:p>
+        </p:txBody>
+      </p:sp>
+      <p:sp>
+        <p:nvSpPr>
+          <p:cNvPr id="3" name="Content Placeholder 2"/>
+          <p:cNvSpPr>
+            <a:spLocks noGrp="1"/>
+          </p:cNvSpPr>
+          <p:nvPr>
+            <p:ph idx="1"/>
+          </p:nvPr>
+        </p:nvSpPr>
+        <p:spPr/>
+        <p:txBody>
+          <a:bodyPr/>
+          <a:lstStyle/>
+          <a:p>
+            <a:r>
+              <a:rPr lang="en-US" dirty="0" smtClean="0"/>
+              <a:t>Prerequisites: </a:t>
+            </a:r>
+            <a:r>
+              <a:rPr lang="en-US" i="1" dirty="0" smtClean="0"/>
+              <a:t>SAGA Core Components </a:t>
+            </a:r>
+            <a:r>
+              <a:rPr lang="en-US" dirty="0" smtClean="0"/>
+              <a:t>and Python </a:t>
+            </a:r>
+            <a:br>
+              <a:rPr lang="en-US" dirty="0" smtClean="0"/>
+            </a:br>
+            <a:r>
+              <a:rPr lang="en-US" dirty="0" smtClean="0"/>
+              <a:t>(&gt;= 2.3 with shared libraries installed) </a:t>
+            </a:r>
+          </a:p>
+          <a:p>
+            <a:r>
+              <a:rPr lang="en-US" dirty="0" smtClean="0"/>
+              <a:t>Download and unpack the Python Bindings</a:t>
+            </a:r>
+            <a:br>
+              <a:rPr lang="en-US" dirty="0" smtClean="0"/>
+            </a:br>
+            <a:r>
+              <a:rPr lang="en-US" dirty="0" smtClean="0"/>
+              <a:t>Run </a:t>
+            </a:r>
+            <a:r>
+              <a:rPr lang="en-US" b="1" dirty="0" smtClean="0"/>
+              <a:t>configure </a:t>
+            </a:r>
+            <a:r>
+              <a:rPr lang="en-US" dirty="0" smtClean="0"/>
+              <a:t>and </a:t>
+            </a:r>
+            <a:r>
+              <a:rPr lang="en-US" b="1" dirty="0" smtClean="0"/>
+              <a:t>make</a:t>
+            </a:r>
+            <a:r>
+              <a:rPr lang="en-US" dirty="0" smtClean="0"/>
+              <a:t>:</a:t>
+            </a:r>
+          </a:p>
+        </p:txBody>
+      </p:sp>
+      <p:sp>
+        <p:nvSpPr>
+          <p:cNvPr id="6" name="TextBox 5"/>
+          <p:cNvSpPr txBox="1"/>
+          <p:nvPr/>
+        </p:nvSpPr>
+        <p:spPr>
+          <a:xfrm>
+            <a:off x="1481601" y="3997362"/>
+            <a:ext cx="7243299" cy="1384995"/>
+          </a:xfrm>
+          <a:prstGeom prst="rect">
+            <a:avLst/>
+          </a:prstGeom>
+          <a:solidFill>
+            <a:srgbClr val="D7D9CD"/>
+          </a:solidFill>
+          <a:ln>
+            <a:solidFill>
+              <a:srgbClr val="8BADBD"/>
+            </a:solidFill>
+          </a:ln>
+        </p:spPr>
+        <p:style>
+          <a:lnRef idx="2">
+            <a:schemeClr val="accent4"/>
+          </a:lnRef>
+          <a:fillRef idx="1">
+            <a:schemeClr val="lt1"/>
+          </a:fillRef>
+          <a:effectRef idx="0">
+            <a:schemeClr val="accent4"/>
+          </a:effectRef>
+          <a:fontRef idx="minor">
+            <a:schemeClr val="dk1"/>
+          </a:fontRef>
+        </p:style>
+        <p:txBody>
+          <a:bodyPr wrap="square" rtlCol="0">
+            <a:spAutoFit/>
+          </a:bodyPr>
+          <a:lstStyle/>
+          <a:p>
+            <a:r>
+              <a:rPr lang="en-US" sz="1200" dirty="0" smtClean="0">
+                <a:solidFill>
+                  <a:srgbClr val="7F7F7F"/>
+                </a:solidFill>
+                <a:latin typeface="Andale Mono"/>
+                <a:cs typeface="Andale Mono"/>
+              </a:rPr>
+              <a:t>$&gt; export SAGA_LOCATION=/install/location/dir/</a:t>
+            </a:r>
+          </a:p>
+          <a:p>
+            <a:endParaRPr lang="en-US" sz="1200" dirty="0" smtClean="0">
+              <a:latin typeface="Andale Mono"/>
+              <a:cs typeface="Andale Mono"/>
+            </a:endParaRPr>
+          </a:p>
+          <a:p>
+            <a:r>
+              <a:rPr lang="en-US" sz="1200" dirty="0" smtClean="0">
+                <a:latin typeface="Andale Mono"/>
+                <a:cs typeface="Andale Mono"/>
+              </a:rPr>
+              <a:t>$&gt; ./configure </a:t>
+            </a:r>
+            <a:r>
+              <a:rPr lang="en-US" sz="1200" dirty="0" smtClean="0">
+                <a:solidFill>
+                  <a:schemeClr val="bg1">
+                    <a:lumMod val="50000"/>
+                  </a:schemeClr>
+                </a:solidFill>
+                <a:latin typeface="Andale Mono"/>
+                <a:cs typeface="Andale Mono"/>
+              </a:rPr>
+              <a:t>--with-python=</a:t>
+            </a:r>
+          </a:p>
+          <a:p>
+            <a:endParaRPr lang="en-US" sz="1200" dirty="0" smtClean="0">
+              <a:latin typeface="Andale Mono"/>
+              <a:cs typeface="Andale Mono"/>
+            </a:endParaRPr>
+          </a:p>
+          <a:p>
+            <a:r>
+              <a:rPr lang="en-US" sz="1200" dirty="0" smtClean="0">
+                <a:latin typeface="Andale Mono"/>
+                <a:cs typeface="Andale Mono"/>
+              </a:rPr>
+              <a:t>$&gt; make</a:t>
+            </a:r>
+          </a:p>
+          <a:p>
+            <a:endParaRPr lang="en-US" sz="1200" dirty="0" smtClean="0">
+              <a:latin typeface="Andale Mono"/>
+              <a:cs typeface="Andale Mono"/>
+            </a:endParaRPr>
+          </a:p>
+          <a:p>
+            <a:r>
+              <a:rPr lang="en-US" sz="1200" dirty="0" smtClean="0">
+                <a:latin typeface="Andale Mono"/>
+                <a:cs typeface="Andale Mono"/>
+              </a:rPr>
+              <a:t>$&gt; make install</a:t>
+            </a:r>
+          </a:p>
+        </p:txBody>
+      </p:sp>
+    </p:spTree>
+  </p:cSld>
+  <p:clrMapOvr>
+    <a:masterClrMapping/>
+  </p:clrMapOvr>
+</p:sld>
+</file>
+
+<file path=ppt/slides/slide13.xml><?xml version="1.0" encoding="utf-8"?>
+<p:sld xmlns:a="http://schemas.openxmlformats.org/drawingml/2006/main" xmlns:r="http://schemas.openxmlformats.org/officeDocument/2006/relationships" xmlns:mc="http://schemas.openxmlformats.org/markup-compatibility/2006" xmlns:mv="urn:schemas-microsoft-com:mac:vml" xmlns:p="http://schemas.openxmlformats.org/presentationml/2006/main" mc:Ignorable="mv" mc:PreserveAttributes="mv:*">
+  <p:cSld>
+    <p:spTree>
+      <p:nvGrpSpPr>
+        <p:cNvPr id="1" name=""/>
+        <p:cNvGrpSpPr/>
+        <p:nvPr/>
+      </p:nvGrpSpPr>
+      <p:grpSpPr>
+        <a:xfrm>
+          <a:off x="0" y="0"/>
+          <a:ext cx="0" cy="0"/>
+          <a:chOff x="0" y="0"/>
+          <a:chExt cx="0" cy="0"/>
+        </a:xfrm>
+      </p:grpSpPr>
+      <p:sp>
+        <p:nvSpPr>
+          <p:cNvPr id="2" name="Title 1"/>
+          <p:cNvSpPr>
+            <a:spLocks noGrp="1"/>
+          </p:cNvSpPr>
+          <p:nvPr>
+            <p:ph type="title"/>
+          </p:nvPr>
+        </p:nvSpPr>
+        <p:spPr/>
+        <p:txBody>
+          <a:bodyPr/>
+          <a:lstStyle/>
+          <a:p>
+            <a:r>
+              <a:rPr lang="en-US" dirty="0" smtClean="0"/>
+              <a:t>Installation (</a:t>
+            </a:r>
+            <a:r>
+              <a:rPr lang="en-US" dirty="0" err="1" smtClean="0"/>
+              <a:t>Globus</a:t>
+            </a:r>
+            <a:r>
+              <a:rPr lang="en-US" dirty="0" smtClean="0"/>
+              <a:t> Adaptors)</a:t>
+            </a:r>
+            <a:endParaRPr lang="en-US" dirty="0"/>
+          </a:p>
+        </p:txBody>
+      </p:sp>
+      <p:sp>
+        <p:nvSpPr>
+          <p:cNvPr id="3" name="Content Placeholder 2"/>
+          <p:cNvSpPr>
+            <a:spLocks noGrp="1"/>
+          </p:cNvSpPr>
+          <p:nvPr>
+            <p:ph idx="1"/>
+          </p:nvPr>
+        </p:nvSpPr>
+        <p:spPr/>
+        <p:txBody>
+          <a:bodyPr>
+            <a:normAutofit lnSpcReduction="10000"/>
+          </a:bodyPr>
+          <a:lstStyle/>
+          <a:p>
+            <a:r>
+              <a:rPr lang="en-US" dirty="0" smtClean="0"/>
+              <a:t>Prerequisites: </a:t>
+            </a:r>
+            <a:r>
+              <a:rPr lang="en-US" b="1" i="1" dirty="0" smtClean="0"/>
+              <a:t>SAGA Core Components </a:t>
+            </a:r>
+            <a:r>
+              <a:rPr lang="en-US" dirty="0" smtClean="0"/>
+              <a:t>and the </a:t>
+            </a:r>
+            <a:r>
+              <a:rPr lang="en-US" dirty="0" err="1" smtClean="0"/>
+              <a:t>Globus</a:t>
+            </a:r>
+            <a:r>
+              <a:rPr lang="en-US" dirty="0" smtClean="0"/>
+              <a:t> Toolkit (available at http://</a:t>
+            </a:r>
+            <a:r>
+              <a:rPr lang="en-US" dirty="0" err="1" smtClean="0"/>
+              <a:t>www.globus.org</a:t>
+            </a:r>
+            <a:r>
+              <a:rPr lang="en-US" dirty="0" smtClean="0"/>
+              <a:t>)</a:t>
+            </a:r>
+          </a:p>
+          <a:p>
+            <a:r>
+              <a:rPr lang="en-US" dirty="0" smtClean="0"/>
+              <a:t>Download and unpack the </a:t>
+            </a:r>
+            <a:r>
+              <a:rPr lang="en-US" dirty="0" err="1" smtClean="0"/>
+              <a:t>Globus</a:t>
+            </a:r>
+            <a:r>
+              <a:rPr lang="en-US" dirty="0" smtClean="0"/>
+              <a:t> Adaptors </a:t>
+            </a:r>
+            <a:br>
+              <a:rPr lang="en-US" dirty="0" smtClean="0"/>
+            </a:br>
+            <a:r>
+              <a:rPr lang="en-US" dirty="0" smtClean="0"/>
+              <a:t>Run </a:t>
+            </a:r>
+            <a:r>
+              <a:rPr lang="en-US" b="1" dirty="0" smtClean="0"/>
+              <a:t>configure </a:t>
+            </a:r>
+            <a:r>
+              <a:rPr lang="en-US" dirty="0" smtClean="0"/>
+              <a:t>and </a:t>
+            </a:r>
+            <a:r>
+              <a:rPr lang="en-US" b="1" dirty="0" smtClean="0"/>
+              <a:t>make</a:t>
+            </a:r>
+            <a:r>
+              <a:rPr lang="en-US" dirty="0" smtClean="0"/>
+              <a:t>:</a:t>
+            </a:r>
+          </a:p>
+          <a:p>
+            <a:endParaRPr lang="en-US" dirty="0" smtClean="0"/>
+          </a:p>
+          <a:p>
+            <a:endParaRPr lang="en-US" dirty="0" smtClean="0"/>
+          </a:p>
+          <a:p>
+            <a:endParaRPr lang="en-US" dirty="0" smtClean="0"/>
+          </a:p>
+          <a:p>
+            <a:endParaRPr lang="en-US" dirty="0" smtClean="0"/>
+          </a:p>
+          <a:p>
+            <a:r>
+              <a:rPr lang="en-US" dirty="0" smtClean="0"/>
+              <a:t>This works similar for all other SAGA Adaptors</a:t>
+            </a:r>
+          </a:p>
+        </p:txBody>
+      </p:sp>
+      <p:sp>
+        <p:nvSpPr>
+          <p:cNvPr id="6" name="TextBox 5"/>
+          <p:cNvSpPr txBox="1"/>
+          <p:nvPr/>
+        </p:nvSpPr>
+        <p:spPr>
+          <a:xfrm>
+            <a:off x="1481601" y="3826396"/>
+            <a:ext cx="7243299" cy="1569660"/>
+          </a:xfrm>
+          <a:prstGeom prst="rect">
+            <a:avLst/>
+          </a:prstGeom>
+          <a:solidFill>
+            <a:srgbClr val="D7D9CD"/>
+          </a:solidFill>
+          <a:ln>
+            <a:solidFill>
+              <a:srgbClr val="8BADBD"/>
+            </a:solidFill>
+          </a:ln>
+        </p:spPr>
+        <p:style>
+          <a:lnRef idx="2">
+            <a:schemeClr val="accent4"/>
+          </a:lnRef>
+          <a:fillRef idx="1">
+            <a:schemeClr val="lt1"/>
+          </a:fillRef>
+          <a:effectRef idx="0">
+            <a:schemeClr val="accent4"/>
+          </a:effectRef>
+          <a:fontRef idx="minor">
+            <a:schemeClr val="dk1"/>
+          </a:fontRef>
+        </p:style>
+        <p:txBody>
+          <a:bodyPr wrap="square" rtlCol="0">
+            <a:spAutoFit/>
+          </a:bodyPr>
+          <a:lstStyle/>
+          <a:p>
+            <a:r>
+              <a:rPr lang="en-US" sz="1200" dirty="0" smtClean="0">
+                <a:solidFill>
+                  <a:srgbClr val="7F7F7F"/>
+                </a:solidFill>
+                <a:latin typeface="Andale Mono"/>
+                <a:cs typeface="Andale Mono"/>
+              </a:rPr>
+              <a:t>$&gt; export SAGA_LOCATION=/install/location/dir/</a:t>
+            </a:r>
+          </a:p>
+          <a:p>
+            <a:r>
+              <a:rPr lang="en-US" sz="1200" dirty="0" smtClean="0">
+                <a:solidFill>
+                  <a:srgbClr val="7F7F7F"/>
+                </a:solidFill>
+                <a:latin typeface="Andale Mono"/>
+                <a:cs typeface="Andale Mono"/>
+              </a:rPr>
+              <a:t>$&gt; export GLOBUS_LOCATION=/path/to/your/</a:t>
+            </a:r>
+            <a:r>
+              <a:rPr lang="en-US" sz="1200" dirty="0" err="1" smtClean="0">
+                <a:solidFill>
+                  <a:srgbClr val="7F7F7F"/>
+                </a:solidFill>
+                <a:latin typeface="Andale Mono"/>
+                <a:cs typeface="Andale Mono"/>
+              </a:rPr>
+              <a:t>globus</a:t>
+            </a:r>
+            <a:r>
+              <a:rPr lang="en-US" sz="1200" dirty="0" smtClean="0">
+                <a:solidFill>
+                  <a:srgbClr val="7F7F7F"/>
+                </a:solidFill>
+                <a:latin typeface="Andale Mono"/>
+                <a:cs typeface="Andale Mono"/>
+              </a:rPr>
+              <a:t>/installation</a:t>
+            </a:r>
+          </a:p>
+          <a:p>
+            <a:endParaRPr lang="en-US" sz="1200" dirty="0" smtClean="0">
+              <a:latin typeface="Andale Mono"/>
+              <a:cs typeface="Andale Mono"/>
+            </a:endParaRPr>
+          </a:p>
+          <a:p>
+            <a:r>
+              <a:rPr lang="en-US" sz="1200" dirty="0" smtClean="0">
+                <a:latin typeface="Andale Mono"/>
+                <a:cs typeface="Andale Mono"/>
+              </a:rPr>
+              <a:t>$&gt; ./configure </a:t>
+            </a:r>
+            <a:r>
+              <a:rPr lang="en-US" sz="1200" dirty="0" smtClean="0">
+                <a:solidFill>
+                  <a:schemeClr val="bg1">
+                    <a:lumMod val="50000"/>
+                  </a:schemeClr>
+                </a:solidFill>
+                <a:latin typeface="Andale Mono"/>
+                <a:cs typeface="Andale Mono"/>
+              </a:rPr>
+              <a:t>--with-</a:t>
+            </a:r>
+            <a:r>
+              <a:rPr lang="en-US" sz="1200" dirty="0" err="1" smtClean="0">
+                <a:solidFill>
+                  <a:schemeClr val="bg1">
+                    <a:lumMod val="50000"/>
+                  </a:schemeClr>
+                </a:solidFill>
+                <a:latin typeface="Andale Mono"/>
+                <a:cs typeface="Andale Mono"/>
+              </a:rPr>
+              <a:t>globus</a:t>
+            </a:r>
+            <a:r>
+              <a:rPr lang="en-US" sz="1200" dirty="0" smtClean="0">
+                <a:solidFill>
+                  <a:schemeClr val="bg1">
+                    <a:lumMod val="50000"/>
+                  </a:schemeClr>
+                </a:solidFill>
+                <a:latin typeface="Andale Mono"/>
+                <a:cs typeface="Andale Mono"/>
+              </a:rPr>
+              <a:t>-location= --with-</a:t>
+            </a:r>
+            <a:r>
+              <a:rPr lang="en-US" sz="1200" dirty="0" err="1" smtClean="0">
+                <a:solidFill>
+                  <a:schemeClr val="bg1">
+                    <a:lumMod val="50000"/>
+                  </a:schemeClr>
+                </a:solidFill>
+                <a:latin typeface="Andale Mono"/>
+                <a:cs typeface="Andale Mono"/>
+              </a:rPr>
+              <a:t>globus</a:t>
+            </a:r>
+            <a:r>
+              <a:rPr lang="en-US" sz="1200" dirty="0" smtClean="0">
+                <a:solidFill>
+                  <a:schemeClr val="bg1">
+                    <a:lumMod val="50000"/>
+                  </a:schemeClr>
+                </a:solidFill>
+                <a:latin typeface="Andale Mono"/>
+                <a:cs typeface="Andale Mono"/>
+              </a:rPr>
+              <a:t>-flavor=</a:t>
+            </a:r>
+          </a:p>
+          <a:p>
+            <a:endParaRPr lang="en-US" sz="1200" dirty="0" smtClean="0">
+              <a:latin typeface="Andale Mono"/>
+              <a:cs typeface="Andale Mono"/>
+            </a:endParaRPr>
+          </a:p>
+          <a:p>
+            <a:r>
+              <a:rPr lang="en-US" sz="1200" dirty="0" smtClean="0">
+                <a:latin typeface="Andale Mono"/>
+                <a:cs typeface="Andale Mono"/>
+              </a:rPr>
+              <a:t>$&gt; </a:t>
+            </a:r>
+            <a:r>
+              <a:rPr lang="en-US" sz="1200" dirty="0" smtClean="0">
+                <a:solidFill>
+                  <a:srgbClr val="FF0000"/>
+                </a:solidFill>
+                <a:latin typeface="Andale Mono"/>
+                <a:cs typeface="Andale Mono"/>
+              </a:rPr>
+              <a:t>make</a:t>
+            </a:r>
+          </a:p>
+          <a:p>
+            <a:endParaRPr lang="en-US" sz="1200" dirty="0" smtClean="0">
+              <a:latin typeface="Andale Mono"/>
+              <a:cs typeface="Andale Mono"/>
+            </a:endParaRPr>
+          </a:p>
+          <a:p>
+            <a:r>
+              <a:rPr lang="en-US" sz="1200" dirty="0" smtClean="0">
+                <a:latin typeface="Andale Mono"/>
+                <a:cs typeface="Andale Mono"/>
+              </a:rPr>
+              <a:t>$&gt; make install</a:t>
+            </a:r>
+          </a:p>
+        </p:txBody>
+      </p:sp>
+    </p:spTree>
+  </p:cSld>
+  <p:clrMapOvr>
+    <a:masterClrMapping/>
+  </p:clrMapOvr>
+</p:sld>
+</file>
+
+<file path=ppt/slides/slide14.xml><?xml version="1.0" encoding="utf-8"?>
+<p:sld xmlns:a="http://schemas.openxmlformats.org/drawingml/2006/main" xmlns:r="http://schemas.openxmlformats.org/officeDocument/2006/relationships" xmlns:mc="http://schemas.openxmlformats.org/markup-compatibility/2006" xmlns:mv="urn:schemas-microsoft-com:mac:vml" xmlns:p="http://schemas.openxmlformats.org/presentationml/2006/main" mc:Ignorable="mv" mc:PreserveAttributes="mv:*">
+  <p:cSld>
+    <p:spTree>
+      <p:nvGrpSpPr>
+        <p:cNvPr id="1" name=""/>
+        <p:cNvGrpSpPr/>
+        <p:nvPr/>
+      </p:nvGrpSpPr>
+      <p:grpSpPr>
+        <a:xfrm>
+          <a:off x="0" y="0"/>
+          <a:ext cx="0" cy="0"/>
+          <a:chOff x="0" y="0"/>
+          <a:chExt cx="0" cy="0"/>
+        </a:xfrm>
+      </p:grpSpPr>
+      <p:sp>
+        <p:nvSpPr>
+          <p:cNvPr id="2" name="Title 1"/>
+          <p:cNvSpPr>
+            <a:spLocks noGrp="1"/>
+          </p:cNvSpPr>
+          <p:nvPr>
+            <p:ph type="title"/>
+          </p:nvPr>
+        </p:nvSpPr>
+        <p:spPr/>
+        <p:txBody>
+          <a:bodyPr/>
+          <a:lstStyle/>
+          <a:p>
+            <a:r>
+              <a:rPr lang="en-US" dirty="0" smtClean="0"/>
               <a:t>Installation (Condor Adaptor)</a:t>
             </a:r>
             <a:endParaRPr lang="en-US" dirty="0"/>
@@ -6044,7 +7038,7 @@
     </p:spTree>
     <p:extLst>
       <p:ext uri="{BB962C8B-B14F-4D97-AF65-F5344CB8AC3E}">
-        <p14:creationId xmlns="" xmlns:a="http://schemas.openxmlformats.org/drawingml/2006/main" xmlns:r="http://schemas.openxmlformats.org/officeDocument/2006/relationships" xmlns:p="http://schemas.openxmlformats.org/presentationml/2006/main" xmlns:p14="http://schemas.microsoft.com/office/powerpoint/2010/main" xmlns:mv="urn:schemas-microsoft-com:mac:vml" xmlns:mc="http://schemas.openxmlformats.org/markup-compatibility/2006" val="3402884851"/>
+        <p14:creationId xmlns:mc="http://schemas.openxmlformats.org/markup-compatibility/2006" xmlns:mv="urn:schemas-microsoft-com:mac:vml" xmlns:p14="http://schemas.microsoft.com/office/powerpoint/2010/main" xmlns:p="http://schemas.openxmlformats.org/presentationml/2006/main" xmlns:r="http://schemas.openxmlformats.org/officeDocument/2006/relationships" xmlns:a="http://schemas.openxmlformats.org/drawingml/2006/main" xmlns="" val="3402884851"/>
       </p:ext>
     </p:extLst>
   </p:cSld>
@@ -6054,7 +7048,7 @@
 </p:sld>
 </file>
 
-<file path=ppt/slides/slide11.xml><?xml version="1.0" encoding="utf-8"?>
+<file path=ppt/slides/slide15.xml><?xml version="1.0" encoding="utf-8"?>
 <p:sld xmlns:a="http://schemas.openxmlformats.org/drawingml/2006/main" xmlns:r="http://schemas.openxmlformats.org/officeDocument/2006/relationships" xmlns:mc="http://schemas.openxmlformats.org/markup-compatibility/2006" xmlns:mv="urn:schemas-microsoft-com:mac:vml" xmlns:p="http://schemas.openxmlformats.org/presentationml/2006/main" mc:Ignorable="mv" mc:PreserveAttributes="mv:*">
   <p:cSld>
     <p:spTree>
@@ -6181,7 +7175,7 @@
     </p:spTree>
     <p:extLst>
       <p:ext uri="{BB962C8B-B14F-4D97-AF65-F5344CB8AC3E}">
-        <p14:creationId xmlns="" xmlns:a="http://schemas.openxmlformats.org/drawingml/2006/main" xmlns:r="http://schemas.openxmlformats.org/officeDocument/2006/relationships" xmlns:p="http://schemas.openxmlformats.org/presentationml/2006/main" xmlns:p14="http://schemas.microsoft.com/office/powerpoint/2010/main" xmlns:mv="urn:schemas-microsoft-com:mac:vml" xmlns:mc="http://schemas.openxmlformats.org/markup-compatibility/2006" val="1068611830"/>
+        <p14:creationId xmlns:mc="http://schemas.openxmlformats.org/markup-compatibility/2006" xmlns:mv="urn:schemas-microsoft-com:mac:vml" xmlns:p14="http://schemas.microsoft.com/office/powerpoint/2010/main" xmlns:p="http://schemas.openxmlformats.org/presentationml/2006/main" xmlns:r="http://schemas.openxmlformats.org/officeDocument/2006/relationships" xmlns:a="http://schemas.openxmlformats.org/drawingml/2006/main" xmlns="" val="1068611830"/>
       </p:ext>
     </p:extLst>
   </p:cSld>
@@ -6191,7 +7185,7 @@
 </p:sld>
 </file>
 
-<file path=ppt/slides/slide12.xml><?xml version="1.0" encoding="utf-8"?>
+<file path=ppt/slides/slide16.xml><?xml version="1.0" encoding="utf-8"?>
 <p:sld xmlns:a="http://schemas.openxmlformats.org/drawingml/2006/main" xmlns:r="http://schemas.openxmlformats.org/officeDocument/2006/relationships" xmlns:mc="http://schemas.openxmlformats.org/markup-compatibility/2006" xmlns:mv="urn:schemas-microsoft-com:mac:vml" xmlns:p="http://schemas.openxmlformats.org/presentationml/2006/main" mc:Ignorable="mv" mc:PreserveAttributes="mv:*">
   <p:cSld>
     <p:spTree>
@@ -6521,7 +7515,7 @@
 </p:sld>
 </file>
 
-<file path=ppt/slides/slide13.xml><?xml version="1.0" encoding="utf-8"?>
+<file path=ppt/slides/slide17.xml><?xml version="1.0" encoding="utf-8"?>
 <p:sld xmlns:a="http://schemas.openxmlformats.org/drawingml/2006/main" xmlns:r="http://schemas.openxmlformats.org/officeDocument/2006/relationships" xmlns:mc="http://schemas.openxmlformats.org/markup-compatibility/2006" xmlns:mv="urn:schemas-microsoft-com:mac:vml" xmlns:p="http://schemas.openxmlformats.org/presentationml/2006/main" mc:Ignorable="mv" mc:PreserveAttributes="mv:*">
   <p:cSld>
     <p:spTree>
@@ -6905,26 +7899,40 @@
             <a:pPr lvl="1"/>
             <a:r>
               <a:rPr lang="en-US" dirty="0" smtClean="0"/>
-              <a:t>Overview</a:t>
+              <a:t>Overview, structure, dependencies</a:t>
             </a:r>
           </a:p>
           <a:p>
             <a:pPr lvl="1"/>
             <a:r>
               <a:rPr lang="en-US" dirty="0" smtClean="0"/>
-              <a:t>Available middleware bindings</a:t>
-            </a:r>
-          </a:p>
-          <a:p>
-            <a:r>
-              <a:rPr lang="en-US" dirty="0" smtClean="0"/>
-              <a:t>The SAGA build-system</a:t>
-            </a:r>
-          </a:p>
-          <a:p>
-            <a:r>
-              <a:rPr lang="en-US" dirty="0" smtClean="0"/>
-              <a:t>Mephisto: the easy way out</a:t>
+              <a:t>Available</a:t>
+            </a:r>
+            <a:r>
+              <a:rPr lang="en-US" dirty="0" smtClean="0"/>
+              <a:t> middleware bindings</a:t>
+            </a:r>
+            <a:endParaRPr lang="en-US" dirty="0" smtClean="0"/>
+          </a:p>
+          <a:p>
+            <a:r>
+              <a:rPr lang="en-US" dirty="0" smtClean="0"/>
+              <a:t>The SAGA </a:t>
+            </a:r>
+            <a:r>
+              <a:rPr lang="en-US" dirty="0" smtClean="0"/>
+              <a:t>build system</a:t>
+            </a:r>
+            <a:endParaRPr lang="en-US" dirty="0" smtClean="0"/>
+          </a:p>
+          <a:p>
+            <a:r>
+              <a:rPr lang="en-US" dirty="0" smtClean="0"/>
+              <a:t>Mephisto:</a:t>
+            </a:r>
+            <a:r>
+              <a:rPr lang="en-US" dirty="0" smtClean="0"/>
+              <a:t> a SAGA deployment/testing tool</a:t>
             </a:r>
           </a:p>
           <a:p>
@@ -6953,12 +7961,14 @@
               <a:rPr lang="en-US" dirty="0" smtClean="0"/>
               <a:t>FutureGrid</a:t>
             </a:r>
-          </a:p>
-          <a:p>
-            <a:r>
-              <a:rPr lang="en-US" dirty="0" smtClean="0"/>
-              <a:t>Conclusion</a:t>
-            </a:r>
+            <a:endParaRPr lang="en-US" dirty="0" smtClean="0"/>
+          </a:p>
+          <a:p>
+            <a:r>
+              <a:rPr lang="en-US" dirty="0" smtClean="0"/>
+              <a:t>Outlook</a:t>
+            </a:r>
+            <a:endParaRPr lang="en-US" dirty="0" smtClean="0"/>
           </a:p>
         </p:txBody>
       </p:sp>
@@ -6967,6 +7977,13 @@
   <p:clrMapOvr>
     <a:masterClrMapping/>
   </p:clrMapOvr>
+  <p:timing>
+    <p:tnLst>
+      <p:par>
+        <p:cTn id="1" dur="indefinite" restart="never" nodeType="tmRoot"/>
+      </p:par>
+    </p:tnLst>
+  </p:timing>
 </p:sld>
 </file>
 
@@ -7004,7 +8021,7 @@
           <a:p>
             <a:r>
               <a:rPr lang="en-US" dirty="0" smtClean="0"/>
-              <a:t>Mephisto: The Easy Way Out</a:t>
+              <a:t>Overview | Structure | Dependencies </a:t>
             </a:r>
             <a:endParaRPr lang="en-US" dirty="0"/>
           </a:p>
@@ -7012,33 +8029,89 @@
       </p:sp>
       <p:pic>
         <p:nvPicPr>
-          <p:cNvPr id="6" name="Content Placeholder 3" descr="screenshot.png"/>
+          <p:cNvPr id="75" name="Picture 74" descr="saga-deps.pdf"/>
           <p:cNvPicPr>
-            <a:picLocks noGrp="1" noChangeAspect="1"/>
+            <a:picLocks noChangeAspect="1"/>
           </p:cNvPicPr>
-          <p:nvPr>
-            <p:ph idx="1"/>
-          </p:nvPr>
+          <p:nvPr/>
         </p:nvPicPr>
-        <p:blipFill>
-          <a:blip r:embed="rId2"/>
-          <a:srcRect l="-12297" r="-12297"/>
-          <a:stretch>
-            <a:fillRect/>
-          </a:stretch>
-        </p:blipFill>
+        <mc:AlternateContent>
+          <mc:Choice xmlns:ma="http://schemas.microsoft.com/office/mac/drawingml/2008/main" Requires="ma">
+            <p:blipFill>
+              <a:blip r:embed="rId2"/>
+              <a:stretch>
+                <a:fillRect/>
+              </a:stretch>
+            </p:blipFill>
+          </mc:Choice>
+          <mc:Fallback>
+            <p:blipFill>
+              <a:blip r:embed="rId3"/>
+              <a:stretch>
+                <a:fillRect/>
+              </a:stretch>
+            </p:blipFill>
+          </mc:Fallback>
+        </mc:AlternateContent>
         <p:spPr>
           <a:xfrm>
-            <a:off x="10602" y="1904613"/>
-            <a:ext cx="9133398" cy="4974379"/>
+            <a:off x="811213" y="2368550"/>
+            <a:ext cx="7621587" cy="4019287"/>
           </a:xfrm>
+          <a:prstGeom prst="rect">
+            <a:avLst/>
+          </a:prstGeom>
         </p:spPr>
       </p:pic>
+      <p:sp>
+        <p:nvSpPr>
+          <p:cNvPr id="76" name="Rectangle 75"/>
+          <p:cNvSpPr/>
+          <p:nvPr/>
+        </p:nvSpPr>
+        <p:spPr>
+          <a:xfrm>
+            <a:off x="2995612" y="1923018"/>
+            <a:ext cx="7837487" cy="369332"/>
+          </a:xfrm>
+          <a:prstGeom prst="rect">
+            <a:avLst/>
+          </a:prstGeom>
+        </p:spPr>
+        <p:txBody>
+          <a:bodyPr wrap="square">
+            <a:spAutoFit/>
+          </a:bodyPr>
+          <a:lstStyle/>
+          <a:p>
+            <a:r>
+              <a:rPr lang="en-US" b="1" dirty="0" smtClean="0">
+                <a:solidFill>
+                  <a:srgbClr val="595959"/>
+                </a:solidFill>
+              </a:rPr>
+              <a:t>http://saga.cct.lsu.edu/software/cpp/download</a:t>
+            </a:r>
+            <a:endParaRPr lang="en-US" b="1" dirty="0">
+              <a:solidFill>
+                <a:srgbClr val="595959"/>
+              </a:solidFill>
+            </a:endParaRPr>
+          </a:p>
+        </p:txBody>
+      </p:sp>
     </p:spTree>
   </p:cSld>
   <p:clrMapOvr>
     <a:masterClrMapping/>
   </p:clrMapOvr>
+  <p:timing>
+    <p:tnLst>
+      <p:par>
+        <p:cTn id="1" dur="indefinite" restart="never" nodeType="tmRoot"/>
+      </p:par>
+    </p:tnLst>
+  </p:timing>
 </p:sld>
 </file>
 
@@ -7076,7 +8149,15 @@
           <a:p>
             <a:r>
               <a:rPr lang="en-US" dirty="0" smtClean="0"/>
-              <a:t>Installation</a:t>
+              <a:t>Available Middleware Bindings (</a:t>
+            </a:r>
+            <a:r>
+              <a:rPr lang="en-US" i="1" dirty="0" smtClean="0"/>
+              <a:t>Adaptors</a:t>
+            </a:r>
+            <a:r>
+              <a:rPr lang="en-US" dirty="0" smtClean="0"/>
+              <a:t>)</a:t>
             </a:r>
             <a:endParaRPr lang="en-US" dirty="0"/>
           </a:p>
@@ -7094,109 +8175,138 @@
         </p:nvSpPr>
         <p:spPr/>
         <p:txBody>
-          <a:bodyPr>
-            <a:normAutofit/>
-          </a:bodyPr>
+          <a:bodyPr/>
           <a:lstStyle/>
           <a:p>
             <a:r>
               <a:rPr lang="en-US" dirty="0" smtClean="0"/>
-              <a:t>SAGA consists of several components that can be installed on demand and separately:</a:t>
-            </a:r>
-          </a:p>
-          <a:p>
-            <a:pPr lvl="1"/>
-            <a:r>
-              <a:rPr lang="en-US" b="1" i="1" dirty="0" smtClean="0"/>
-              <a:t>Core Components </a:t>
-            </a:r>
-            <a:r>
-              <a:rPr lang="en-US" dirty="0" smtClean="0"/>
-              <a:t>(required)</a:t>
-            </a:r>
-            <a:endParaRPr lang="en-US" b="1" i="1" dirty="0" smtClean="0"/>
-          </a:p>
-          <a:p>
-            <a:pPr lvl="2"/>
-            <a:r>
-              <a:rPr lang="en-US" dirty="0" smtClean="0"/>
-              <a:t>Also contains the default adaptors (local files, local jobs </a:t>
-            </a:r>
-            <a:br>
-              <a:rPr lang="en-US" dirty="0" smtClean="0"/>
-            </a:br>
-            <a:r>
-              <a:rPr lang="en-US" dirty="0" smtClean="0"/>
-              <a:t>and SQL-based advert and replica adaptors) </a:t>
-            </a:r>
-          </a:p>
-          <a:p>
-            <a:pPr lvl="1"/>
-            <a:r>
-              <a:rPr lang="en-US" b="1" i="1" dirty="0" smtClean="0"/>
-              <a:t>Python Language Bindings </a:t>
-            </a:r>
-            <a:r>
-              <a:rPr lang="en-US" dirty="0" smtClean="0"/>
-              <a:t>(optional)</a:t>
-            </a:r>
-          </a:p>
-          <a:p>
-            <a:pPr lvl="1"/>
-            <a:r>
-              <a:rPr lang="en-US" b="1" i="1" dirty="0" smtClean="0"/>
-              <a:t>Adaptors </a:t>
-            </a:r>
-            <a:r>
-              <a:rPr lang="en-US" dirty="0" smtClean="0"/>
-              <a:t>(optional)</a:t>
-            </a:r>
-            <a:endParaRPr lang="en-US" b="1" i="1" dirty="0" smtClean="0"/>
-          </a:p>
-          <a:p>
-            <a:pPr lvl="2"/>
+              <a:t>saga-adaptors-</a:t>
+            </a:r>
+            <a:r>
+              <a:rPr lang="en-US" b="1" dirty="0" smtClean="0"/>
+              <a:t>default </a:t>
+            </a:r>
+            <a:r>
+              <a:rPr lang="en-US" dirty="0" smtClean="0"/>
+              <a:t>(fork, local </a:t>
+            </a:r>
             <a:r>
               <a:rPr lang="en-US" dirty="0" err="1" smtClean="0"/>
-              <a:t>Globus</a:t>
-            </a:r>
-            <a:r>
-              <a:rPr lang="en-US" dirty="0" smtClean="0"/>
-              <a:t>, LSF, </a:t>
+              <a:t>fs</a:t>
+            </a:r>
+            <a:r>
+              <a:rPr lang="en-US" dirty="0" smtClean="0"/>
+              <a:t>, SQL advert &amp; replica)</a:t>
+            </a:r>
+          </a:p>
+          <a:p>
+            <a:r>
+              <a:rPr lang="en-US" dirty="0" smtClean="0"/>
+              <a:t>saga-adaptors-</a:t>
+            </a:r>
+            <a:r>
+              <a:rPr lang="en-US" b="1" dirty="0" err="1" smtClean="0"/>
+              <a:t>ssh</a:t>
+            </a:r>
+            <a:r>
+              <a:rPr lang="en-US" b="1" dirty="0" smtClean="0"/>
+              <a:t> </a:t>
+            </a:r>
+            <a:r>
+              <a:rPr lang="en-US" dirty="0" smtClean="0"/>
+              <a:t>(</a:t>
             </a:r>
             <a:r>
               <a:rPr lang="en-US" dirty="0" err="1" smtClean="0"/>
-              <a:t>gLite</a:t>
-            </a:r>
-            <a:r>
-              <a:rPr lang="en-US" dirty="0" smtClean="0"/>
-              <a:t>, SSH, Cloud, …</a:t>
-            </a:r>
-          </a:p>
-          <a:p>
-            <a:r>
-              <a:rPr lang="en-US" dirty="0" smtClean="0"/>
-              <a:t>The latest versions of all components can be downloaded from the SAGA website: </a:t>
-            </a:r>
-            <a:r>
-              <a:rPr lang="en-US" dirty="0" smtClean="0">
-                <a:hlinkClick r:id="rId2"/>
-              </a:rPr>
-              <a:t>http://saga.cct.lsu.edu/</a:t>
-            </a:r>
-            <a:endParaRPr lang="en-US" dirty="0" smtClean="0"/>
-          </a:p>
-          <a:p>
-            <a:r>
-              <a:rPr lang="en-US" dirty="0" smtClean="0"/>
-              <a:t>SVN: </a:t>
-            </a:r>
-            <a:r>
-              <a:rPr lang="en-US" dirty="0" smtClean="0">
-                <a:hlinkClick r:id="rId3"/>
-              </a:rPr>
-              <a:t>https://svn.cct.lsu.edu/repos/saga/</a:t>
-            </a:r>
-            <a:endParaRPr lang="en-US" dirty="0" smtClean="0"/>
+              <a:t>ssh</a:t>
+            </a:r>
+            <a:r>
+              <a:rPr lang="en-US" dirty="0" smtClean="0"/>
+              <a:t> job 'submission and </a:t>
+            </a:r>
+            <a:r>
+              <a:rPr lang="en-US" dirty="0" err="1" smtClean="0"/>
+              <a:t>fs</a:t>
+            </a:r>
+            <a:r>
+              <a:rPr lang="en-US" dirty="0" smtClean="0"/>
+              <a:t> ops via FUSE)</a:t>
+            </a:r>
+            <a:endParaRPr lang="en-US" b="1" dirty="0" smtClean="0"/>
+          </a:p>
+          <a:p>
+            <a:r>
+              <a:rPr lang="en-US" dirty="0" smtClean="0"/>
+              <a:t>saga-adaptors-</a:t>
+            </a:r>
+            <a:r>
+              <a:rPr lang="en-US" b="1" dirty="0" smtClean="0"/>
+              <a:t>x509 </a:t>
+            </a:r>
+            <a:r>
+              <a:rPr lang="en-US" dirty="0" smtClean="0"/>
+              <a:t>(x509 security context)</a:t>
+            </a:r>
+          </a:p>
+          <a:p>
+            <a:r>
+              <a:rPr lang="en-US" dirty="0" smtClean="0"/>
+              <a:t>saga-adaptors-</a:t>
+            </a:r>
+            <a:r>
+              <a:rPr lang="en-US" b="1" dirty="0" err="1" smtClean="0"/>
+              <a:t>globus</a:t>
+            </a:r>
+            <a:r>
+              <a:rPr lang="en-US" b="1" dirty="0" smtClean="0"/>
+              <a:t> </a:t>
+            </a:r>
+            <a:r>
+              <a:rPr lang="en-US" dirty="0" smtClean="0"/>
+              <a:t>(GRAM2/5, </a:t>
+            </a:r>
+            <a:r>
+              <a:rPr lang="en-US" dirty="0" err="1" smtClean="0"/>
+              <a:t>GridFTP</a:t>
+            </a:r>
+            <a:r>
+              <a:rPr lang="en-US" dirty="0" smtClean="0"/>
+              <a:t>, RLS)</a:t>
+            </a:r>
+          </a:p>
+          <a:p>
+            <a:r>
+              <a:rPr lang="en-US" dirty="0" smtClean="0"/>
+              <a:t>saga-adaptors-</a:t>
+            </a:r>
+            <a:r>
+              <a:rPr lang="en-US" b="1" dirty="0" smtClean="0"/>
+              <a:t>condor </a:t>
+            </a:r>
+            <a:r>
+              <a:rPr lang="en-US" dirty="0" smtClean="0"/>
+              <a:t>Condor jobs)</a:t>
+            </a:r>
+            <a:endParaRPr lang="en-US" b="1" dirty="0" smtClean="0"/>
+          </a:p>
+          <a:p>
+            <a:r>
+              <a:rPr lang="en-US" dirty="0" smtClean="0"/>
+              <a:t>saga-adaptors-</a:t>
+            </a:r>
+            <a:r>
+              <a:rPr lang="en-US" b="1" dirty="0" err="1" smtClean="0"/>
+              <a:t>lsf</a:t>
+            </a:r>
+            <a:r>
+              <a:rPr lang="en-US" b="1" dirty="0" smtClean="0"/>
+              <a:t> </a:t>
+            </a:r>
+            <a:r>
+              <a:rPr lang="en-US" dirty="0" smtClean="0"/>
+              <a:t>(Platform LSF jobs)</a:t>
+            </a:r>
+            <a:endParaRPr lang="en-US" dirty="0"/>
           </a:p>
         </p:txBody>
       </p:sp>
@@ -7242,7 +8352,7 @@
           <a:p>
             <a:r>
               <a:rPr lang="en-US" dirty="0" smtClean="0"/>
-              <a:t>Latest Available Components / Adaptors</a:t>
+              <a:t>Available Adaptors (cont.)  </a:t>
             </a:r>
             <a:endParaRPr lang="en-US" dirty="0"/>
           </a:p>
@@ -7260,425 +8370,222 @@
         </p:nvSpPr>
         <p:spPr/>
         <p:txBody>
-          <a:bodyPr>
-            <a:normAutofit/>
-          </a:bodyPr>
+          <a:bodyPr/>
           <a:lstStyle/>
           <a:p>
             <a:r>
               <a:rPr lang="en-US" dirty="0" smtClean="0"/>
-              <a:t>TODO</a:t>
-            </a:r>
-          </a:p>
-        </p:txBody>
-      </p:sp>
-      <p:sp>
-        <p:nvSpPr>
-          <p:cNvPr id="4" name="Rectangle 3"/>
-          <p:cNvSpPr/>
-          <p:nvPr/>
-        </p:nvSpPr>
-        <p:spPr>
-          <a:xfrm>
-            <a:off x="236799" y="1817641"/>
-            <a:ext cx="8677014" cy="5632312"/>
-          </a:xfrm>
-          <a:prstGeom prst="rect">
-            <a:avLst/>
-          </a:prstGeom>
-        </p:spPr>
-        <p:txBody>
-          <a:bodyPr wrap="square">
-            <a:spAutoFit/>
-          </a:bodyPr>
-          <a:lstStyle/>
-          <a:p>
+              <a:t>saga-adaptors-</a:t>
+            </a:r>
+            <a:r>
+              <a:rPr lang="en-US" b="1" dirty="0" err="1" smtClean="0"/>
+              <a:t>aws</a:t>
+            </a:r>
             <a:r>
               <a:rPr lang="en-US" b="1" dirty="0" smtClean="0"/>
-              <a:t>Adaptor Name	SAGA Package	Requirements	</a:t>
-            </a:r>
-          </a:p>
-          <a:p>
-            <a:r>
-              <a:rPr lang="en-US" dirty="0" smtClean="0"/>
-              <a:t>AWS/EC2	</a:t>
+              <a:t> </a:t>
+            </a:r>
+            <a:r>
+              <a:rPr lang="en-US" dirty="0" smtClean="0"/>
+              <a:t>(Amazon EC2, </a:t>
+            </a:r>
+            <a:r>
+              <a:rPr lang="en-US" i="1" dirty="0" smtClean="0"/>
+              <a:t>about to be released</a:t>
+            </a:r>
+            <a:r>
+              <a:rPr lang="en-US" dirty="0" smtClean="0"/>
+              <a:t>)</a:t>
+            </a:r>
+          </a:p>
+          <a:p>
+            <a:r>
+              <a:rPr lang="en-US" dirty="0" smtClean="0"/>
+              <a:t>saga-adaptors-</a:t>
+            </a:r>
+            <a:r>
+              <a:rPr lang="en-US" b="1" dirty="0" err="1" smtClean="0"/>
+              <a:t>hdfs</a:t>
+            </a:r>
+            <a:r>
+              <a:rPr lang="en-US" b="1" dirty="0" smtClean="0"/>
+              <a:t> </a:t>
+            </a:r>
+            <a:r>
+              <a:rPr lang="en-US" dirty="0" smtClean="0"/>
+              <a:t>(</a:t>
             </a:r>
             <a:r>
               <a:rPr lang="en-US" dirty="0" err="1" smtClean="0"/>
-              <a:t>saga::job</a:t>
-            </a:r>
-            <a:r>
-              <a:rPr lang="en-US" dirty="0" smtClean="0"/>
-              <a:t>	Amazon EC2 API tools	</a:t>
-            </a:r>
-          </a:p>
-          <a:p>
-            <a:r>
-              <a:rPr lang="en-US" dirty="0" smtClean="0"/>
-              <a:t>Condor	</a:t>
-            </a:r>
-            <a:r>
-              <a:rPr lang="en-US" dirty="0" err="1" smtClean="0"/>
-              <a:t>saga::job</a:t>
-            </a:r>
-            <a:r>
-              <a:rPr lang="en-US" dirty="0" smtClean="0"/>
-              <a:t>	Condor cmd. line tools	</a:t>
-            </a:r>
-          </a:p>
-          <a:p>
-            <a:r>
-              <a:rPr lang="en-US" dirty="0" smtClean="0"/>
-              <a:t>Local (Fork) Exec	</a:t>
-            </a:r>
-            <a:r>
-              <a:rPr lang="en-US" dirty="0" err="1" smtClean="0"/>
-              <a:t>saga::job</a:t>
-            </a:r>
-            <a:r>
-              <a:rPr lang="en-US" dirty="0" smtClean="0"/>
-              <a:t>	-	</a:t>
-            </a:r>
-          </a:p>
-          <a:p>
-            <a:r>
-              <a:rPr lang="en-US" dirty="0" smtClean="0"/>
-              <a:t>Local Files	</a:t>
-            </a:r>
-            <a:r>
-              <a:rPr lang="en-US" dirty="0" err="1" smtClean="0"/>
-              <a:t>saga::file</a:t>
-            </a:r>
-            <a:r>
-              <a:rPr lang="en-US" dirty="0" smtClean="0"/>
-              <a:t>	-	</a:t>
-            </a:r>
-          </a:p>
-          <a:p>
-            <a:r>
-              <a:rPr lang="en-US" dirty="0" err="1" smtClean="0"/>
-              <a:t>PostgreSQL</a:t>
-            </a:r>
-            <a:r>
-              <a:rPr lang="en-US" dirty="0" smtClean="0"/>
-              <a:t> 	</a:t>
-            </a:r>
-            <a:r>
-              <a:rPr lang="en-US" dirty="0" err="1" smtClean="0"/>
-              <a:t>saga::advert</a:t>
-            </a:r>
-            <a:r>
-              <a:rPr lang="en-US" dirty="0" smtClean="0"/>
-              <a:t>	</a:t>
-            </a:r>
-            <a:r>
-              <a:rPr lang="en-US" dirty="0" err="1" smtClean="0"/>
-              <a:t>postgresql</a:t>
-            </a:r>
-            <a:r>
-              <a:rPr lang="en-US" dirty="0" smtClean="0"/>
-              <a:t> client libraries	</a:t>
-            </a:r>
-          </a:p>
-          <a:p>
-            <a:r>
-              <a:rPr lang="en-US" dirty="0" err="1" smtClean="0"/>
-              <a:t>PostgreSQL</a:t>
-            </a:r>
-            <a:r>
-              <a:rPr lang="en-US" dirty="0" smtClean="0"/>
-              <a:t> 	</a:t>
-            </a:r>
-            <a:r>
-              <a:rPr lang="en-US" dirty="0" err="1" smtClean="0"/>
-              <a:t>saga::replica</a:t>
-            </a:r>
-            <a:r>
-              <a:rPr lang="en-US" dirty="0" smtClean="0"/>
-              <a:t>	</a:t>
-            </a:r>
-            <a:r>
-              <a:rPr lang="en-US" dirty="0" err="1" smtClean="0"/>
-              <a:t>postgresql</a:t>
-            </a:r>
-            <a:r>
-              <a:rPr lang="en-US" dirty="0" smtClean="0"/>
-              <a:t> client libraries	</a:t>
-            </a:r>
-          </a:p>
-          <a:p>
-            <a:r>
-              <a:rPr lang="en-US" dirty="0" smtClean="0"/>
-              <a:t>SQLite3	</a:t>
-            </a:r>
-            <a:r>
-              <a:rPr lang="en-US" dirty="0" err="1" smtClean="0"/>
-              <a:t>saga::advert</a:t>
-            </a:r>
-            <a:r>
-              <a:rPr lang="en-US" dirty="0" smtClean="0"/>
-              <a:t>	sqlite3 client libraries	</a:t>
-            </a:r>
-          </a:p>
-          <a:p>
-            <a:r>
-              <a:rPr lang="en-US" dirty="0" smtClean="0"/>
-              <a:t>SQLite3 	</a:t>
-            </a:r>
-            <a:r>
-              <a:rPr lang="en-US" dirty="0" err="1" smtClean="0"/>
-              <a:t>saga::replica</a:t>
-            </a:r>
-            <a:r>
-              <a:rPr lang="en-US" dirty="0" smtClean="0"/>
-              <a:t>	sqlite3 client libraries	</a:t>
-            </a:r>
-          </a:p>
-          <a:p>
+              <a:t>Hadoop</a:t>
+            </a:r>
+            <a:r>
+              <a:rPr lang="en-US" dirty="0" smtClean="0"/>
+              <a:t> file </a:t>
+            </a:r>
+            <a:r>
+              <a:rPr lang="en-US" dirty="0" smtClean="0"/>
+              <a:t>op., </a:t>
+            </a:r>
+            <a:r>
+              <a:rPr lang="en-US" i="1" dirty="0" smtClean="0"/>
+              <a:t>about to be rel.</a:t>
+            </a:r>
+            <a:r>
+              <a:rPr lang="en-US" dirty="0" smtClean="0"/>
+              <a:t>)</a:t>
+            </a:r>
+          </a:p>
+          <a:p>
+            <a:r>
+              <a:rPr lang="en-US" dirty="0" smtClean="0"/>
+              <a:t>saga-adaptors-</a:t>
+            </a:r>
+            <a:r>
+              <a:rPr lang="en-US" b="1" dirty="0" err="1" smtClean="0"/>
+              <a:t>glite</a:t>
+            </a:r>
+            <a:r>
+              <a:rPr lang="en-US" b="1" dirty="0" smtClean="0"/>
+              <a:t> </a:t>
+            </a:r>
+            <a:r>
+              <a:rPr lang="en-US" dirty="0" smtClean="0"/>
+              <a:t>(</a:t>
+            </a:r>
             <a:r>
               <a:rPr lang="en-US" dirty="0" err="1" smtClean="0"/>
               <a:t>gLite</a:t>
             </a:r>
             <a:r>
               <a:rPr lang="en-US" dirty="0" smtClean="0"/>
-              <a:t> Cream	</a:t>
+              <a:t>-CREAM jobs, </a:t>
+            </a:r>
+            <a:r>
+              <a:rPr lang="en-US" i="1" dirty="0" smtClean="0"/>
+              <a:t>experimental</a:t>
+            </a:r>
+            <a:r>
+              <a:rPr lang="en-US" dirty="0" smtClean="0"/>
+              <a:t>)</a:t>
+            </a:r>
+          </a:p>
+          <a:p>
+            <a:r>
+              <a:rPr lang="en-US" dirty="0" smtClean="0"/>
+              <a:t>saga-adaptors-</a:t>
+            </a:r>
+            <a:r>
+              <a:rPr lang="en-US" b="1" dirty="0" err="1" smtClean="0"/>
+              <a:t>pbspro</a:t>
+            </a:r>
+            <a:r>
+              <a:rPr lang="en-US" b="1" dirty="0" smtClean="0"/>
+              <a:t> </a:t>
+            </a:r>
+            <a:r>
+              <a:rPr lang="en-US" dirty="0" smtClean="0"/>
+              <a:t>(PBS Pro jobs, </a:t>
+            </a:r>
+            <a:r>
+              <a:rPr lang="en-US" i="1" dirty="0" smtClean="0"/>
+              <a:t>under review</a:t>
+            </a:r>
+            <a:r>
+              <a:rPr lang="en-US" dirty="0" smtClean="0"/>
+              <a:t>) </a:t>
+            </a:r>
+          </a:p>
+          <a:p>
+            <a:r>
+              <a:rPr lang="en-US" dirty="0" smtClean="0"/>
+              <a:t>saga-adaptors-</a:t>
+            </a:r>
+            <a:r>
+              <a:rPr lang="en-US" b="1" dirty="0" smtClean="0"/>
+              <a:t>torque </a:t>
+            </a:r>
+            <a:r>
+              <a:rPr lang="en-US" dirty="0" smtClean="0"/>
+              <a:t>(Torque jobs, </a:t>
+            </a:r>
+            <a:r>
+              <a:rPr lang="en-US" i="1" dirty="0" smtClean="0"/>
+              <a:t>under review</a:t>
+            </a:r>
+            <a:r>
+              <a:rPr lang="en-US" dirty="0" smtClean="0"/>
+              <a:t>) </a:t>
+            </a:r>
+          </a:p>
+          <a:p>
+            <a:r>
+              <a:rPr lang="en-US" dirty="0" smtClean="0"/>
+              <a:t>saga-adaptors-</a:t>
+            </a:r>
+            <a:r>
+              <a:rPr lang="en-US" b="1" dirty="0" err="1" smtClean="0"/>
+              <a:t>ogf</a:t>
+            </a:r>
+            <a:r>
+              <a:rPr lang="en-US" b="1" dirty="0" smtClean="0"/>
+              <a:t> </a:t>
+            </a:r>
+            <a:r>
+              <a:rPr lang="en-US" dirty="0" smtClean="0"/>
+              <a:t>(</a:t>
             </a:r>
             <a:r>
               <a:rPr lang="en-US" dirty="0" err="1" smtClean="0"/>
-              <a:t>saga::job</a:t>
-            </a:r>
-            <a:r>
-              <a:rPr lang="en-US" dirty="0" smtClean="0"/>
-              <a:t>	</a:t>
-            </a:r>
-            <a:r>
-              <a:rPr lang="en-US" dirty="0" err="1" smtClean="0"/>
-              <a:t>gLite</a:t>
-            </a:r>
-            <a:r>
-              <a:rPr lang="en-US" dirty="0" smtClean="0"/>
-              <a:t> Cream client-side libraries	</a:t>
-            </a:r>
-          </a:p>
-          <a:p>
-            <a:r>
-              <a:rPr lang="en-US" dirty="0" err="1" smtClean="0"/>
-              <a:t>Globus</a:t>
-            </a:r>
-            <a:r>
-              <a:rPr lang="en-US" dirty="0" smtClean="0"/>
-              <a:t> GRAM2 / GRAM5	</a:t>
-            </a:r>
-            <a:r>
-              <a:rPr lang="en-US" dirty="0" err="1" smtClean="0"/>
-              <a:t>saga::job</a:t>
-            </a:r>
-            <a:r>
-              <a:rPr lang="en-US" dirty="0" smtClean="0"/>
-              <a:t>	</a:t>
-            </a:r>
-            <a:r>
-              <a:rPr lang="en-US" dirty="0" err="1" smtClean="0"/>
-              <a:t>Globus</a:t>
-            </a:r>
-            <a:r>
-              <a:rPr lang="en-US" dirty="0" smtClean="0"/>
-              <a:t> Toolkit &gt;= 4.x	</a:t>
-            </a:r>
-          </a:p>
-          <a:p>
-            <a:r>
-              <a:rPr lang="en-US" dirty="0" err="1" smtClean="0"/>
-              <a:t>Globus</a:t>
-            </a:r>
-            <a:r>
-              <a:rPr lang="en-US" dirty="0" smtClean="0"/>
-              <a:t> </a:t>
-            </a:r>
-            <a:r>
-              <a:rPr lang="en-US" dirty="0" err="1" smtClean="0"/>
-              <a:t>GridFTP</a:t>
-            </a:r>
-            <a:r>
-              <a:rPr lang="en-US" dirty="0" smtClean="0"/>
-              <a:t>	</a:t>
-            </a:r>
-            <a:r>
-              <a:rPr lang="en-US" dirty="0" err="1" smtClean="0"/>
-              <a:t>saga::file</a:t>
-            </a:r>
-            <a:r>
-              <a:rPr lang="en-US" dirty="0" smtClean="0"/>
-              <a:t>	</a:t>
-            </a:r>
-            <a:r>
-              <a:rPr lang="en-US" dirty="0" err="1" smtClean="0"/>
-              <a:t>Globus</a:t>
-            </a:r>
-            <a:r>
-              <a:rPr lang="en-US" dirty="0" smtClean="0"/>
-              <a:t> Toolkit &gt;= 4.x	</a:t>
-            </a:r>
-          </a:p>
-          <a:p>
-            <a:r>
-              <a:rPr lang="en-US" dirty="0" err="1" smtClean="0"/>
-              <a:t>Globus</a:t>
-            </a:r>
-            <a:r>
-              <a:rPr lang="en-US" dirty="0" smtClean="0"/>
-              <a:t> RLS	</a:t>
-            </a:r>
-            <a:r>
-              <a:rPr lang="en-US" dirty="0" err="1" smtClean="0"/>
-              <a:t>saga::replica</a:t>
-            </a:r>
-            <a:r>
-              <a:rPr lang="en-US" dirty="0" smtClean="0"/>
-              <a:t>	</a:t>
-            </a:r>
-            <a:r>
-              <a:rPr lang="en-US" dirty="0" err="1" smtClean="0"/>
-              <a:t>Globus</a:t>
-            </a:r>
-            <a:r>
-              <a:rPr lang="en-US" dirty="0" smtClean="0"/>
-              <a:t> Toolkit &gt;= 4.x	</a:t>
-            </a:r>
-          </a:p>
-          <a:p>
-            <a:r>
-              <a:rPr lang="en-US" dirty="0" err="1" smtClean="0"/>
-              <a:t>GridSAM</a:t>
-            </a:r>
-            <a:r>
-              <a:rPr lang="en-US" dirty="0" smtClean="0"/>
-              <a:t>	</a:t>
-            </a:r>
-            <a:r>
-              <a:rPr lang="en-US" dirty="0" err="1" smtClean="0"/>
-              <a:t>saga::job</a:t>
-            </a:r>
-            <a:r>
-              <a:rPr lang="en-US" dirty="0" smtClean="0"/>
-              <a:t>	</a:t>
-            </a:r>
-            <a:r>
-              <a:rPr lang="en-US" dirty="0" err="1" smtClean="0"/>
-              <a:t>OpenSSL</a:t>
-            </a:r>
-            <a:r>
-              <a:rPr lang="en-US" dirty="0" smtClean="0"/>
-              <a:t>	</a:t>
-            </a:r>
-          </a:p>
-          <a:p>
-            <a:r>
-              <a:rPr lang="en-US" dirty="0" smtClean="0"/>
-              <a:t>Platform LSF	</a:t>
-            </a:r>
-            <a:r>
-              <a:rPr lang="en-US" dirty="0" err="1" smtClean="0"/>
-              <a:t>saga::job</a:t>
-            </a:r>
-            <a:r>
-              <a:rPr lang="en-US" dirty="0" smtClean="0"/>
-              <a:t>	LSF cmd. line tools	</a:t>
-            </a:r>
-          </a:p>
-          <a:p>
-            <a:r>
-              <a:rPr lang="en-US" dirty="0" smtClean="0"/>
-              <a:t>NAREGI	</a:t>
-            </a:r>
-            <a:r>
-              <a:rPr lang="en-US" dirty="0" err="1" smtClean="0"/>
-              <a:t>saga::job</a:t>
-            </a:r>
-            <a:r>
-              <a:rPr lang="en-US" dirty="0" smtClean="0"/>
-              <a:t>	NAREGI cmd. line tools	</a:t>
-            </a:r>
-          </a:p>
-          <a:p>
-            <a:r>
-              <a:rPr lang="en-US" dirty="0" smtClean="0"/>
-              <a:t>PBS Pro	</a:t>
-            </a:r>
-            <a:r>
-              <a:rPr lang="en-US" dirty="0" err="1" smtClean="0"/>
-              <a:t>saga::job</a:t>
-            </a:r>
-            <a:r>
-              <a:rPr lang="en-US" dirty="0" smtClean="0"/>
-              <a:t>	PBS cmd. line tools	</a:t>
-            </a:r>
-          </a:p>
-          <a:p>
-            <a:r>
-              <a:rPr lang="en-US" dirty="0" smtClean="0"/>
-              <a:t>SSH 	</a:t>
-            </a:r>
-            <a:r>
-              <a:rPr lang="en-US" dirty="0" err="1" smtClean="0"/>
-              <a:t>saga::job</a:t>
-            </a:r>
-            <a:r>
-              <a:rPr lang="en-US" dirty="0" smtClean="0"/>
-              <a:t>	</a:t>
-            </a:r>
-            <a:r>
-              <a:rPr lang="en-US" dirty="0" err="1" smtClean="0"/>
-              <a:t>ssh</a:t>
-            </a:r>
-            <a:r>
-              <a:rPr lang="en-US" dirty="0" smtClean="0"/>
-              <a:t> </a:t>
-            </a:r>
-            <a:r>
-              <a:rPr lang="en-US" dirty="0" err="1" smtClean="0"/>
-              <a:t>libs</a:t>
-            </a:r>
-            <a:r>
-              <a:rPr lang="en-US" dirty="0" smtClean="0"/>
-              <a:t>	</a:t>
-            </a:r>
-          </a:p>
-          <a:p>
-            <a:r>
-              <a:rPr lang="en-US" dirty="0" smtClean="0"/>
-              <a:t>SCP	</a:t>
-            </a:r>
-            <a:r>
-              <a:rPr lang="en-US" dirty="0" err="1" smtClean="0"/>
-              <a:t>saga::file</a:t>
-            </a:r>
-            <a:r>
-              <a:rPr lang="en-US" dirty="0" smtClean="0"/>
-              <a:t>	fuse </a:t>
-            </a:r>
-            <a:r>
-              <a:rPr lang="en-US" dirty="0" err="1" smtClean="0"/>
-              <a:t>libs</a:t>
-            </a:r>
-            <a:r>
-              <a:rPr lang="en-US" dirty="0" smtClean="0"/>
-              <a:t>	</a:t>
-            </a:r>
-          </a:p>
-          <a:p>
-            <a:r>
-              <a:rPr lang="en-US" dirty="0" smtClean="0"/>
-              <a:t>Torque	</a:t>
-            </a:r>
-            <a:r>
-              <a:rPr lang="en-US" dirty="0" err="1" smtClean="0"/>
-              <a:t>saga::job</a:t>
-            </a:r>
-            <a:r>
-              <a:rPr lang="en-US" dirty="0" smtClean="0"/>
-              <a:t>	torque cmd. line tools	</a:t>
-            </a:r>
+              <a:t>hpc-bp</a:t>
+            </a:r>
+            <a:r>
+              <a:rPr lang="en-US" dirty="0" smtClean="0"/>
+              <a:t> support, experimental) </a:t>
+            </a:r>
+          </a:p>
+          <a:p>
+            <a:r>
+              <a:rPr lang="en-US" dirty="0" smtClean="0"/>
+              <a:t>… and: </a:t>
+            </a:r>
+            <a:r>
+              <a:rPr lang="en-US" b="1" dirty="0" err="1" smtClean="0"/>
+              <a:t>htable</a:t>
+            </a:r>
+            <a:r>
+              <a:rPr lang="en-US" b="1" dirty="0" smtClean="0"/>
+              <a:t>, </a:t>
+            </a:r>
+            <a:r>
+              <a:rPr lang="en-US" b="1" dirty="0" err="1" smtClean="0"/>
+              <a:t>kfs</a:t>
+            </a:r>
+            <a:r>
+              <a:rPr lang="en-US" b="1" dirty="0" smtClean="0"/>
+              <a:t>, </a:t>
+            </a:r>
+            <a:r>
+              <a:rPr lang="en-US" b="1" dirty="0" err="1" smtClean="0"/>
+              <a:t>naregi</a:t>
+            </a:r>
+            <a:r>
+              <a:rPr lang="en-US" b="1" dirty="0" smtClean="0"/>
+              <a:t>, </a:t>
+            </a:r>
+            <a:r>
+              <a:rPr lang="en-US" b="1" dirty="0" err="1" smtClean="0"/>
+              <a:t>ninfG</a:t>
+            </a:r>
+            <a:r>
+              <a:rPr lang="en-US" b="1" dirty="0" smtClean="0"/>
+              <a:t>, </a:t>
+            </a:r>
+            <a:r>
+              <a:rPr lang="en-US" b="1" dirty="0" err="1" smtClean="0"/>
+              <a:t>opencloud</a:t>
+            </a:r>
+            <a:endParaRPr lang="en-US" b="1" dirty="0" smtClean="0"/>
           </a:p>
         </p:txBody>
       </p:sp>
@@ -7724,7 +8631,7 @@
           <a:p>
             <a:r>
               <a:rPr lang="en-US" dirty="0" smtClean="0"/>
-              <a:t>Installation</a:t>
+              <a:t>SAGA’s Build System</a:t>
             </a:r>
             <a:endParaRPr lang="en-US" dirty="0"/>
           </a:p>
@@ -7745,100 +8652,7 @@
           <a:bodyPr/>
           <a:lstStyle/>
           <a:p>
-            <a:r>
-              <a:rPr lang="en-US" dirty="0" smtClean="0"/>
-              <a:t>SAGA is written in C++ and a little bit of Python. To build and install it, you’ll need at least:</a:t>
-            </a:r>
-          </a:p>
-          <a:p>
-            <a:pPr lvl="1"/>
-            <a:r>
-              <a:rPr lang="en-US" dirty="0" smtClean="0"/>
-              <a:t>C++ compiler and library</a:t>
-            </a:r>
-          </a:p>
-          <a:p>
-            <a:pPr lvl="1"/>
-            <a:r>
-              <a:rPr lang="en-US" dirty="0" smtClean="0"/>
-              <a:t>make tools</a:t>
-            </a:r>
-          </a:p>
-          <a:p>
-            <a:pPr lvl="1"/>
-            <a:r>
-              <a:rPr lang="en-US" dirty="0" smtClean="0"/>
-              <a:t>Python (optional)</a:t>
-            </a:r>
-          </a:p>
-          <a:p>
-            <a:r>
-              <a:rPr lang="en-US" dirty="0" smtClean="0"/>
-              <a:t>All SAGA components </a:t>
-            </a:r>
-            <a:r>
-              <a:rPr lang="en-US" b="1" dirty="0" smtClean="0"/>
-              <a:t>require </a:t>
-            </a:r>
-            <a:r>
-              <a:rPr lang="en-US" dirty="0" smtClean="0"/>
-              <a:t>the Boost C++ libraries</a:t>
-            </a:r>
-            <a:br>
-              <a:rPr lang="en-US" dirty="0" smtClean="0"/>
-            </a:br>
-            <a:r>
-              <a:rPr lang="en-US" dirty="0" smtClean="0"/>
-              <a:t>(&gt;= 1.33.1). They are available as binary packages on many (Linux) systems. The source installer can be downloaded at </a:t>
-            </a:r>
-            <a:r>
-              <a:rPr lang="en-US" dirty="0" smtClean="0">
-                <a:hlinkClick r:id="rId2"/>
-              </a:rPr>
-              <a:t>http://www.boost.org</a:t>
-            </a:r>
-            <a:endParaRPr lang="en-US" dirty="0" smtClean="0"/>
-          </a:p>
-          <a:p>
-            <a:r>
-              <a:rPr lang="en-US" dirty="0" smtClean="0"/>
-              <a:t>Adaptors require additional libraries / tools to be installed (e.g. </a:t>
-            </a:r>
-            <a:r>
-              <a:rPr lang="en-US" dirty="0" err="1" smtClean="0"/>
-              <a:t>Globus</a:t>
-            </a:r>
-            <a:r>
-              <a:rPr lang="en-US" dirty="0" smtClean="0"/>
-              <a:t> </a:t>
-            </a:r>
-            <a:r>
-              <a:rPr lang="en-US" dirty="0" err="1" smtClean="0"/>
-              <a:t>libs</a:t>
-            </a:r>
-            <a:r>
-              <a:rPr lang="en-US" dirty="0" smtClean="0"/>
-              <a:t>, </a:t>
-            </a:r>
-            <a:r>
-              <a:rPr lang="en-US" dirty="0" err="1" smtClean="0"/>
-              <a:t>PostgreSQL</a:t>
-            </a:r>
-            <a:r>
-              <a:rPr lang="en-US" dirty="0" smtClean="0"/>
-              <a:t> client </a:t>
-            </a:r>
-            <a:r>
-              <a:rPr lang="en-US" dirty="0" err="1" smtClean="0"/>
-              <a:t>libs</a:t>
-            </a:r>
-            <a:r>
-              <a:rPr lang="en-US" dirty="0" smtClean="0"/>
-              <a:t>, etc…)</a:t>
-            </a:r>
-          </a:p>
-          <a:p>
-            <a:endParaRPr lang="en-US" dirty="0"/>
+            <a:endParaRPr lang="en-US"/>
           </a:p>
         </p:txBody>
       </p:sp>
@@ -7884,202 +8698,82 @@
           <a:p>
             <a:r>
               <a:rPr lang="en-US" dirty="0" smtClean="0"/>
-              <a:t>Installation (Core Components)</a:t>
+              <a:t>Mephisto:</a:t>
+            </a:r>
+            <a:r>
+              <a:rPr lang="en-US" dirty="0" smtClean="0"/>
+              <a:t> SAGA Deployment | Testing</a:t>
             </a:r>
             <a:endParaRPr lang="en-US" dirty="0"/>
           </a:p>
         </p:txBody>
       </p:sp>
-      <p:sp>
-        <p:nvSpPr>
-          <p:cNvPr id="3" name="Content Placeholder 2"/>
-          <p:cNvSpPr>
-            <a:spLocks noGrp="1"/>
-          </p:cNvSpPr>
+      <p:pic>
+        <p:nvPicPr>
+          <p:cNvPr id="6" name="Content Placeholder 3" descr="screenshot.png"/>
+          <p:cNvPicPr>
+            <a:picLocks noGrp="1" noChangeAspect="1"/>
+          </p:cNvPicPr>
           <p:nvPr>
             <p:ph idx="1"/>
           </p:nvPr>
-        </p:nvSpPr>
-        <p:spPr/>
-        <p:txBody>
-          <a:bodyPr/>
-          <a:lstStyle/>
-          <a:p>
-            <a:r>
-              <a:rPr lang="en-US" dirty="0" smtClean="0"/>
-              <a:t>Prerequisites: Boost C++ libraries and the </a:t>
-            </a:r>
-            <a:r>
-              <a:rPr lang="en-US" dirty="0" err="1" smtClean="0"/>
-              <a:t>PostgreSQL</a:t>
-            </a:r>
-            <a:r>
-              <a:rPr lang="en-US" dirty="0" smtClean="0"/>
-              <a:t> client libraries if you want to use the default advert and replica adaptors</a:t>
-            </a:r>
-          </a:p>
-          <a:p>
-            <a:r>
-              <a:rPr lang="en-US" dirty="0" smtClean="0"/>
-              <a:t>Download and unpack the Core Components. Decide where you want to install SAGA (local/global). </a:t>
-            </a:r>
-            <a:br>
-              <a:rPr lang="en-US" dirty="0" smtClean="0"/>
-            </a:br>
-            <a:r>
-              <a:rPr lang="en-US" dirty="0" smtClean="0"/>
-              <a:t>Run </a:t>
-            </a:r>
-            <a:r>
-              <a:rPr lang="en-US" b="1" dirty="0" smtClean="0"/>
-              <a:t>configure </a:t>
-            </a:r>
-            <a:r>
-              <a:rPr lang="en-US" dirty="0" smtClean="0"/>
-              <a:t>and </a:t>
-            </a:r>
-            <a:r>
-              <a:rPr lang="en-US" b="1" dirty="0" smtClean="0"/>
-              <a:t>make</a:t>
-            </a:r>
-            <a:r>
-              <a:rPr lang="en-US" dirty="0" smtClean="0"/>
-              <a:t>:</a:t>
-            </a:r>
-          </a:p>
-        </p:txBody>
-      </p:sp>
-      <p:sp>
-        <p:nvSpPr>
-          <p:cNvPr id="6" name="TextBox 5"/>
-          <p:cNvSpPr txBox="1"/>
-          <p:nvPr/>
-        </p:nvSpPr>
+        </p:nvPicPr>
+        <p:blipFill>
+          <a:blip r:embed="rId2"/>
+          <a:srcRect l="-12297" r="-12297"/>
+          <a:stretch>
+            <a:fillRect/>
+          </a:stretch>
+        </p:blipFill>
         <p:spPr>
           <a:xfrm>
-            <a:off x="1481601" y="4542827"/>
-            <a:ext cx="7243299" cy="1384995"/>
+            <a:off x="465296" y="2305050"/>
+            <a:ext cx="8359617" cy="4552950"/>
+          </a:xfrm>
+        </p:spPr>
+      </p:pic>
+      <p:sp>
+        <p:nvSpPr>
+          <p:cNvPr id="4" name="Rectangle 3"/>
+          <p:cNvSpPr/>
+          <p:nvPr/>
+        </p:nvSpPr>
+        <p:spPr>
+          <a:xfrm>
+            <a:off x="1585912" y="1935718"/>
+            <a:ext cx="7837487" cy="369332"/>
           </a:xfrm>
           <a:prstGeom prst="rect">
             <a:avLst/>
           </a:prstGeom>
-          <a:solidFill>
-            <a:srgbClr val="D7D9CD"/>
-          </a:solidFill>
-          <a:ln>
-            <a:solidFill>
-              <a:srgbClr val="8BADBD"/>
-            </a:solidFill>
-          </a:ln>
         </p:spPr>
-        <p:style>
-          <a:lnRef idx="2">
-            <a:schemeClr val="accent4"/>
-          </a:lnRef>
-          <a:fillRef idx="1">
-            <a:schemeClr val="lt1"/>
-          </a:fillRef>
-          <a:effectRef idx="0">
-            <a:schemeClr val="accent4"/>
-          </a:effectRef>
-          <a:fontRef idx="minor">
-            <a:schemeClr val="dk1"/>
-          </a:fontRef>
-        </p:style>
-        <p:txBody>
-          <a:bodyPr wrap="square" rtlCol="0">
+        <p:txBody>
+          <a:bodyPr wrap="square">
             <a:spAutoFit/>
           </a:bodyPr>
           <a:lstStyle/>
           <a:p>
             <a:r>
-              <a:rPr lang="en-US" sz="1200" dirty="0" smtClean="0">
-                <a:latin typeface="Andale Mono"/>
-                <a:cs typeface="Andale Mono"/>
+              <a:rPr lang="en-US" b="1" dirty="0" smtClean="0">
+                <a:solidFill>
+                  <a:srgbClr val="595959"/>
+                </a:solidFill>
               </a:rPr>
-              <a:t>$&gt; export SAGA_LOCATION=/install/location/dir/</a:t>
-            </a:r>
-          </a:p>
-          <a:p>
-            <a:endParaRPr lang="en-US" sz="1200" dirty="0" smtClean="0">
-              <a:latin typeface="Andale Mono"/>
-              <a:cs typeface="Andale Mono"/>
+              <a:t>http://</a:t>
+            </a:r>
+            <a:r>
+              <a:rPr lang="en-US" b="1" dirty="0" err="1" smtClean="0">
+                <a:solidFill>
+                  <a:srgbClr val="595959"/>
+                </a:solidFill>
+              </a:rPr>
+              <a:t>faust.cct.lsu.edu/trac/mephisto</a:t>
+            </a:r>
+            <a:endParaRPr lang="en-US" b="1" dirty="0">
+              <a:solidFill>
+                <a:srgbClr val="595959"/>
+              </a:solidFill>
             </a:endParaRPr>
-          </a:p>
-          <a:p>
-            <a:r>
-              <a:rPr lang="en-US" sz="1200" dirty="0" smtClean="0">
-                <a:latin typeface="Andale Mono"/>
-                <a:cs typeface="Andale Mono"/>
-              </a:rPr>
-              <a:t>$&gt; ./configure --prefix=SAGA_LOCATION </a:t>
-            </a:r>
-            <a:r>
-              <a:rPr lang="en-US" sz="1200" dirty="0" smtClean="0">
-                <a:solidFill>
-                  <a:schemeClr val="bg1">
-                    <a:lumMod val="50000"/>
-                  </a:schemeClr>
-                </a:solidFill>
-                <a:latin typeface="Andale Mono"/>
-                <a:cs typeface="Andale Mono"/>
-              </a:rPr>
-              <a:t>--with-boost= --with-</a:t>
-            </a:r>
-            <a:r>
-              <a:rPr lang="en-US" sz="1200" dirty="0" err="1" smtClean="0">
-                <a:solidFill>
-                  <a:schemeClr val="bg1">
-                    <a:lumMod val="50000"/>
-                  </a:schemeClr>
-                </a:solidFill>
-                <a:latin typeface="Andale Mono"/>
-                <a:cs typeface="Andale Mono"/>
-              </a:rPr>
-              <a:t>postgresql</a:t>
-            </a:r>
-            <a:r>
-              <a:rPr lang="en-US" sz="1200" dirty="0" smtClean="0">
-                <a:solidFill>
-                  <a:schemeClr val="bg1">
-                    <a:lumMod val="50000"/>
-                  </a:schemeClr>
-                </a:solidFill>
-                <a:latin typeface="Andale Mono"/>
-                <a:cs typeface="Andale Mono"/>
-              </a:rPr>
-              <a:t>=</a:t>
-            </a:r>
-          </a:p>
-          <a:p>
-            <a:endParaRPr lang="en-US" sz="1200" dirty="0" smtClean="0">
-              <a:latin typeface="Andale Mono"/>
-              <a:cs typeface="Andale Mono"/>
-            </a:endParaRPr>
-          </a:p>
-          <a:p>
-            <a:r>
-              <a:rPr lang="en-US" sz="1200" dirty="0" smtClean="0">
-                <a:latin typeface="Andale Mono"/>
-                <a:cs typeface="Andale Mono"/>
-              </a:rPr>
-              <a:t>$&gt; make</a:t>
-            </a:r>
-          </a:p>
-          <a:p>
-            <a:endParaRPr lang="en-US" sz="1200" dirty="0" smtClean="0">
-              <a:latin typeface="Andale Mono"/>
-              <a:cs typeface="Andale Mono"/>
-            </a:endParaRPr>
-          </a:p>
-          <a:p>
-            <a:r>
-              <a:rPr lang="en-US" sz="1200" dirty="0" smtClean="0">
-                <a:latin typeface="Andale Mono"/>
-                <a:cs typeface="Andale Mono"/>
-              </a:rPr>
-              <a:t>$&gt; make install</a:t>
-            </a:r>
           </a:p>
         </p:txBody>
       </p:sp>
@@ -8088,6 +8782,13 @@
   <p:clrMapOvr>
     <a:masterClrMapping/>
   </p:clrMapOvr>
+  <p:timing>
+    <p:tnLst>
+      <p:par>
+        <p:cTn id="1" dur="indefinite" restart="never" nodeType="tmRoot"/>
+      </p:par>
+    </p:tnLst>
+  </p:timing>
 </p:sld>
 </file>
 
@@ -8125,7 +8826,7 @@
           <a:p>
             <a:r>
               <a:rPr lang="en-US" dirty="0" smtClean="0"/>
-              <a:t>Installation (Python Bindings)</a:t>
+              <a:t>Installation</a:t>
             </a:r>
             <a:endParaRPr lang="en-US" dirty="0"/>
           </a:p>
@@ -8143,170 +8844,109 @@
         </p:nvSpPr>
         <p:spPr/>
         <p:txBody>
-          <a:bodyPr/>
-          <a:lstStyle/>
-          <a:p>
-            <a:r>
-              <a:rPr lang="en-US" dirty="0" smtClean="0"/>
-              <a:t>Prerequisites: </a:t>
-            </a:r>
-            <a:r>
-              <a:rPr lang="en-US" i="1" dirty="0" smtClean="0"/>
-              <a:t>SAGA Core Components </a:t>
-            </a:r>
-            <a:r>
-              <a:rPr lang="en-US" dirty="0" smtClean="0"/>
-              <a:t>and Python </a:t>
-            </a:r>
-            <a:br>
-              <a:rPr lang="en-US" dirty="0" smtClean="0"/>
-            </a:br>
-            <a:r>
-              <a:rPr lang="en-US" dirty="0" smtClean="0"/>
-              <a:t>(&gt;= 2.3 with shared libraries installed) </a:t>
-            </a:r>
-          </a:p>
-          <a:p>
-            <a:r>
-              <a:rPr lang="en-US" dirty="0" smtClean="0"/>
-              <a:t>Download and unpack the Python Bindings</a:t>
-            </a:r>
-            <a:br>
-              <a:rPr lang="en-US" dirty="0" smtClean="0"/>
-            </a:br>
-            <a:r>
-              <a:rPr lang="en-US" dirty="0" smtClean="0"/>
-              <a:t>Run </a:t>
-            </a:r>
-            <a:r>
-              <a:rPr lang="en-US" b="1" dirty="0" smtClean="0"/>
-              <a:t>configure </a:t>
-            </a:r>
-            <a:r>
-              <a:rPr lang="en-US" dirty="0" smtClean="0"/>
-              <a:t>and </a:t>
-            </a:r>
-            <a:r>
-              <a:rPr lang="en-US" b="1" dirty="0" smtClean="0"/>
-              <a:t>make</a:t>
-            </a:r>
-            <a:r>
-              <a:rPr lang="en-US" dirty="0" smtClean="0"/>
-              <a:t>:</a:t>
-            </a:r>
-          </a:p>
-        </p:txBody>
-      </p:sp>
-      <p:sp>
-        <p:nvSpPr>
-          <p:cNvPr id="6" name="TextBox 5"/>
-          <p:cNvSpPr txBox="1"/>
-          <p:nvPr/>
-        </p:nvSpPr>
-        <p:spPr>
-          <a:xfrm>
-            <a:off x="1481601" y="3997362"/>
-            <a:ext cx="7243299" cy="1384995"/>
-          </a:xfrm>
-          <a:prstGeom prst="rect">
-            <a:avLst/>
-          </a:prstGeom>
-          <a:solidFill>
-            <a:srgbClr val="D7D9CD"/>
-          </a:solidFill>
-          <a:ln>
-            <a:solidFill>
-              <a:srgbClr val="8BADBD"/>
-            </a:solidFill>
-          </a:ln>
-        </p:spPr>
-        <p:style>
-          <a:lnRef idx="2">
-            <a:schemeClr val="accent4"/>
-          </a:lnRef>
-          <a:fillRef idx="1">
-            <a:schemeClr val="lt1"/>
-          </a:fillRef>
-          <a:effectRef idx="0">
-            <a:schemeClr val="accent4"/>
-          </a:effectRef>
-          <a:fontRef idx="minor">
-            <a:schemeClr val="dk1"/>
-          </a:fontRef>
-        </p:style>
-        <p:txBody>
-          <a:bodyPr wrap="square" rtlCol="0">
-            <a:spAutoFit/>
+          <a:bodyPr>
+            <a:normAutofit/>
           </a:bodyPr>
           <a:lstStyle/>
           <a:p>
             <a:r>
-              <a:rPr lang="en-US" sz="1200" dirty="0" smtClean="0">
-                <a:solidFill>
-                  <a:srgbClr val="7F7F7F"/>
-                </a:solidFill>
-                <a:latin typeface="Andale Mono"/>
-                <a:cs typeface="Andale Mono"/>
+              <a:rPr lang="en-US" dirty="0" smtClean="0"/>
+              <a:t>SAGA consists of several components that can be installed on demand and separately:</a:t>
+            </a:r>
+          </a:p>
+          <a:p>
+            <a:pPr lvl="1"/>
+            <a:r>
+              <a:rPr lang="en-US" b="1" i="1" dirty="0" smtClean="0"/>
+              <a:t>Core Components </a:t>
+            </a:r>
+            <a:r>
+              <a:rPr lang="en-US" dirty="0" smtClean="0"/>
+              <a:t>(required)</a:t>
+            </a:r>
+            <a:endParaRPr lang="en-US" b="1" i="1" dirty="0" smtClean="0"/>
+          </a:p>
+          <a:p>
+            <a:pPr lvl="2"/>
+            <a:r>
+              <a:rPr lang="en-US" dirty="0" smtClean="0"/>
+              <a:t>Also contains the default adaptors (local files, local jobs </a:t>
+            </a:r>
+            <a:br>
+              <a:rPr lang="en-US" dirty="0" smtClean="0"/>
+            </a:br>
+            <a:r>
+              <a:rPr lang="en-US" dirty="0" smtClean="0"/>
+              <a:t>and SQL-based advert and replica adaptors) </a:t>
+            </a:r>
+          </a:p>
+          <a:p>
+            <a:pPr lvl="1"/>
+            <a:r>
+              <a:rPr lang="en-US" b="1" i="1" dirty="0" smtClean="0"/>
+              <a:t>Python Language Bindings </a:t>
+            </a:r>
+            <a:r>
+              <a:rPr lang="en-US" dirty="0" smtClean="0"/>
+              <a:t>(optional)</a:t>
+            </a:r>
+          </a:p>
+          <a:p>
+            <a:pPr lvl="1"/>
+            <a:r>
+              <a:rPr lang="en-US" b="1" i="1" dirty="0" smtClean="0"/>
+              <a:t>Adaptors </a:t>
+            </a:r>
+            <a:r>
+              <a:rPr lang="en-US" dirty="0" smtClean="0"/>
+              <a:t>(optional)</a:t>
+            </a:r>
+            <a:endParaRPr lang="en-US" b="1" i="1" dirty="0" smtClean="0"/>
+          </a:p>
+          <a:p>
+            <a:pPr lvl="2"/>
+            <a:r>
+              <a:rPr lang="en-US" dirty="0" err="1" smtClean="0"/>
+              <a:t>Globus</a:t>
+            </a:r>
+            <a:r>
+              <a:rPr lang="en-US" dirty="0" smtClean="0"/>
+              <a:t>, LSF, </a:t>
+            </a:r>
+            <a:r>
+              <a:rPr lang="en-US" dirty="0" err="1" smtClean="0"/>
+              <a:t>gLite</a:t>
+            </a:r>
+            <a:r>
+              <a:rPr lang="en-US" dirty="0" smtClean="0"/>
+              <a:t>, SSH, Cloud, …</a:t>
+            </a:r>
+          </a:p>
+          <a:p>
+            <a:r>
+              <a:rPr lang="en-US" dirty="0" smtClean="0"/>
+              <a:t>The latest versions of all components can be downloaded from the SAGA website: </a:t>
+            </a:r>
+            <a:r>
+              <a:rPr lang="en-US" dirty="0" smtClean="0">
+                <a:hlinkClick r:id="rId2"/>
               </a:rPr>
-              <a:t>$&gt; export SAGA_LOCATION=/install/location/dir/</a:t>
-            </a:r>
-          </a:p>
-          <a:p>
-            <a:endParaRPr lang="en-US" sz="1200" dirty="0" smtClean="0">
-              <a:latin typeface="Andale Mono"/>
-              <a:cs typeface="Andale Mono"/>
-            </a:endParaRPr>
-          </a:p>
-          <a:p>
-            <a:r>
-              <a:rPr lang="en-US" sz="1200" dirty="0" smtClean="0">
-                <a:latin typeface="Andale Mono"/>
-                <a:cs typeface="Andale Mono"/>
+              <a:t>http://saga.cct.lsu.edu/</a:t>
+            </a:r>
+            <a:endParaRPr lang="en-US" dirty="0" smtClean="0"/>
+          </a:p>
+          <a:p>
+            <a:r>
+              <a:rPr lang="en-US" dirty="0" smtClean="0"/>
+              <a:t>SVN: </a:t>
+            </a:r>
+            <a:r>
+              <a:rPr lang="en-US" dirty="0" smtClean="0">
+                <a:hlinkClick r:id="rId3"/>
               </a:rPr>
-              <a:t>$&gt; ./configure </a:t>
-            </a:r>
-            <a:r>
-              <a:rPr lang="en-US" sz="1200" dirty="0" smtClean="0">
-                <a:solidFill>
-                  <a:schemeClr val="bg1">
-                    <a:lumMod val="50000"/>
-                  </a:schemeClr>
-                </a:solidFill>
-                <a:latin typeface="Andale Mono"/>
-                <a:cs typeface="Andale Mono"/>
-              </a:rPr>
-              <a:t>--with-python=</a:t>
-            </a:r>
-          </a:p>
-          <a:p>
-            <a:endParaRPr lang="en-US" sz="1200" dirty="0" smtClean="0">
-              <a:latin typeface="Andale Mono"/>
-              <a:cs typeface="Andale Mono"/>
-            </a:endParaRPr>
-          </a:p>
-          <a:p>
-            <a:r>
-              <a:rPr lang="en-US" sz="1200" dirty="0" smtClean="0">
-                <a:latin typeface="Andale Mono"/>
-                <a:cs typeface="Andale Mono"/>
-              </a:rPr>
-              <a:t>$&gt; make</a:t>
-            </a:r>
-          </a:p>
-          <a:p>
-            <a:endParaRPr lang="en-US" sz="1200" dirty="0" smtClean="0">
-              <a:latin typeface="Andale Mono"/>
-              <a:cs typeface="Andale Mono"/>
-            </a:endParaRPr>
-          </a:p>
-          <a:p>
-            <a:r>
-              <a:rPr lang="en-US" sz="1200" dirty="0" smtClean="0">
-                <a:latin typeface="Andale Mono"/>
-                <a:cs typeface="Andale Mono"/>
-              </a:rPr>
-              <a:t>$&gt; make install</a:t>
-            </a:r>
+              <a:t>https://svn.cct.lsu.edu/repos/saga/</a:t>
+            </a:r>
+            <a:endParaRPr lang="en-US" dirty="0" smtClean="0"/>
           </a:p>
         </p:txBody>
       </p:sp>
@@ -8315,6 +8955,13 @@
   <p:clrMapOvr>
     <a:masterClrMapping/>
   </p:clrMapOvr>
+  <p:timing>
+    <p:tnLst>
+      <p:par>
+        <p:cTn id="1" dur="indefinite" restart="never" nodeType="tmRoot"/>
+      </p:par>
+    </p:tnLst>
+  </p:timing>
 </p:sld>
 </file>
 
@@ -8352,15 +8999,7 @@
           <a:p>
             <a:r>
               <a:rPr lang="en-US" dirty="0" smtClean="0"/>
-              <a:t>Installation (</a:t>
-            </a:r>
-            <a:r>
-              <a:rPr lang="en-US" dirty="0" err="1" smtClean="0"/>
-              <a:t>Globus</a:t>
-            </a:r>
-            <a:r>
-              <a:rPr lang="en-US" dirty="0" smtClean="0"/>
-              <a:t> Adaptors)</a:t>
+              <a:t>Latest Available Components / Adaptors</a:t>
             </a:r>
             <a:endParaRPr lang="en-US" dirty="0"/>
           </a:p>
@@ -8379,295 +9018,423 @@
         <p:spPr/>
         <p:txBody>
           <a:bodyPr>
-            <a:normAutofit lnSpcReduction="10000"/>
+            <a:normAutofit/>
           </a:bodyPr>
           <a:lstStyle/>
           <a:p>
             <a:r>
               <a:rPr lang="en-US" dirty="0" smtClean="0"/>
-              <a:t>Prerequisites: </a:t>
-            </a:r>
-            <a:r>
-              <a:rPr lang="en-US" b="1" i="1" dirty="0" smtClean="0"/>
-              <a:t>SAGA Core Components </a:t>
-            </a:r>
-            <a:r>
-              <a:rPr lang="en-US" dirty="0" smtClean="0"/>
-              <a:t>and the </a:t>
-            </a:r>
-            <a:r>
-              <a:rPr lang="en-US" dirty="0" err="1" smtClean="0"/>
-              <a:t>Globus</a:t>
-            </a:r>
-            <a:r>
-              <a:rPr lang="en-US" dirty="0" smtClean="0"/>
-              <a:t> Toolkit (available at http://</a:t>
-            </a:r>
-            <a:r>
-              <a:rPr lang="en-US" dirty="0" err="1" smtClean="0"/>
-              <a:t>www.globus.org</a:t>
-            </a:r>
-            <a:r>
-              <a:rPr lang="en-US" dirty="0" smtClean="0"/>
-              <a:t>)</a:t>
-            </a:r>
-          </a:p>
-          <a:p>
-            <a:r>
-              <a:rPr lang="en-US" dirty="0" smtClean="0"/>
-              <a:t>Download and unpack the </a:t>
-            </a:r>
-            <a:r>
-              <a:rPr lang="en-US" dirty="0" err="1" smtClean="0"/>
-              <a:t>Globus</a:t>
-            </a:r>
-            <a:r>
-              <a:rPr lang="en-US" dirty="0" smtClean="0"/>
-              <a:t> Adaptors </a:t>
-            </a:r>
-            <a:br>
-              <a:rPr lang="en-US" dirty="0" smtClean="0"/>
-            </a:br>
-            <a:r>
-              <a:rPr lang="en-US" dirty="0" smtClean="0"/>
-              <a:t>Run </a:t>
-            </a:r>
-            <a:r>
-              <a:rPr lang="en-US" b="1" dirty="0" smtClean="0"/>
-              <a:t>configure </a:t>
-            </a:r>
-            <a:r>
-              <a:rPr lang="en-US" dirty="0" smtClean="0"/>
-              <a:t>and </a:t>
-            </a:r>
-            <a:r>
-              <a:rPr lang="en-US" b="1" dirty="0" smtClean="0"/>
-              <a:t>make</a:t>
-            </a:r>
-            <a:r>
-              <a:rPr lang="en-US" dirty="0" smtClean="0"/>
-              <a:t>:</a:t>
-            </a:r>
-          </a:p>
-          <a:p>
-            <a:endParaRPr lang="en-US" dirty="0" smtClean="0"/>
-          </a:p>
-          <a:p>
-            <a:endParaRPr lang="en-US" dirty="0" smtClean="0"/>
-          </a:p>
-          <a:p>
-            <a:endParaRPr lang="en-US" dirty="0" smtClean="0"/>
-          </a:p>
-          <a:p>
-            <a:endParaRPr lang="en-US" dirty="0" smtClean="0"/>
-          </a:p>
-          <a:p>
-            <a:r>
-              <a:rPr lang="en-US" dirty="0" smtClean="0"/>
-              <a:t>This works similar for all other SAGA Adaptors</a:t>
-            </a:r>
-          </a:p>
-        </p:txBody>
-      </p:sp>
-      <p:sp>
-        <p:nvSpPr>
-          <p:cNvPr id="6" name="TextBox 5"/>
-          <p:cNvSpPr txBox="1"/>
+              <a:t>TODO</a:t>
+            </a:r>
+          </a:p>
+        </p:txBody>
+      </p:sp>
+      <p:sp>
+        <p:nvSpPr>
+          <p:cNvPr id="4" name="Rectangle 3"/>
+          <p:cNvSpPr/>
           <p:nvPr/>
         </p:nvSpPr>
         <p:spPr>
           <a:xfrm>
-            <a:off x="1481601" y="3826396"/>
-            <a:ext cx="7243299" cy="1569660"/>
+            <a:off x="236799" y="1817641"/>
+            <a:ext cx="8677014" cy="5632312"/>
           </a:xfrm>
           <a:prstGeom prst="rect">
             <a:avLst/>
           </a:prstGeom>
-          <a:solidFill>
-            <a:srgbClr val="D7D9CD"/>
-          </a:solidFill>
-          <a:ln>
-            <a:solidFill>
-              <a:srgbClr val="8BADBD"/>
-            </a:solidFill>
-          </a:ln>
         </p:spPr>
-        <p:style>
-          <a:lnRef idx="2">
-            <a:schemeClr val="accent4"/>
-          </a:lnRef>
-          <a:fillRef idx="1">
-            <a:schemeClr val="lt1"/>
-          </a:fillRef>
-          <a:effectRef idx="0">
-            <a:schemeClr val="accent4"/>
-          </a:effectRef>
-          <a:fontRef idx="minor">
-            <a:schemeClr val="dk1"/>
-          </a:fontRef>
-        </p:style>
-        <p:txBody>
-          <a:bodyPr wrap="square" rtlCol="0">
+        <p:txBody>
+          <a:bodyPr wrap="square">
             <a:spAutoFit/>
           </a:bodyPr>
           <a:lstStyle/>
           <a:p>
             <a:r>
-              <a:rPr lang="en-US" sz="1200" dirty="0" smtClean="0">
-                <a:solidFill>
-                  <a:srgbClr val="7F7F7F"/>
-                </a:solidFill>
-                <a:latin typeface="Andale Mono"/>
-                <a:cs typeface="Andale Mono"/>
-              </a:rPr>
-              <a:t>$&gt; export SAGA_LOCATION=/install/location/dir/</a:t>
-            </a:r>
-          </a:p>
-          <a:p>
-            <a:r>
-              <a:rPr lang="en-US" sz="1200" dirty="0" smtClean="0">
-                <a:solidFill>
-                  <a:srgbClr val="7F7F7F"/>
-                </a:solidFill>
-                <a:latin typeface="Andale Mono"/>
-                <a:cs typeface="Andale Mono"/>
-              </a:rPr>
-              <a:t>$&gt; export GLOBUS_LOCATION=/path/to/your/</a:t>
-            </a:r>
-            <a:r>
-              <a:rPr lang="en-US" sz="1200" dirty="0" err="1" smtClean="0">
-                <a:solidFill>
-                  <a:srgbClr val="7F7F7F"/>
-                </a:solidFill>
-                <a:latin typeface="Andale Mono"/>
-                <a:cs typeface="Andale Mono"/>
-              </a:rPr>
-              <a:t>globus</a:t>
-            </a:r>
-            <a:r>
-              <a:rPr lang="en-US" sz="1200" dirty="0" smtClean="0">
-                <a:solidFill>
-                  <a:srgbClr val="7F7F7F"/>
-                </a:solidFill>
-                <a:latin typeface="Andale Mono"/>
-                <a:cs typeface="Andale Mono"/>
-              </a:rPr>
-              <a:t>/installation</a:t>
-            </a:r>
-          </a:p>
-          <a:p>
-            <a:endParaRPr lang="en-US" sz="1200" dirty="0" smtClean="0">
-              <a:latin typeface="Andale Mono"/>
-              <a:cs typeface="Andale Mono"/>
-            </a:endParaRPr>
-          </a:p>
-          <a:p>
-            <a:r>
-              <a:rPr lang="en-US" sz="1200" dirty="0" smtClean="0">
-                <a:latin typeface="Andale Mono"/>
-                <a:cs typeface="Andale Mono"/>
-              </a:rPr>
-              <a:t>$&gt; ./configure </a:t>
-            </a:r>
-            <a:r>
-              <a:rPr lang="en-US" sz="1200" dirty="0" smtClean="0">
-                <a:solidFill>
-                  <a:schemeClr val="bg1">
-                    <a:lumMod val="50000"/>
-                  </a:schemeClr>
-                </a:solidFill>
-                <a:latin typeface="Andale Mono"/>
-                <a:cs typeface="Andale Mono"/>
-              </a:rPr>
-              <a:t>--with-</a:t>
-            </a:r>
-            <a:r>
-              <a:rPr lang="en-US" sz="1200" dirty="0" err="1" smtClean="0">
-                <a:solidFill>
-                  <a:schemeClr val="bg1">
-                    <a:lumMod val="50000"/>
-                  </a:schemeClr>
-                </a:solidFill>
-                <a:latin typeface="Andale Mono"/>
-                <a:cs typeface="Andale Mono"/>
-              </a:rPr>
-              <a:t>globus</a:t>
-            </a:r>
-            <a:r>
-              <a:rPr lang="en-US" sz="1200" dirty="0" smtClean="0">
-                <a:solidFill>
-                  <a:schemeClr val="bg1">
-                    <a:lumMod val="50000"/>
-                  </a:schemeClr>
-                </a:solidFill>
-                <a:latin typeface="Andale Mono"/>
-                <a:cs typeface="Andale Mono"/>
-              </a:rPr>
-              <a:t>-location= --with-</a:t>
-            </a:r>
-            <a:r>
-              <a:rPr lang="en-US" sz="1200" dirty="0" err="1" smtClean="0">
-                <a:solidFill>
-                  <a:schemeClr val="bg1">
-                    <a:lumMod val="50000"/>
-                  </a:schemeClr>
-                </a:solidFill>
-                <a:latin typeface="Andale Mono"/>
-                <a:cs typeface="Andale Mono"/>
-              </a:rPr>
-              <a:t>globus</a:t>
-            </a:r>
-            <a:r>
-              <a:rPr lang="en-US" sz="1200" dirty="0" smtClean="0">
-                <a:solidFill>
-                  <a:schemeClr val="bg1">
-                    <a:lumMod val="50000"/>
-                  </a:schemeClr>
-                </a:solidFill>
-                <a:latin typeface="Andale Mono"/>
-                <a:cs typeface="Andale Mono"/>
-              </a:rPr>
-              <a:t>-flavor=</a:t>
-            </a:r>
-          </a:p>
-          <a:p>
-            <a:endParaRPr lang="en-US" sz="1200" dirty="0" smtClean="0">
-              <a:latin typeface="Andale Mono"/>
-              <a:cs typeface="Andale Mono"/>
-            </a:endParaRPr>
-          </a:p>
-          <a:p>
-            <a:r>
-              <a:rPr lang="en-US" sz="1200" dirty="0" smtClean="0">
-                <a:latin typeface="Andale Mono"/>
-                <a:cs typeface="Andale Mono"/>
-              </a:rPr>
-              <a:t>$&gt; </a:t>
-            </a:r>
-            <a:r>
-              <a:rPr lang="en-US" sz="1200" dirty="0" smtClean="0">
-                <a:solidFill>
-                  <a:srgbClr val="FF0000"/>
-                </a:solidFill>
-                <a:latin typeface="Andale Mono"/>
-                <a:cs typeface="Andale Mono"/>
-              </a:rPr>
-              <a:t>make</a:t>
-            </a:r>
-          </a:p>
-          <a:p>
-            <a:endParaRPr lang="en-US" sz="1200" dirty="0" smtClean="0">
-              <a:latin typeface="Andale Mono"/>
-              <a:cs typeface="Andale Mono"/>
-            </a:endParaRPr>
-          </a:p>
-          <a:p>
-            <a:r>
-              <a:rPr lang="en-US" sz="1200" dirty="0" smtClean="0">
-                <a:latin typeface="Andale Mono"/>
-                <a:cs typeface="Andale Mono"/>
-              </a:rPr>
-              <a:t>$&gt; make install</a:t>
+              <a:rPr lang="en-US" b="1" dirty="0" smtClean="0"/>
+              <a:t>Adaptor Name	SAGA Package	Requirements	</a:t>
+            </a:r>
+          </a:p>
+          <a:p>
+            <a:r>
+              <a:rPr lang="en-US" dirty="0" smtClean="0"/>
+              <a:t>AWS/EC2	</a:t>
+            </a:r>
+            <a:r>
+              <a:rPr lang="en-US" dirty="0" err="1" smtClean="0"/>
+              <a:t>saga::job</a:t>
+            </a:r>
+            <a:r>
+              <a:rPr lang="en-US" dirty="0" smtClean="0"/>
+              <a:t>	Amazon EC2 API tools	</a:t>
+            </a:r>
+          </a:p>
+          <a:p>
+            <a:r>
+              <a:rPr lang="en-US" dirty="0" smtClean="0"/>
+              <a:t>Condor	</a:t>
+            </a:r>
+            <a:r>
+              <a:rPr lang="en-US" dirty="0" err="1" smtClean="0"/>
+              <a:t>saga::job</a:t>
+            </a:r>
+            <a:r>
+              <a:rPr lang="en-US" dirty="0" smtClean="0"/>
+              <a:t>	Condor cmd. line tools	</a:t>
+            </a:r>
+          </a:p>
+          <a:p>
+            <a:r>
+              <a:rPr lang="en-US" dirty="0" smtClean="0"/>
+              <a:t>Local (Fork) Exec	</a:t>
+            </a:r>
+            <a:r>
+              <a:rPr lang="en-US" dirty="0" err="1" smtClean="0"/>
+              <a:t>saga::job</a:t>
+            </a:r>
+            <a:r>
+              <a:rPr lang="en-US" dirty="0" smtClean="0"/>
+              <a:t>	-	</a:t>
+            </a:r>
+          </a:p>
+          <a:p>
+            <a:r>
+              <a:rPr lang="en-US" dirty="0" smtClean="0"/>
+              <a:t>Local Files	</a:t>
+            </a:r>
+            <a:r>
+              <a:rPr lang="en-US" dirty="0" err="1" smtClean="0"/>
+              <a:t>saga::file</a:t>
+            </a:r>
+            <a:r>
+              <a:rPr lang="en-US" dirty="0" smtClean="0"/>
+              <a:t>	-	</a:t>
+            </a:r>
+          </a:p>
+          <a:p>
+            <a:r>
+              <a:rPr lang="en-US" dirty="0" err="1" smtClean="0"/>
+              <a:t>PostgreSQL</a:t>
+            </a:r>
+            <a:r>
+              <a:rPr lang="en-US" dirty="0" smtClean="0"/>
+              <a:t> 	</a:t>
+            </a:r>
+            <a:r>
+              <a:rPr lang="en-US" dirty="0" err="1" smtClean="0"/>
+              <a:t>saga::advert</a:t>
+            </a:r>
+            <a:r>
+              <a:rPr lang="en-US" dirty="0" smtClean="0"/>
+              <a:t>	</a:t>
+            </a:r>
+            <a:r>
+              <a:rPr lang="en-US" dirty="0" err="1" smtClean="0"/>
+              <a:t>postgresql</a:t>
+            </a:r>
+            <a:r>
+              <a:rPr lang="en-US" dirty="0" smtClean="0"/>
+              <a:t> client libraries	</a:t>
+            </a:r>
+          </a:p>
+          <a:p>
+            <a:r>
+              <a:rPr lang="en-US" dirty="0" err="1" smtClean="0"/>
+              <a:t>PostgreSQL</a:t>
+            </a:r>
+            <a:r>
+              <a:rPr lang="en-US" dirty="0" smtClean="0"/>
+              <a:t> 	</a:t>
+            </a:r>
+            <a:r>
+              <a:rPr lang="en-US" dirty="0" err="1" smtClean="0"/>
+              <a:t>saga::replica</a:t>
+            </a:r>
+            <a:r>
+              <a:rPr lang="en-US" dirty="0" smtClean="0"/>
+              <a:t>	</a:t>
+            </a:r>
+            <a:r>
+              <a:rPr lang="en-US" dirty="0" err="1" smtClean="0"/>
+              <a:t>postgresql</a:t>
+            </a:r>
+            <a:r>
+              <a:rPr lang="en-US" dirty="0" smtClean="0"/>
+              <a:t> client libraries	</a:t>
+            </a:r>
+          </a:p>
+          <a:p>
+            <a:r>
+              <a:rPr lang="en-US" dirty="0" smtClean="0"/>
+              <a:t>SQLite3	</a:t>
+            </a:r>
+            <a:r>
+              <a:rPr lang="en-US" dirty="0" err="1" smtClean="0"/>
+              <a:t>saga::advert</a:t>
+            </a:r>
+            <a:r>
+              <a:rPr lang="en-US" dirty="0" smtClean="0"/>
+              <a:t>	sqlite3 client libraries	</a:t>
+            </a:r>
+          </a:p>
+          <a:p>
+            <a:r>
+              <a:rPr lang="en-US" dirty="0" smtClean="0"/>
+              <a:t>SQLite3 	</a:t>
+            </a:r>
+            <a:r>
+              <a:rPr lang="en-US" dirty="0" err="1" smtClean="0"/>
+              <a:t>saga::replica</a:t>
+            </a:r>
+            <a:r>
+              <a:rPr lang="en-US" dirty="0" smtClean="0"/>
+              <a:t>	sqlite3 client libraries	</a:t>
+            </a:r>
+          </a:p>
+          <a:p>
+            <a:r>
+              <a:rPr lang="en-US" dirty="0" err="1" smtClean="0"/>
+              <a:t>gLite</a:t>
+            </a:r>
+            <a:r>
+              <a:rPr lang="en-US" dirty="0" smtClean="0"/>
+              <a:t> Cream	</a:t>
+            </a:r>
+            <a:r>
+              <a:rPr lang="en-US" dirty="0" err="1" smtClean="0"/>
+              <a:t>saga::job</a:t>
+            </a:r>
+            <a:r>
+              <a:rPr lang="en-US" dirty="0" smtClean="0"/>
+              <a:t>	</a:t>
+            </a:r>
+            <a:r>
+              <a:rPr lang="en-US" dirty="0" err="1" smtClean="0"/>
+              <a:t>gLite</a:t>
+            </a:r>
+            <a:r>
+              <a:rPr lang="en-US" dirty="0" smtClean="0"/>
+              <a:t> Cream client-side libraries	</a:t>
+            </a:r>
+          </a:p>
+          <a:p>
+            <a:r>
+              <a:rPr lang="en-US" dirty="0" err="1" smtClean="0"/>
+              <a:t>Globus</a:t>
+            </a:r>
+            <a:r>
+              <a:rPr lang="en-US" dirty="0" smtClean="0"/>
+              <a:t> GRAM2 / GRAM5	</a:t>
+            </a:r>
+            <a:r>
+              <a:rPr lang="en-US" dirty="0" err="1" smtClean="0"/>
+              <a:t>saga::job</a:t>
+            </a:r>
+            <a:r>
+              <a:rPr lang="en-US" dirty="0" smtClean="0"/>
+              <a:t>	</a:t>
+            </a:r>
+            <a:r>
+              <a:rPr lang="en-US" dirty="0" err="1" smtClean="0"/>
+              <a:t>Globus</a:t>
+            </a:r>
+            <a:r>
+              <a:rPr lang="en-US" dirty="0" smtClean="0"/>
+              <a:t> Toolkit &gt;= 4.x	</a:t>
+            </a:r>
+          </a:p>
+          <a:p>
+            <a:r>
+              <a:rPr lang="en-US" dirty="0" err="1" smtClean="0"/>
+              <a:t>Globus</a:t>
+            </a:r>
+            <a:r>
+              <a:rPr lang="en-US" dirty="0" smtClean="0"/>
+              <a:t> </a:t>
+            </a:r>
+            <a:r>
+              <a:rPr lang="en-US" dirty="0" err="1" smtClean="0"/>
+              <a:t>GridFTP</a:t>
+            </a:r>
+            <a:r>
+              <a:rPr lang="en-US" dirty="0" smtClean="0"/>
+              <a:t>	</a:t>
+            </a:r>
+            <a:r>
+              <a:rPr lang="en-US" dirty="0" err="1" smtClean="0"/>
+              <a:t>saga::file</a:t>
+            </a:r>
+            <a:r>
+              <a:rPr lang="en-US" dirty="0" smtClean="0"/>
+              <a:t>	</a:t>
+            </a:r>
+            <a:r>
+              <a:rPr lang="en-US" dirty="0" err="1" smtClean="0"/>
+              <a:t>Globus</a:t>
+            </a:r>
+            <a:r>
+              <a:rPr lang="en-US" dirty="0" smtClean="0"/>
+              <a:t> Toolkit &gt;= 4.x	</a:t>
+            </a:r>
+          </a:p>
+          <a:p>
+            <a:r>
+              <a:rPr lang="en-US" dirty="0" err="1" smtClean="0"/>
+              <a:t>Globus</a:t>
+            </a:r>
+            <a:r>
+              <a:rPr lang="en-US" dirty="0" smtClean="0"/>
+              <a:t> RLS	</a:t>
+            </a:r>
+            <a:r>
+              <a:rPr lang="en-US" dirty="0" err="1" smtClean="0"/>
+              <a:t>saga::replica</a:t>
+            </a:r>
+            <a:r>
+              <a:rPr lang="en-US" dirty="0" smtClean="0"/>
+              <a:t>	</a:t>
+            </a:r>
+            <a:r>
+              <a:rPr lang="en-US" dirty="0" err="1" smtClean="0"/>
+              <a:t>Globus</a:t>
+            </a:r>
+            <a:r>
+              <a:rPr lang="en-US" dirty="0" smtClean="0"/>
+              <a:t> Toolkit &gt;= 4.x	</a:t>
+            </a:r>
+          </a:p>
+          <a:p>
+            <a:r>
+              <a:rPr lang="en-US" dirty="0" err="1" smtClean="0"/>
+              <a:t>GridSAM</a:t>
+            </a:r>
+            <a:r>
+              <a:rPr lang="en-US" dirty="0" smtClean="0"/>
+              <a:t>	</a:t>
+            </a:r>
+            <a:r>
+              <a:rPr lang="en-US" dirty="0" err="1" smtClean="0"/>
+              <a:t>saga::job</a:t>
+            </a:r>
+            <a:r>
+              <a:rPr lang="en-US" dirty="0" smtClean="0"/>
+              <a:t>	</a:t>
+            </a:r>
+            <a:r>
+              <a:rPr lang="en-US" dirty="0" err="1" smtClean="0"/>
+              <a:t>OpenSSL</a:t>
+            </a:r>
+            <a:r>
+              <a:rPr lang="en-US" dirty="0" smtClean="0"/>
+              <a:t>	</a:t>
+            </a:r>
+          </a:p>
+          <a:p>
+            <a:r>
+              <a:rPr lang="en-US" dirty="0" smtClean="0"/>
+              <a:t>Platform LSF	</a:t>
+            </a:r>
+            <a:r>
+              <a:rPr lang="en-US" dirty="0" err="1" smtClean="0"/>
+              <a:t>saga::job</a:t>
+            </a:r>
+            <a:r>
+              <a:rPr lang="en-US" dirty="0" smtClean="0"/>
+              <a:t>	LSF cmd. line tools	</a:t>
+            </a:r>
+          </a:p>
+          <a:p>
+            <a:r>
+              <a:rPr lang="en-US" dirty="0" smtClean="0"/>
+              <a:t>NAREGI	</a:t>
+            </a:r>
+            <a:r>
+              <a:rPr lang="en-US" dirty="0" err="1" smtClean="0"/>
+              <a:t>saga::job</a:t>
+            </a:r>
+            <a:r>
+              <a:rPr lang="en-US" dirty="0" smtClean="0"/>
+              <a:t>	NAREGI cmd. line tools	</a:t>
+            </a:r>
+          </a:p>
+          <a:p>
+            <a:r>
+              <a:rPr lang="en-US" dirty="0" smtClean="0"/>
+              <a:t>PBS Pro	</a:t>
+            </a:r>
+            <a:r>
+              <a:rPr lang="en-US" dirty="0" err="1" smtClean="0"/>
+              <a:t>saga::job</a:t>
+            </a:r>
+            <a:r>
+              <a:rPr lang="en-US" dirty="0" smtClean="0"/>
+              <a:t>	PBS cmd. line tools	</a:t>
+            </a:r>
+          </a:p>
+          <a:p>
+            <a:r>
+              <a:rPr lang="en-US" dirty="0" smtClean="0"/>
+              <a:t>SSH 	</a:t>
+            </a:r>
+            <a:r>
+              <a:rPr lang="en-US" dirty="0" err="1" smtClean="0"/>
+              <a:t>saga::job</a:t>
+            </a:r>
+            <a:r>
+              <a:rPr lang="en-US" dirty="0" smtClean="0"/>
+              <a:t>	</a:t>
+            </a:r>
+            <a:r>
+              <a:rPr lang="en-US" dirty="0" err="1" smtClean="0"/>
+              <a:t>ssh</a:t>
+            </a:r>
+            <a:r>
+              <a:rPr lang="en-US" dirty="0" smtClean="0"/>
+              <a:t> </a:t>
+            </a:r>
+            <a:r>
+              <a:rPr lang="en-US" dirty="0" err="1" smtClean="0"/>
+              <a:t>libs</a:t>
+            </a:r>
+            <a:r>
+              <a:rPr lang="en-US" dirty="0" smtClean="0"/>
+              <a:t>	</a:t>
+            </a:r>
+          </a:p>
+          <a:p>
+            <a:r>
+              <a:rPr lang="en-US" dirty="0" smtClean="0"/>
+              <a:t>SCP	</a:t>
+            </a:r>
+            <a:r>
+              <a:rPr lang="en-US" dirty="0" err="1" smtClean="0"/>
+              <a:t>saga::file</a:t>
+            </a:r>
+            <a:r>
+              <a:rPr lang="en-US" dirty="0" smtClean="0"/>
+              <a:t>	fuse </a:t>
+            </a:r>
+            <a:r>
+              <a:rPr lang="en-US" dirty="0" err="1" smtClean="0"/>
+              <a:t>libs</a:t>
+            </a:r>
+            <a:r>
+              <a:rPr lang="en-US" dirty="0" smtClean="0"/>
+              <a:t>	</a:t>
+            </a:r>
+          </a:p>
+          <a:p>
+            <a:r>
+              <a:rPr lang="en-US" dirty="0" smtClean="0"/>
+              <a:t>Torque	</a:t>
+            </a:r>
+            <a:r>
+              <a:rPr lang="en-US" dirty="0" err="1" smtClean="0"/>
+              <a:t>saga::job</a:t>
+            </a:r>
+            <a:r>
+              <a:rPr lang="en-US" dirty="0" smtClean="0"/>
+              <a:t>	torque cmd. line tools	</a:t>
             </a:r>
           </a:p>
         </p:txBody>

</xml_diff>

<commit_message>
Overhauled version of installation slides
git-svn-id: file://localhost/tmp/svn2git/svn@3261 defb5e50-622e-49ec-a68e-d72c7db87b45
</commit_message>
<xml_diff>
--- a/tutorial/general_tutorial/Installation.pptx
+++ b/tutorial/general_tutorial/Installation.pptx
@@ -5,10 +5,10 @@
     <p:sldMasterId id="2147483660" r:id="rId1"/>
   </p:sldMasterIdLst>
   <p:notesMasterIdLst>
-    <p:notesMasterId r:id="rId19"/>
+    <p:notesMasterId r:id="rId16"/>
   </p:notesMasterIdLst>
   <p:handoutMasterIdLst>
-    <p:handoutMasterId r:id="rId20"/>
+    <p:handoutMasterId r:id="rId17"/>
   </p:handoutMasterIdLst>
   <p:sldIdLst>
     <p:sldId id="256" r:id="rId2"/>
@@ -16,18 +16,15 @@
     <p:sldId id="271" r:id="rId4"/>
     <p:sldId id="272" r:id="rId5"/>
     <p:sldId id="273" r:id="rId6"/>
-    <p:sldId id="274" r:id="rId7"/>
-    <p:sldId id="269" r:id="rId8"/>
-    <p:sldId id="260" r:id="rId9"/>
-    <p:sldId id="268" r:id="rId10"/>
-    <p:sldId id="259" r:id="rId11"/>
-    <p:sldId id="261" r:id="rId12"/>
-    <p:sldId id="262" r:id="rId13"/>
-    <p:sldId id="263" r:id="rId14"/>
-    <p:sldId id="266" r:id="rId15"/>
-    <p:sldId id="267" r:id="rId16"/>
-    <p:sldId id="264" r:id="rId17"/>
-    <p:sldId id="265" r:id="rId18"/>
+    <p:sldId id="261" r:id="rId7"/>
+    <p:sldId id="276" r:id="rId8"/>
+    <p:sldId id="267" r:id="rId9"/>
+    <p:sldId id="274" r:id="rId10"/>
+    <p:sldId id="269" r:id="rId11"/>
+    <p:sldId id="277" r:id="rId12"/>
+    <p:sldId id="278" r:id="rId13"/>
+    <p:sldId id="280" r:id="rId14"/>
+    <p:sldId id="279" r:id="rId15"/>
   </p:sldIdLst>
   <p:sldSz cx="9144000" cy="6858000" type="screen4x3"/>
   <p:notesSz cx="6858000" cy="9144000"/>
@@ -288,7 +285,7 @@
     </p:spTree>
     <p:extLst>
       <p:ext uri="{BB962C8B-B14F-4D97-AF65-F5344CB8AC3E}">
-        <p14:creationId xmlns:mc="http://schemas.openxmlformats.org/markup-compatibility/2006" xmlns:mv="urn:schemas-microsoft-com:mac:vml" xmlns:p14="http://schemas.microsoft.com/office/powerpoint/2010/main" xmlns:p="http://schemas.openxmlformats.org/presentationml/2006/main" xmlns:r="http://schemas.openxmlformats.org/officeDocument/2006/relationships" xmlns:a="http://schemas.openxmlformats.org/drawingml/2006/main" xmlns="" val="4188242058"/>
+        <p14:creationId xmlns="" xmlns:a="http://schemas.openxmlformats.org/drawingml/2006/main" xmlns:r="http://schemas.openxmlformats.org/officeDocument/2006/relationships" xmlns:p="http://schemas.openxmlformats.org/presentationml/2006/main" xmlns:p14="http://schemas.microsoft.com/office/powerpoint/2010/main" xmlns:mv="urn:schemas-microsoft-com:mac:vml" xmlns:mc="http://schemas.openxmlformats.org/markup-compatibility/2006" val="4188242058"/>
       </p:ext>
     </p:extLst>
   </p:cSld>
@@ -551,7 +548,7 @@
     </p:spTree>
     <p:extLst>
       <p:ext uri="{BB962C8B-B14F-4D97-AF65-F5344CB8AC3E}">
-        <p14:creationId xmlns:mc="http://schemas.openxmlformats.org/markup-compatibility/2006" xmlns:mv="urn:schemas-microsoft-com:mac:vml" xmlns:p14="http://schemas.microsoft.com/office/powerpoint/2010/main" xmlns:p="http://schemas.openxmlformats.org/presentationml/2006/main" xmlns:r="http://schemas.openxmlformats.org/officeDocument/2006/relationships" xmlns:a="http://schemas.openxmlformats.org/drawingml/2006/main" xmlns="" val="2951771260"/>
+        <p14:creationId xmlns="" xmlns:a="http://schemas.openxmlformats.org/drawingml/2006/main" xmlns:r="http://schemas.openxmlformats.org/officeDocument/2006/relationships" xmlns:p="http://schemas.openxmlformats.org/presentationml/2006/main" xmlns:p14="http://schemas.microsoft.com/office/powerpoint/2010/main" xmlns:mv="urn:schemas-microsoft-com:mac:vml" xmlns:mc="http://schemas.openxmlformats.org/markup-compatibility/2006" val="2951771260"/>
       </p:ext>
     </p:extLst>
   </p:cSld>
@@ -5804,121 +5801,78 @@
           <a:p>
             <a:r>
               <a:rPr lang="en-US" dirty="0" smtClean="0"/>
-              <a:t>Installation</a:t>
+              <a:t>Mephisto: SAGA Bootstrapping (cont.)</a:t>
             </a:r>
             <a:endParaRPr lang="en-US" dirty="0"/>
           </a:p>
         </p:txBody>
       </p:sp>
-      <p:sp>
-        <p:nvSpPr>
-          <p:cNvPr id="3" name="Content Placeholder 2"/>
-          <p:cNvSpPr>
-            <a:spLocks noGrp="1"/>
-          </p:cNvSpPr>
+      <p:pic>
+        <p:nvPicPr>
+          <p:cNvPr id="6" name="Content Placeholder 3" descr="screenshot.png"/>
+          <p:cNvPicPr>
+            <a:picLocks noGrp="1" noChangeAspect="1"/>
+          </p:cNvPicPr>
           <p:nvPr>
             <p:ph idx="1"/>
           </p:nvPr>
-        </p:nvSpPr>
-        <p:spPr/>
-        <p:txBody>
-          <a:bodyPr/>
+        </p:nvPicPr>
+        <p:blipFill>
+          <a:blip r:embed="rId2"/>
+          <a:srcRect l="-12297" r="-12297"/>
+          <a:stretch>
+            <a:fillRect/>
+          </a:stretch>
+        </p:blipFill>
+        <p:spPr>
+          <a:xfrm>
+            <a:off x="465296" y="2305050"/>
+            <a:ext cx="8359617" cy="4552950"/>
+          </a:xfrm>
+        </p:spPr>
+      </p:pic>
+      <p:sp>
+        <p:nvSpPr>
+          <p:cNvPr id="4" name="Rectangle 3"/>
+          <p:cNvSpPr/>
+          <p:nvPr/>
+        </p:nvSpPr>
+        <p:spPr>
+          <a:xfrm>
+            <a:off x="1585912" y="1935718"/>
+            <a:ext cx="7837487" cy="369332"/>
+          </a:xfrm>
+          <a:prstGeom prst="rect">
+            <a:avLst/>
+          </a:prstGeom>
+        </p:spPr>
+        <p:txBody>
+          <a:bodyPr wrap="square">
+            <a:spAutoFit/>
+          </a:bodyPr>
           <a:lstStyle/>
           <a:p>
             <a:r>
-              <a:rPr lang="en-US" dirty="0" smtClean="0"/>
-              <a:t>SAGA is written in C++ and a little bit of Python. To build and install it, you’ll need at least:</a:t>
-            </a:r>
-          </a:p>
-          <a:p>
-            <a:pPr lvl="1"/>
-            <a:r>
-              <a:rPr lang="en-US" dirty="0" smtClean="0"/>
-              <a:t>C++ compiler and library</a:t>
-            </a:r>
-          </a:p>
-          <a:p>
-            <a:pPr lvl="1"/>
-            <a:r>
-              <a:rPr lang="en-US" dirty="0" smtClean="0"/>
-              <a:t>make tools</a:t>
-            </a:r>
-          </a:p>
-          <a:p>
-            <a:pPr lvl="1"/>
-            <a:r>
-              <a:rPr lang="en-US" dirty="0" smtClean="0"/>
-              <a:t>Python (optional)</a:t>
-            </a:r>
-          </a:p>
-          <a:p>
-            <a:r>
-              <a:rPr lang="en-US" dirty="0" smtClean="0"/>
-              <a:t>All SAGA components </a:t>
-            </a:r>
-            <a:r>
-              <a:rPr lang="en-US" b="1" dirty="0" smtClean="0"/>
-              <a:t>require </a:t>
-            </a:r>
-            <a:r>
-              <a:rPr lang="en-US" dirty="0" smtClean="0"/>
-              <a:t>the Boost C++ libraries</a:t>
-            </a:r>
-            <a:br>
-              <a:rPr lang="en-US" dirty="0" smtClean="0"/>
-            </a:br>
-            <a:r>
-              <a:rPr lang="en-US" dirty="0" smtClean="0"/>
-              <a:t>(&gt;= 1.33.1). They are available as binary packages on many (Linux) systems. The source installer can be downloaded at </a:t>
-            </a:r>
-            <a:r>
-              <a:rPr lang="en-US" dirty="0" smtClean="0">
-                <a:hlinkClick r:id="rId2"/>
+              <a:rPr lang="en-US" b="1" dirty="0" smtClean="0">
+                <a:solidFill>
+                  <a:srgbClr val="595959"/>
+                </a:solidFill>
               </a:rPr>
-              <a:t>http://www.boost.org</a:t>
-            </a:r>
-            <a:endParaRPr lang="en-US" dirty="0" smtClean="0"/>
-          </a:p>
-          <a:p>
-            <a:r>
-              <a:rPr lang="en-US" dirty="0" smtClean="0"/>
-              <a:t>Adaptors require additional libraries / tools to be installed (e.g. </a:t>
-            </a:r>
-            <a:r>
-              <a:rPr lang="en-US" dirty="0" err="1" smtClean="0"/>
-              <a:t>Globus</a:t>
-            </a:r>
-            <a:r>
-              <a:rPr lang="en-US" dirty="0" smtClean="0"/>
-              <a:t> </a:t>
-            </a:r>
-            <a:r>
-              <a:rPr lang="en-US" dirty="0" err="1" smtClean="0"/>
-              <a:t>libs</a:t>
-            </a:r>
-            <a:r>
-              <a:rPr lang="en-US" dirty="0" smtClean="0"/>
-              <a:t>, </a:t>
-            </a:r>
-            <a:r>
-              <a:rPr lang="en-US" dirty="0" err="1" smtClean="0"/>
-              <a:t>PostgreSQL</a:t>
-            </a:r>
-            <a:r>
-              <a:rPr lang="en-US" dirty="0" smtClean="0"/>
-              <a:t> client </a:t>
-            </a:r>
-            <a:r>
-              <a:rPr lang="en-US" dirty="0" err="1" smtClean="0"/>
-              <a:t>libs</a:t>
-            </a:r>
-            <a:r>
-              <a:rPr lang="en-US" dirty="0" smtClean="0"/>
-              <a:t>, etc…)</a:t>
-            </a:r>
-          </a:p>
-          <a:p>
-            <a:endParaRPr lang="en-US" dirty="0"/>
+              <a:t>http://</a:t>
+            </a:r>
+            <a:r>
+              <a:rPr lang="en-US" b="1" dirty="0" err="1" smtClean="0">
+                <a:solidFill>
+                  <a:srgbClr val="595959"/>
+                </a:solidFill>
+              </a:rPr>
+              <a:t>faust.cct.lsu.edu/trac/mephisto</a:t>
+            </a:r>
+            <a:endParaRPr lang="en-US" b="1" dirty="0">
+              <a:solidFill>
+                <a:srgbClr val="595959"/>
+              </a:solidFill>
+            </a:endParaRPr>
           </a:p>
         </p:txBody>
       </p:sp>
@@ -5927,6 +5881,13 @@
   <p:clrMapOvr>
     <a:masterClrMapping/>
   </p:clrMapOvr>
+  <p:timing>
+    <p:tnLst>
+      <p:par>
+        <p:cTn id="1" dur="indefinite" restart="never" nodeType="tmRoot"/>
+      </p:par>
+    </p:tnLst>
+  </p:timing>
 </p:sld>
 </file>
 
@@ -5964,7 +5925,7 @@
           <a:p>
             <a:r>
               <a:rPr lang="en-US" dirty="0" smtClean="0"/>
-              <a:t>Installation (Core Components)</a:t>
+              <a:t>Mephisto: SAGA Bootstrapping (cont.) </a:t>
             </a:r>
             <a:endParaRPr lang="en-US" dirty="0"/>
           </a:p>
@@ -5987,179 +5948,80 @@
           <a:p>
             <a:r>
               <a:rPr lang="en-US" dirty="0" smtClean="0"/>
-              <a:t>Prerequisites: Boost C++ libraries and the </a:t>
-            </a:r>
-            <a:r>
-              <a:rPr lang="en-US" dirty="0" err="1" smtClean="0"/>
-              <a:t>PostgreSQL</a:t>
-            </a:r>
-            <a:r>
-              <a:rPr lang="en-US" dirty="0" smtClean="0"/>
-              <a:t> client libraries if you want to use the default advert and replica adaptors</a:t>
-            </a:r>
-          </a:p>
-          <a:p>
-            <a:r>
-              <a:rPr lang="en-US" dirty="0" smtClean="0"/>
-              <a:t>Download and unpack the Core Components. Decide where you want to install SAGA (local/global). </a:t>
+              <a:t>When/where Mephisto </a:t>
+            </a:r>
+            <a:r>
+              <a:rPr lang="en-US" b="1" dirty="0" smtClean="0"/>
+              <a:t>should </a:t>
+            </a:r>
+            <a:r>
+              <a:rPr lang="en-US" dirty="0" smtClean="0"/>
+              <a:t>be used:</a:t>
+            </a:r>
+          </a:p>
+          <a:p>
+            <a:pPr lvl="1"/>
+            <a:r>
+              <a:rPr lang="en-US" dirty="0" smtClean="0"/>
+              <a:t>SAGA deployment in user space </a:t>
+            </a:r>
+          </a:p>
+          <a:p>
+            <a:pPr lvl="1"/>
+            <a:r>
+              <a:rPr lang="en-US" dirty="0" smtClean="0"/>
+              <a:t>Bootstrapping SAGA on a “new” host</a:t>
+            </a:r>
+          </a:p>
+          <a:p>
+            <a:pPr lvl="1"/>
+            <a:r>
+              <a:rPr lang="en-US" dirty="0" smtClean="0"/>
+              <a:t>Remote deployment (e.g. through batch system)</a:t>
+            </a:r>
+          </a:p>
+          <a:p>
+            <a:r>
+              <a:rPr lang="en-US" dirty="0" smtClean="0"/>
+              <a:t>When/where Mephisto </a:t>
+            </a:r>
+            <a:r>
+              <a:rPr lang="en-US" b="1" dirty="0" smtClean="0"/>
+              <a:t>should not </a:t>
+            </a:r>
+            <a:r>
+              <a:rPr lang="en-US" dirty="0" smtClean="0"/>
+              <a:t>be used:</a:t>
+            </a:r>
+          </a:p>
+          <a:p>
+            <a:pPr lvl="1"/>
+            <a:r>
+              <a:rPr lang="en-US" dirty="0" smtClean="0"/>
+              <a:t>If you have no clue how to use a *NIX shell (You’ll have </a:t>
             </a:r>
             <a:br>
               <a:rPr lang="en-US" dirty="0" smtClean="0"/>
             </a:br>
             <a:r>
               <a:rPr lang="en-US" dirty="0" smtClean="0"/>
-              <a:t>Run </a:t>
-            </a:r>
-            <a:r>
-              <a:rPr lang="en-US" b="1" dirty="0" smtClean="0"/>
-              <a:t>configure </a:t>
-            </a:r>
-            <a:r>
-              <a:rPr lang="en-US" dirty="0" smtClean="0"/>
-              <a:t>and </a:t>
-            </a:r>
-            <a:r>
-              <a:rPr lang="en-US" b="1" dirty="0" smtClean="0"/>
-              <a:t>make</a:t>
-            </a:r>
-            <a:r>
-              <a:rPr lang="en-US" dirty="0" smtClean="0"/>
-              <a:t>:</a:t>
-            </a:r>
-          </a:p>
-        </p:txBody>
-      </p:sp>
-      <p:sp>
-        <p:nvSpPr>
-          <p:cNvPr id="6" name="TextBox 5"/>
-          <p:cNvSpPr txBox="1"/>
-          <p:nvPr/>
-        </p:nvSpPr>
-        <p:spPr>
-          <a:xfrm>
-            <a:off x="1481601" y="4542827"/>
-            <a:ext cx="7243299" cy="1384995"/>
-          </a:xfrm>
-          <a:prstGeom prst="rect">
-            <a:avLst/>
-          </a:prstGeom>
-          <a:solidFill>
-            <a:srgbClr val="D7D9CD"/>
-          </a:solidFill>
-          <a:ln>
-            <a:solidFill>
-              <a:srgbClr val="8BADBD"/>
-            </a:solidFill>
-          </a:ln>
-        </p:spPr>
-        <p:style>
-          <a:lnRef idx="2">
-            <a:schemeClr val="accent4"/>
-          </a:lnRef>
-          <a:fillRef idx="1">
-            <a:schemeClr val="lt1"/>
-          </a:fillRef>
-          <a:effectRef idx="0">
-            <a:schemeClr val="accent4"/>
-          </a:effectRef>
-          <a:fontRef idx="minor">
-            <a:schemeClr val="dk1"/>
-          </a:fontRef>
-        </p:style>
-        <p:txBody>
-          <a:bodyPr wrap="square" rtlCol="0">
-            <a:spAutoFit/>
-          </a:bodyPr>
-          <a:lstStyle/>
-          <a:p>
-            <a:r>
-              <a:rPr lang="en-US" sz="1200" dirty="0" smtClean="0">
-                <a:latin typeface="Andale Mono"/>
-                <a:cs typeface="Andale Mono"/>
-              </a:rPr>
-              <a:t>$&gt; export SAGA_LOCATION=/install/location/dir/</a:t>
-            </a:r>
-          </a:p>
-          <a:p>
-            <a:endParaRPr lang="en-US" sz="1200" dirty="0" smtClean="0">
-              <a:latin typeface="Andale Mono"/>
-              <a:cs typeface="Andale Mono"/>
-            </a:endParaRPr>
-          </a:p>
-          <a:p>
-            <a:r>
-              <a:rPr lang="en-US" sz="1200" dirty="0" smtClean="0">
-                <a:latin typeface="Andale Mono"/>
-                <a:cs typeface="Andale Mono"/>
-              </a:rPr>
-              <a:t>$&gt; ./configure --prefix=SAGA_LOCATION </a:t>
-            </a:r>
-            <a:r>
-              <a:rPr lang="en-US" sz="1200" dirty="0" smtClean="0">
-                <a:solidFill>
-                  <a:schemeClr val="bg1">
-                    <a:lumMod val="50000"/>
-                  </a:schemeClr>
-                </a:solidFill>
-                <a:latin typeface="Andale Mono"/>
-                <a:cs typeface="Andale Mono"/>
-              </a:rPr>
-              <a:t>--with-boost= --with-</a:t>
-            </a:r>
-            <a:r>
-              <a:rPr lang="en-US" sz="1200" dirty="0" err="1" smtClean="0">
-                <a:solidFill>
-                  <a:schemeClr val="bg1">
-                    <a:lumMod val="50000"/>
-                  </a:schemeClr>
-                </a:solidFill>
-                <a:latin typeface="Andale Mono"/>
-                <a:cs typeface="Andale Mono"/>
-              </a:rPr>
-              <a:t>postgresql</a:t>
-            </a:r>
-            <a:r>
-              <a:rPr lang="en-US" sz="1200" dirty="0" smtClean="0">
-                <a:solidFill>
-                  <a:schemeClr val="bg1">
-                    <a:lumMod val="50000"/>
-                  </a:schemeClr>
-                </a:solidFill>
-                <a:latin typeface="Andale Mono"/>
-                <a:cs typeface="Andale Mono"/>
-              </a:rPr>
-              <a:t>=</a:t>
-            </a:r>
-          </a:p>
-          <a:p>
-            <a:endParaRPr lang="en-US" sz="1200" dirty="0" smtClean="0">
-              <a:latin typeface="Andale Mono"/>
-              <a:cs typeface="Andale Mono"/>
-            </a:endParaRPr>
-          </a:p>
-          <a:p>
-            <a:r>
-              <a:rPr lang="en-US" sz="1200" dirty="0" smtClean="0">
-                <a:latin typeface="Andale Mono"/>
-                <a:cs typeface="Andale Mono"/>
-              </a:rPr>
-              <a:t>$&gt; make</a:t>
-            </a:r>
-          </a:p>
-          <a:p>
-            <a:endParaRPr lang="en-US" sz="1200" dirty="0" smtClean="0">
-              <a:latin typeface="Andale Mono"/>
-              <a:cs typeface="Andale Mono"/>
-            </a:endParaRPr>
-          </a:p>
-          <a:p>
-            <a:r>
-              <a:rPr lang="en-US" sz="1200" dirty="0" smtClean="0">
-                <a:latin typeface="Andale Mono"/>
-                <a:cs typeface="Andale Mono"/>
-              </a:rPr>
-              <a:t>$&gt; make install</a:t>
-            </a:r>
+              <a:t>to learn that anyways if you want to use SAGA) </a:t>
+            </a:r>
+          </a:p>
+          <a:p>
+            <a:pPr lvl="1"/>
+            <a:r>
+              <a:rPr lang="en-US" dirty="0" smtClean="0"/>
+              <a:t>On Custom-tailored, system-space deployments</a:t>
+            </a:r>
+          </a:p>
+          <a:p>
+            <a:pPr lvl="1"/>
+            <a:r>
+              <a:rPr lang="en-US" dirty="0" smtClean="0"/>
+              <a:t>If most of the required prerequisites are available </a:t>
+            </a:r>
+            <a:endParaRPr lang="en-US" dirty="0"/>
           </a:p>
         </p:txBody>
       </p:sp>
@@ -6205,7 +6067,7 @@
           <a:p>
             <a:r>
               <a:rPr lang="en-US" dirty="0" smtClean="0"/>
-              <a:t>Installation (Python Bindings)</a:t>
+              <a:t>Deployment Status</a:t>
             </a:r>
             <a:endParaRPr lang="en-US" dirty="0"/>
           </a:p>
@@ -6220,172 +6082,141 @@
           <p:nvPr>
             <p:ph idx="1"/>
           </p:nvPr>
-        </p:nvSpPr>
-        <p:spPr/>
-        <p:txBody>
-          <a:bodyPr/>
-          <a:lstStyle/>
-          <a:p>
-            <a:r>
-              <a:rPr lang="en-US" dirty="0" smtClean="0"/>
-              <a:t>Prerequisites: </a:t>
-            </a:r>
-            <a:r>
-              <a:rPr lang="en-US" i="1" dirty="0" smtClean="0"/>
-              <a:t>SAGA Core Components </a:t>
-            </a:r>
-            <a:r>
-              <a:rPr lang="en-US" dirty="0" smtClean="0"/>
-              <a:t>and Python </a:t>
-            </a:r>
-            <a:br>
-              <a:rPr lang="en-US" dirty="0" smtClean="0"/>
-            </a:br>
-            <a:r>
-              <a:rPr lang="en-US" dirty="0" smtClean="0"/>
-              <a:t>(&gt;= 2.3 with shared libraries installed) </a:t>
-            </a:r>
-          </a:p>
-          <a:p>
-            <a:r>
-              <a:rPr lang="en-US" dirty="0" smtClean="0"/>
-              <a:t>Download and unpack the Python Bindings</a:t>
-            </a:r>
-            <a:br>
-              <a:rPr lang="en-US" dirty="0" smtClean="0"/>
-            </a:br>
-            <a:r>
-              <a:rPr lang="en-US" dirty="0" smtClean="0"/>
-              <a:t>Run </a:t>
-            </a:r>
-            <a:r>
-              <a:rPr lang="en-US" b="1" dirty="0" smtClean="0"/>
-              <a:t>configure </a:t>
-            </a:r>
-            <a:r>
-              <a:rPr lang="en-US" dirty="0" smtClean="0"/>
-              <a:t>and </a:t>
-            </a:r>
-            <a:r>
-              <a:rPr lang="en-US" b="1" dirty="0" smtClean="0"/>
-              <a:t>make</a:t>
-            </a:r>
-            <a:r>
-              <a:rPr lang="en-US" dirty="0" smtClean="0"/>
-              <a:t>:</a:t>
-            </a:r>
-          </a:p>
-        </p:txBody>
-      </p:sp>
-      <p:sp>
-        <p:nvSpPr>
-          <p:cNvPr id="6" name="TextBox 5"/>
-          <p:cNvSpPr txBox="1"/>
-          <p:nvPr/>
         </p:nvSpPr>
         <p:spPr>
           <a:xfrm>
-            <a:off x="1481601" y="3997362"/>
-            <a:ext cx="7243299" cy="1384995"/>
+            <a:off x="1017533" y="2068618"/>
+            <a:ext cx="7707367" cy="4789382"/>
           </a:xfrm>
-          <a:prstGeom prst="rect">
-            <a:avLst/>
-          </a:prstGeom>
-          <a:solidFill>
-            <a:srgbClr val="D7D9CD"/>
-          </a:solidFill>
-          <a:ln>
-            <a:solidFill>
-              <a:srgbClr val="8BADBD"/>
-            </a:solidFill>
-          </a:ln>
         </p:spPr>
-        <p:style>
-          <a:lnRef idx="2">
-            <a:schemeClr val="accent4"/>
-          </a:lnRef>
-          <a:fillRef idx="1">
-            <a:schemeClr val="lt1"/>
-          </a:fillRef>
-          <a:effectRef idx="0">
-            <a:schemeClr val="accent4"/>
-          </a:effectRef>
-          <a:fontRef idx="minor">
-            <a:schemeClr val="dk1"/>
-          </a:fontRef>
-        </p:style>
-        <p:txBody>
-          <a:bodyPr wrap="square" rtlCol="0">
-            <a:spAutoFit/>
+        <p:txBody>
+          <a:bodyPr>
+            <a:normAutofit/>
           </a:bodyPr>
           <a:lstStyle/>
           <a:p>
             <a:r>
-              <a:rPr lang="en-US" sz="1200" dirty="0" smtClean="0">
-                <a:solidFill>
-                  <a:srgbClr val="7F7F7F"/>
-                </a:solidFill>
-                <a:latin typeface="Andale Mono"/>
-                <a:cs typeface="Andale Mono"/>
+              <a:rPr lang="en-US" dirty="0" smtClean="0"/>
+              <a:t>LONI (Louisiana Optical Network Initiative) </a:t>
+            </a:r>
+          </a:p>
+          <a:p>
+            <a:pPr lvl="1"/>
+            <a:r>
+              <a:rPr lang="en-US" dirty="0" smtClean="0"/>
+              <a:t>Part of the Cyber-</a:t>
+            </a:r>
+            <a:r>
+              <a:rPr lang="en-US" dirty="0" smtClean="0"/>
+              <a:t>tools toolkit:</a:t>
+            </a:r>
+            <a:br>
+              <a:rPr lang="en-US" dirty="0" smtClean="0"/>
+            </a:br>
+            <a:r>
+              <a:rPr lang="en-US" dirty="0" smtClean="0">
+                <a:hlinkClick r:id="rId2"/>
               </a:rPr>
-              <a:t>$&gt; export SAGA_LOCATION=/install/location/dir/</a:t>
-            </a:r>
-          </a:p>
-          <a:p>
-            <a:endParaRPr lang="en-US" sz="1200" dirty="0" smtClean="0">
-              <a:latin typeface="Andale Mono"/>
-              <a:cs typeface="Andale Mono"/>
-            </a:endParaRPr>
-          </a:p>
-          <a:p>
-            <a:r>
-              <a:rPr lang="en-US" sz="1200" dirty="0" smtClean="0">
-                <a:latin typeface="Andale Mono"/>
-                <a:cs typeface="Andale Mono"/>
+              <a:t>http://cybertools.loni.org</a:t>
+            </a:r>
+            <a:r>
+              <a:rPr lang="en-US" dirty="0" smtClean="0">
+                <a:hlinkClick r:id="rId2"/>
               </a:rPr>
-              <a:t>$&gt; ./configure </a:t>
-            </a:r>
-            <a:r>
-              <a:rPr lang="en-US" sz="1200" dirty="0" smtClean="0">
-                <a:solidFill>
-                  <a:schemeClr val="bg1">
-                    <a:lumMod val="50000"/>
-                  </a:schemeClr>
-                </a:solidFill>
-                <a:latin typeface="Andale Mono"/>
-                <a:cs typeface="Andale Mono"/>
+              <a:t>/</a:t>
+            </a:r>
+            <a:endParaRPr lang="en-US" dirty="0" smtClean="0"/>
+          </a:p>
+          <a:p>
+            <a:pPr lvl="1"/>
+            <a:r>
+              <a:rPr lang="en-US" dirty="0" smtClean="0"/>
+              <a:t>1.4.1 available via </a:t>
+            </a:r>
+            <a:r>
+              <a:rPr lang="en-US" dirty="0" err="1" smtClean="0"/>
+              <a:t>softenv</a:t>
+            </a:r>
+            <a:r>
+              <a:rPr lang="en-US" dirty="0" smtClean="0"/>
+              <a:t> – update to 1.5.3 in progress as part of the </a:t>
+            </a:r>
+            <a:r>
+              <a:rPr lang="en-US" dirty="0" err="1" smtClean="0"/>
+              <a:t>Ganga</a:t>
+            </a:r>
+            <a:r>
+              <a:rPr lang="en-US" dirty="0" smtClean="0"/>
+              <a:t> deployment efforts</a:t>
+            </a:r>
+          </a:p>
+          <a:p>
+            <a:r>
+              <a:rPr lang="en-US" dirty="0" smtClean="0"/>
+              <a:t>TeraGrid </a:t>
+            </a:r>
+          </a:p>
+          <a:p>
+            <a:pPr lvl="1"/>
+            <a:r>
+              <a:rPr lang="en-US" dirty="0" smtClean="0"/>
+              <a:t>SAGA is part of TG’s distributed programming toolkit</a:t>
+            </a:r>
+            <a:r>
+              <a:rPr lang="en-US" dirty="0" smtClean="0"/>
+              <a:t>: </a:t>
+            </a:r>
+            <a:br>
+              <a:rPr lang="en-US" dirty="0" smtClean="0"/>
+            </a:br>
+            <a:r>
+              <a:rPr lang="en-US" dirty="0" smtClean="0">
+                <a:hlinkClick r:id="rId3"/>
               </a:rPr>
-              <a:t>--with-python=</a:t>
-            </a:r>
-          </a:p>
-          <a:p>
-            <a:endParaRPr lang="en-US" sz="1200" dirty="0" smtClean="0">
-              <a:latin typeface="Andale Mono"/>
-              <a:cs typeface="Andale Mono"/>
-            </a:endParaRPr>
-          </a:p>
-          <a:p>
-            <a:r>
-              <a:rPr lang="en-US" sz="1200" dirty="0" smtClean="0">
-                <a:latin typeface="Andale Mono"/>
-                <a:cs typeface="Andale Mono"/>
+              <a:t>http://bit.ly/</a:t>
+            </a:r>
+            <a:r>
+              <a:rPr lang="en-US" dirty="0" smtClean="0">
+                <a:hlinkClick r:id="rId3"/>
               </a:rPr>
-              <a:t>$&gt; make</a:t>
-            </a:r>
-          </a:p>
-          <a:p>
-            <a:endParaRPr lang="en-US" sz="1200" dirty="0" smtClean="0">
-              <a:latin typeface="Andale Mono"/>
-              <a:cs typeface="Andale Mono"/>
-            </a:endParaRPr>
-          </a:p>
-          <a:p>
-            <a:r>
-              <a:rPr lang="en-US" sz="1200" dirty="0" smtClean="0">
-                <a:latin typeface="Andale Mono"/>
-                <a:cs typeface="Andale Mono"/>
-              </a:rPr>
-              <a:t>$&gt; make install</a:t>
+              <a:t>ff9c5B</a:t>
+            </a:r>
+            <a:endParaRPr lang="en-US" dirty="0" smtClean="0"/>
+          </a:p>
+          <a:p>
+            <a:pPr lvl="1"/>
+            <a:r>
+              <a:rPr lang="en-US" dirty="0" smtClean="0"/>
+              <a:t>1.4.1 available via </a:t>
+            </a:r>
+            <a:r>
+              <a:rPr lang="en-US" dirty="0" err="1" smtClean="0"/>
+              <a:t>softenv</a:t>
+            </a:r>
+            <a:r>
+              <a:rPr lang="en-US" dirty="0" smtClean="0"/>
+              <a:t> – will be updated soon</a:t>
+            </a:r>
+          </a:p>
+          <a:p>
+            <a:r>
+              <a:rPr lang="en-US" dirty="0" smtClean="0"/>
+              <a:t>FutureGrid</a:t>
+            </a:r>
+          </a:p>
+          <a:p>
+            <a:pPr lvl="1"/>
+            <a:r>
+              <a:rPr lang="en-US" dirty="0" smtClean="0"/>
+              <a:t>We’re discussing possible deployment of SAGA as part of the FutureGrid HPC </a:t>
+            </a:r>
+            <a:r>
+              <a:rPr lang="en-US" dirty="0" err="1" smtClean="0"/>
+              <a:t>VMs</a:t>
+            </a:r>
+            <a:r>
+              <a:rPr lang="en-US" dirty="0" smtClean="0"/>
+              <a:t> as well as a “bare metal” deployment</a:t>
             </a:r>
           </a:p>
         </p:txBody>
@@ -6432,323 +6263,56 @@
           <a:p>
             <a:r>
               <a:rPr lang="en-US" dirty="0" smtClean="0"/>
-              <a:t>Installation (</a:t>
+              <a:t>Deployment </a:t>
+            </a:r>
+            <a:r>
+              <a:rPr lang="en-US" dirty="0" smtClean="0"/>
+              <a:t>Status (cont.)</a:t>
+            </a:r>
+            <a:endParaRPr lang="en-US" dirty="0"/>
+          </a:p>
+        </p:txBody>
+      </p:sp>
+      <p:sp>
+        <p:nvSpPr>
+          <p:cNvPr id="3" name="Content Placeholder 2"/>
+          <p:cNvSpPr>
+            <a:spLocks noGrp="1"/>
+          </p:cNvSpPr>
+          <p:nvPr>
+            <p:ph idx="1"/>
+          </p:nvPr>
+        </p:nvSpPr>
+        <p:spPr/>
+        <p:txBody>
+          <a:bodyPr/>
+          <a:lstStyle/>
+          <a:p>
+            <a:r>
+              <a:rPr lang="en-US" dirty="0" smtClean="0"/>
+              <a:t>CERN</a:t>
+            </a:r>
+          </a:p>
+          <a:p>
+            <a:pPr lvl="1"/>
+            <a:r>
+              <a:rPr lang="en-US" dirty="0" smtClean="0"/>
+              <a:t>Available on </a:t>
             </a:r>
             <a:r>
               <a:rPr lang="en-US" dirty="0" err="1" smtClean="0"/>
-              <a:t>Globus</a:t>
-            </a:r>
-            <a:r>
-              <a:rPr lang="en-US" dirty="0" smtClean="0"/>
-              <a:t> Adaptors)</a:t>
-            </a:r>
-            <a:endParaRPr lang="en-US" dirty="0"/>
-          </a:p>
-        </p:txBody>
-      </p:sp>
-      <p:sp>
-        <p:nvSpPr>
-          <p:cNvPr id="3" name="Content Placeholder 2"/>
-          <p:cNvSpPr>
-            <a:spLocks noGrp="1"/>
-          </p:cNvSpPr>
-          <p:nvPr>
-            <p:ph idx="1"/>
-          </p:nvPr>
-        </p:nvSpPr>
-        <p:spPr/>
-        <p:txBody>
-          <a:bodyPr>
-            <a:normAutofit lnSpcReduction="10000"/>
-          </a:bodyPr>
-          <a:lstStyle/>
-          <a:p>
-            <a:r>
-              <a:rPr lang="en-US" dirty="0" smtClean="0"/>
-              <a:t>Prerequisites: </a:t>
-            </a:r>
-            <a:r>
-              <a:rPr lang="en-US" b="1" i="1" dirty="0" smtClean="0"/>
-              <a:t>SAGA Core Components </a:t>
-            </a:r>
-            <a:r>
-              <a:rPr lang="en-US" dirty="0" smtClean="0"/>
-              <a:t>and the </a:t>
-            </a:r>
-            <a:r>
-              <a:rPr lang="en-US" dirty="0" err="1" smtClean="0"/>
-              <a:t>Globus</a:t>
-            </a:r>
-            <a:r>
-              <a:rPr lang="en-US" dirty="0" smtClean="0"/>
-              <a:t> Toolkit (available at http://</a:t>
-            </a:r>
-            <a:r>
-              <a:rPr lang="en-US" dirty="0" err="1" smtClean="0"/>
-              <a:t>www.globus.org</a:t>
-            </a:r>
-            <a:r>
-              <a:rPr lang="en-US" dirty="0" smtClean="0"/>
-              <a:t>)</a:t>
-            </a:r>
-          </a:p>
-          <a:p>
-            <a:r>
-              <a:rPr lang="en-US" dirty="0" smtClean="0"/>
-              <a:t>Download and unpack the </a:t>
-            </a:r>
-            <a:r>
-              <a:rPr lang="en-US" dirty="0" err="1" smtClean="0"/>
-              <a:t>Globus</a:t>
-            </a:r>
-            <a:r>
-              <a:rPr lang="en-US" dirty="0" smtClean="0"/>
-              <a:t> Adaptors </a:t>
-            </a:r>
-            <a:br>
-              <a:rPr lang="en-US" dirty="0" smtClean="0"/>
-            </a:br>
-            <a:r>
-              <a:rPr lang="en-US" dirty="0" smtClean="0"/>
-              <a:t>Run </a:t>
-            </a:r>
-            <a:r>
-              <a:rPr lang="en-US" b="1" dirty="0" smtClean="0"/>
-              <a:t>configure </a:t>
-            </a:r>
-            <a:r>
-              <a:rPr lang="en-US" dirty="0" smtClean="0"/>
-              <a:t>and </a:t>
-            </a:r>
-            <a:r>
-              <a:rPr lang="en-US" b="1" dirty="0" smtClean="0"/>
-              <a:t>make</a:t>
-            </a:r>
-            <a:r>
-              <a:rPr lang="en-US" dirty="0" smtClean="0"/>
-              <a:t>:</a:t>
-            </a:r>
-          </a:p>
-          <a:p>
+              <a:t>lxplus</a:t>
+            </a:r>
+            <a:r>
+              <a:rPr lang="en-US" dirty="0" smtClean="0"/>
+              <a:t> SL5 clusters </a:t>
+            </a:r>
+          </a:p>
+          <a:p>
+            <a:pPr>
+              <a:buNone/>
+            </a:pPr>
             <a:endParaRPr lang="en-US" dirty="0" smtClean="0"/>
-          </a:p>
-          <a:p>
-            <a:endParaRPr lang="en-US" dirty="0" smtClean="0"/>
-          </a:p>
-          <a:p>
-            <a:endParaRPr lang="en-US" dirty="0" smtClean="0"/>
-          </a:p>
-          <a:p>
-            <a:endParaRPr lang="en-US" dirty="0" smtClean="0"/>
-          </a:p>
-          <a:p>
-            <a:r>
-              <a:rPr lang="en-US" dirty="0" smtClean="0"/>
-              <a:t>This works similar for all other SAGA Adaptors</a:t>
-            </a:r>
-          </a:p>
-        </p:txBody>
-      </p:sp>
-      <p:sp>
-        <p:nvSpPr>
-          <p:cNvPr id="6" name="TextBox 5"/>
-          <p:cNvSpPr txBox="1"/>
-          <p:nvPr/>
-        </p:nvSpPr>
-        <p:spPr>
-          <a:xfrm>
-            <a:off x="1481601" y="3826396"/>
-            <a:ext cx="7243299" cy="1569660"/>
-          </a:xfrm>
-          <a:prstGeom prst="rect">
-            <a:avLst/>
-          </a:prstGeom>
-          <a:solidFill>
-            <a:srgbClr val="D7D9CD"/>
-          </a:solidFill>
-          <a:ln>
-            <a:solidFill>
-              <a:srgbClr val="8BADBD"/>
-            </a:solidFill>
-          </a:ln>
-        </p:spPr>
-        <p:style>
-          <a:lnRef idx="2">
-            <a:schemeClr val="accent4"/>
-          </a:lnRef>
-          <a:fillRef idx="1">
-            <a:schemeClr val="lt1"/>
-          </a:fillRef>
-          <a:effectRef idx="0">
-            <a:schemeClr val="accent4"/>
-          </a:effectRef>
-          <a:fontRef idx="minor">
-            <a:schemeClr val="dk1"/>
-          </a:fontRef>
-        </p:style>
-        <p:txBody>
-          <a:bodyPr wrap="square" rtlCol="0">
-            <a:spAutoFit/>
-          </a:bodyPr>
-          <a:lstStyle/>
-          <a:p>
-            <a:r>
-              <a:rPr lang="en-US" sz="1200" dirty="0" smtClean="0">
-                <a:solidFill>
-                  <a:srgbClr val="7F7F7F"/>
-                </a:solidFill>
-                <a:latin typeface="Andale Mono"/>
-                <a:cs typeface="Andale Mono"/>
-              </a:rPr>
-              <a:t>$&gt; export SAGA_LOCATION=/install/location/dir/</a:t>
-            </a:r>
-          </a:p>
-          <a:p>
-            <a:r>
-              <a:rPr lang="en-US" sz="1200" dirty="0" smtClean="0">
-                <a:solidFill>
-                  <a:srgbClr val="7F7F7F"/>
-                </a:solidFill>
-                <a:latin typeface="Andale Mono"/>
-                <a:cs typeface="Andale Mono"/>
-              </a:rPr>
-              <a:t>$&gt; export GLOBUS_LOCATION=/path/to/your/</a:t>
-            </a:r>
-            <a:r>
-              <a:rPr lang="en-US" sz="1200" dirty="0" err="1" smtClean="0">
-                <a:solidFill>
-                  <a:srgbClr val="7F7F7F"/>
-                </a:solidFill>
-                <a:latin typeface="Andale Mono"/>
-                <a:cs typeface="Andale Mono"/>
-              </a:rPr>
-              <a:t>globus</a:t>
-            </a:r>
-            <a:r>
-              <a:rPr lang="en-US" sz="1200" dirty="0" smtClean="0">
-                <a:solidFill>
-                  <a:srgbClr val="7F7F7F"/>
-                </a:solidFill>
-                <a:latin typeface="Andale Mono"/>
-                <a:cs typeface="Andale Mono"/>
-              </a:rPr>
-              <a:t>/installation</a:t>
-            </a:r>
-          </a:p>
-          <a:p>
-            <a:endParaRPr lang="en-US" sz="1200" dirty="0" smtClean="0">
-              <a:latin typeface="Andale Mono"/>
-              <a:cs typeface="Andale Mono"/>
-            </a:endParaRPr>
-          </a:p>
-          <a:p>
-            <a:r>
-              <a:rPr lang="en-US" sz="1200" dirty="0" smtClean="0">
-                <a:latin typeface="Andale Mono"/>
-                <a:cs typeface="Andale Mono"/>
-              </a:rPr>
-              <a:t>$&gt; ./configure </a:t>
-            </a:r>
-            <a:r>
-              <a:rPr lang="en-US" sz="1200" dirty="0" smtClean="0">
-                <a:solidFill>
-                  <a:schemeClr val="bg1">
-                    <a:lumMod val="50000"/>
-                  </a:schemeClr>
-                </a:solidFill>
-                <a:latin typeface="Andale Mono"/>
-                <a:cs typeface="Andale Mono"/>
-              </a:rPr>
-              <a:t>--with-</a:t>
-            </a:r>
-            <a:r>
-              <a:rPr lang="en-US" sz="1200" dirty="0" err="1" smtClean="0">
-                <a:solidFill>
-                  <a:schemeClr val="bg1">
-                    <a:lumMod val="50000"/>
-                  </a:schemeClr>
-                </a:solidFill>
-                <a:latin typeface="Andale Mono"/>
-                <a:cs typeface="Andale Mono"/>
-              </a:rPr>
-              <a:t>globus</a:t>
-            </a:r>
-            <a:r>
-              <a:rPr lang="en-US" sz="1200" dirty="0" smtClean="0">
-                <a:solidFill>
-                  <a:schemeClr val="bg1">
-                    <a:lumMod val="50000"/>
-                  </a:schemeClr>
-                </a:solidFill>
-                <a:latin typeface="Andale Mono"/>
-                <a:cs typeface="Andale Mono"/>
-              </a:rPr>
-              <a:t>-location= --with-</a:t>
-            </a:r>
-            <a:r>
-              <a:rPr lang="en-US" sz="1200" dirty="0" err="1" smtClean="0">
-                <a:solidFill>
-                  <a:schemeClr val="bg1">
-                    <a:lumMod val="50000"/>
-                  </a:schemeClr>
-                </a:solidFill>
-                <a:latin typeface="Andale Mono"/>
-                <a:cs typeface="Andale Mono"/>
-              </a:rPr>
-              <a:t>globus</a:t>
-            </a:r>
-            <a:r>
-              <a:rPr lang="en-US" sz="1200" dirty="0" smtClean="0">
-                <a:solidFill>
-                  <a:schemeClr val="bg1">
-                    <a:lumMod val="50000"/>
-                  </a:schemeClr>
-                </a:solidFill>
-                <a:latin typeface="Andale Mono"/>
-                <a:cs typeface="Andale Mono"/>
-              </a:rPr>
-              <a:t>-flavor=</a:t>
-            </a:r>
-          </a:p>
-          <a:p>
-            <a:endParaRPr lang="en-US" sz="1200" dirty="0" smtClean="0">
-              <a:latin typeface="Andale Mono"/>
-              <a:cs typeface="Andale Mono"/>
-            </a:endParaRPr>
-          </a:p>
-          <a:p>
-            <a:r>
-              <a:rPr lang="en-US" sz="1200" dirty="0" smtClean="0">
-                <a:latin typeface="Andale Mono"/>
-                <a:cs typeface="Andale Mono"/>
-              </a:rPr>
-              <a:t>$&gt; </a:t>
-            </a:r>
-            <a:r>
-              <a:rPr lang="en-US" sz="1200" dirty="0" smtClean="0">
-                <a:solidFill>
-                  <a:srgbClr val="FF0000"/>
-                </a:solidFill>
-                <a:latin typeface="Andale Mono"/>
-                <a:cs typeface="Andale Mono"/>
-              </a:rPr>
-              <a:t>make</a:t>
-            </a:r>
-          </a:p>
-          <a:p>
-            <a:endParaRPr lang="en-US" sz="1200" dirty="0" smtClean="0">
-              <a:latin typeface="Andale Mono"/>
-              <a:cs typeface="Andale Mono"/>
-            </a:endParaRPr>
-          </a:p>
-          <a:p>
-            <a:r>
-              <a:rPr lang="en-US" sz="1200" dirty="0" smtClean="0">
-                <a:latin typeface="Andale Mono"/>
-                <a:cs typeface="Andale Mono"/>
-              </a:rPr>
-              <a:t>$&gt; make install</a:t>
-            </a:r>
           </a:p>
         </p:txBody>
       </p:sp>
@@ -6794,7 +6358,7 @@
           <a:p>
             <a:r>
               <a:rPr lang="en-US" dirty="0" smtClean="0"/>
-              <a:t>Installation (Condor Adaptor)</a:t>
+              <a:t>Outlook</a:t>
             </a:r>
             <a:endParaRPr lang="en-US" dirty="0"/>
           </a:p>
@@ -6808,271 +6372,6 @@
           </p:cNvSpPr>
           <p:nvPr>
             <p:ph idx="1"/>
-          </p:nvPr>
-        </p:nvSpPr>
-        <p:spPr/>
-        <p:txBody>
-          <a:bodyPr>
-            <a:normAutofit/>
-          </a:bodyPr>
-          <a:lstStyle/>
-          <a:p>
-            <a:r>
-              <a:rPr lang="en-US" dirty="0" smtClean="0"/>
-              <a:t>Prerequisites: </a:t>
-            </a:r>
-            <a:r>
-              <a:rPr lang="en-US" b="1" i="1" dirty="0" smtClean="0"/>
-              <a:t>SAGA Core Components </a:t>
-            </a:r>
-            <a:r>
-              <a:rPr lang="en-US" dirty="0" smtClean="0"/>
-              <a:t>and the Condor Client Tools (available at </a:t>
-            </a:r>
-            <a:r>
-              <a:rPr lang="de-DE" dirty="0"/>
-              <a:t>http://</a:t>
-            </a:r>
-            <a:r>
-              <a:rPr lang="de-DE" dirty="0" err="1"/>
-              <a:t>www.cs.wisc.edu</a:t>
-            </a:r>
-            <a:r>
-              <a:rPr lang="de-DE" dirty="0"/>
-              <a:t>/</a:t>
-            </a:r>
-            <a:r>
-              <a:rPr lang="de-DE" dirty="0" err="1"/>
-              <a:t>condor</a:t>
-            </a:r>
-            <a:r>
-              <a:rPr lang="de-DE" dirty="0"/>
-              <a:t>/</a:t>
-            </a:r>
-            <a:r>
-              <a:rPr lang="en-US" dirty="0" smtClean="0"/>
-              <a:t>)</a:t>
-            </a:r>
-          </a:p>
-          <a:p>
-            <a:r>
-              <a:rPr lang="en-US" dirty="0" smtClean="0"/>
-              <a:t>Download and unpack the Condor Adaptors </a:t>
-            </a:r>
-            <a:br>
-              <a:rPr lang="en-US" dirty="0" smtClean="0"/>
-            </a:br>
-            <a:r>
-              <a:rPr lang="en-US" dirty="0" smtClean="0"/>
-              <a:t>Run </a:t>
-            </a:r>
-            <a:r>
-              <a:rPr lang="en-US" b="1" dirty="0" smtClean="0"/>
-              <a:t>configure </a:t>
-            </a:r>
-            <a:r>
-              <a:rPr lang="en-US" dirty="0" smtClean="0"/>
-              <a:t>and </a:t>
-            </a:r>
-            <a:r>
-              <a:rPr lang="en-US" b="1" dirty="0" smtClean="0"/>
-              <a:t>make</a:t>
-            </a:r>
-            <a:r>
-              <a:rPr lang="en-US" dirty="0" smtClean="0"/>
-              <a:t>:</a:t>
-            </a:r>
-          </a:p>
-          <a:p>
-            <a:endParaRPr lang="en-US" dirty="0" smtClean="0"/>
-          </a:p>
-          <a:p>
-            <a:endParaRPr lang="en-US" dirty="0" smtClean="0"/>
-          </a:p>
-          <a:p>
-            <a:endParaRPr lang="en-US" dirty="0" smtClean="0"/>
-          </a:p>
-          <a:p>
-            <a:pPr marL="0" indent="0">
-              <a:buNone/>
-            </a:pPr>
-            <a:endParaRPr lang="en-US" dirty="0" smtClean="0"/>
-          </a:p>
-        </p:txBody>
-      </p:sp>
-      <p:sp>
-        <p:nvSpPr>
-          <p:cNvPr id="6" name="TextBox 5"/>
-          <p:cNvSpPr txBox="1"/>
-          <p:nvPr/>
-        </p:nvSpPr>
-        <p:spPr>
-          <a:xfrm>
-            <a:off x="1481601" y="4127996"/>
-            <a:ext cx="7243299" cy="1384995"/>
-          </a:xfrm>
-          <a:prstGeom prst="rect">
-            <a:avLst/>
-          </a:prstGeom>
-          <a:solidFill>
-            <a:srgbClr val="D7D9CD"/>
-          </a:solidFill>
-          <a:ln>
-            <a:solidFill>
-              <a:srgbClr val="8BADBD"/>
-            </a:solidFill>
-          </a:ln>
-        </p:spPr>
-        <p:style>
-          <a:lnRef idx="2">
-            <a:schemeClr val="accent4"/>
-          </a:lnRef>
-          <a:fillRef idx="1">
-            <a:schemeClr val="lt1"/>
-          </a:fillRef>
-          <a:effectRef idx="0">
-            <a:schemeClr val="accent4"/>
-          </a:effectRef>
-          <a:fontRef idx="minor">
-            <a:schemeClr val="dk1"/>
-          </a:fontRef>
-        </p:style>
-        <p:txBody>
-          <a:bodyPr wrap="square" rtlCol="0">
-            <a:spAutoFit/>
-          </a:bodyPr>
-          <a:lstStyle/>
-          <a:p>
-            <a:r>
-              <a:rPr lang="en-US" sz="1200" dirty="0" smtClean="0">
-                <a:solidFill>
-                  <a:srgbClr val="7F7F7F"/>
-                </a:solidFill>
-                <a:latin typeface="Andale Mono"/>
-                <a:cs typeface="Andale Mono"/>
-              </a:rPr>
-              <a:t>$&gt; export SAGA_LOCATION=/install/location/dir/</a:t>
-            </a:r>
-          </a:p>
-          <a:p>
-            <a:endParaRPr lang="en-US" sz="1200" dirty="0" smtClean="0">
-              <a:latin typeface="Andale Mono"/>
-              <a:cs typeface="Andale Mono"/>
-            </a:endParaRPr>
-          </a:p>
-          <a:p>
-            <a:r>
-              <a:rPr lang="en-US" sz="1200" dirty="0" smtClean="0">
-                <a:latin typeface="Andale Mono"/>
-                <a:cs typeface="Andale Mono"/>
-              </a:rPr>
-              <a:t>$&gt; ./configure </a:t>
-            </a:r>
-            <a:r>
-              <a:rPr lang="en-US" sz="1200" dirty="0">
-                <a:solidFill>
-                  <a:schemeClr val="bg1">
-                    <a:lumMod val="50000"/>
-                  </a:schemeClr>
-                </a:solidFill>
-                <a:latin typeface="Andale Mono"/>
-                <a:cs typeface="Andale Mono"/>
-              </a:rPr>
-              <a:t>--with-</a:t>
-            </a:r>
-            <a:r>
-              <a:rPr lang="en-US" sz="1200" dirty="0" smtClean="0">
-                <a:solidFill>
-                  <a:schemeClr val="bg1">
-                    <a:lumMod val="50000"/>
-                  </a:schemeClr>
-                </a:solidFill>
-                <a:latin typeface="Andale Mono"/>
-                <a:cs typeface="Andale Mono"/>
-              </a:rPr>
-              <a:t>condor=</a:t>
-            </a:r>
-          </a:p>
-          <a:p>
-            <a:endParaRPr lang="en-US" sz="1200" dirty="0" smtClean="0">
-              <a:latin typeface="Andale Mono"/>
-              <a:cs typeface="Andale Mono"/>
-            </a:endParaRPr>
-          </a:p>
-          <a:p>
-            <a:r>
-              <a:rPr lang="en-US" sz="1200" dirty="0" smtClean="0">
-                <a:latin typeface="Andale Mono"/>
-                <a:cs typeface="Andale Mono"/>
-              </a:rPr>
-              <a:t>$&gt; </a:t>
-            </a:r>
-            <a:r>
-              <a:rPr lang="en-US" sz="1200" dirty="0" smtClean="0">
-                <a:solidFill>
-                  <a:srgbClr val="FF0000"/>
-                </a:solidFill>
-                <a:latin typeface="Andale Mono"/>
-                <a:cs typeface="Andale Mono"/>
-              </a:rPr>
-              <a:t>make</a:t>
-            </a:r>
-          </a:p>
-          <a:p>
-            <a:endParaRPr lang="en-US" sz="1200" dirty="0" smtClean="0">
-              <a:latin typeface="Andale Mono"/>
-              <a:cs typeface="Andale Mono"/>
-            </a:endParaRPr>
-          </a:p>
-          <a:p>
-            <a:r>
-              <a:rPr lang="en-US" sz="1200" dirty="0" smtClean="0">
-                <a:latin typeface="Andale Mono"/>
-                <a:cs typeface="Andale Mono"/>
-              </a:rPr>
-              <a:t>$&gt; make install</a:t>
-            </a:r>
-          </a:p>
-        </p:txBody>
-      </p:sp>
-    </p:spTree>
-    <p:extLst>
-      <p:ext uri="{BB962C8B-B14F-4D97-AF65-F5344CB8AC3E}">
-        <p14:creationId xmlns:mc="http://schemas.openxmlformats.org/markup-compatibility/2006" xmlns:mv="urn:schemas-microsoft-com:mac:vml" xmlns:p14="http://schemas.microsoft.com/office/powerpoint/2010/main" xmlns:p="http://schemas.openxmlformats.org/presentationml/2006/main" xmlns:r="http://schemas.openxmlformats.org/officeDocument/2006/relationships" xmlns:a="http://schemas.openxmlformats.org/drawingml/2006/main" xmlns="" val="3402884851"/>
-      </p:ext>
-    </p:extLst>
-  </p:cSld>
-  <p:clrMapOvr>
-    <a:masterClrMapping/>
-  </p:clrMapOvr>
-</p:sld>
-</file>
-
-<file path=ppt/slides/slide15.xml><?xml version="1.0" encoding="utf-8"?>
-<p:sld xmlns:a="http://schemas.openxmlformats.org/drawingml/2006/main" xmlns:r="http://schemas.openxmlformats.org/officeDocument/2006/relationships" xmlns:mc="http://schemas.openxmlformats.org/markup-compatibility/2006" xmlns:mv="urn:schemas-microsoft-com:mac:vml" xmlns:p="http://schemas.openxmlformats.org/presentationml/2006/main" mc:Ignorable="mv" mc:PreserveAttributes="mv:*">
-  <p:cSld>
-    <p:spTree>
-      <p:nvGrpSpPr>
-        <p:cNvPr id="1" name=""/>
-        <p:cNvGrpSpPr/>
-        <p:nvPr/>
-      </p:nvGrpSpPr>
-      <p:grpSpPr>
-        <a:xfrm>
-          <a:off x="0" y="0"/>
-          <a:ext cx="0" cy="0"/>
-          <a:chOff x="0" y="0"/>
-          <a:chExt cx="0" cy="0"/>
-        </a:xfrm>
-      </p:grpSpPr>
-      <p:sp>
-        <p:nvSpPr>
-          <p:cNvPr id="2" name="Title 1"/>
-          <p:cNvSpPr>
-            <a:spLocks noGrp="1"/>
-          </p:cNvSpPr>
-          <p:nvPr>
-            <p:ph type="title"/>
           </p:nvPr>
         </p:nvSpPr>
         <p:spPr/>
@@ -7082,746 +6381,43 @@
           <a:p>
             <a:r>
               <a:rPr lang="en-US" dirty="0" smtClean="0"/>
-              <a:t>Installation Recap</a:t>
+              <a:t>What we’re working on right now:</a:t>
+            </a:r>
+          </a:p>
+          <a:p>
+            <a:pPr lvl="1"/>
+            <a:r>
+              <a:rPr lang="en-US" dirty="0" smtClean="0"/>
+              <a:t>Hardening existing codebase</a:t>
+            </a:r>
+          </a:p>
+          <a:p>
+            <a:pPr lvl="1"/>
+            <a:r>
+              <a:rPr lang="en-US" dirty="0" smtClean="0"/>
+              <a:t>Mechanism to create custom binary packages (RPM and DEB) for RHEL, </a:t>
+            </a:r>
+            <a:r>
+              <a:rPr lang="en-US" dirty="0" err="1" smtClean="0"/>
+              <a:t>Ubuntu</a:t>
+            </a:r>
+            <a:r>
+              <a:rPr lang="en-US" dirty="0" smtClean="0"/>
+              <a:t> and Scientific Linux</a:t>
+            </a:r>
+          </a:p>
+          <a:p>
+            <a:r>
+              <a:rPr lang="en-US" dirty="0" smtClean="0"/>
+              <a:t>Supporting developers to develop saga-based applications and tools</a:t>
+            </a:r>
+          </a:p>
+          <a:p>
+            <a:r>
+              <a:rPr lang="en-US" dirty="0" smtClean="0"/>
+              <a:t>We’re working with infrastructure providers in the US as well as in Europe to make SAGA part of their standard software stack.</a:t>
             </a:r>
             <a:endParaRPr lang="en-US" dirty="0"/>
-          </a:p>
-        </p:txBody>
-      </p:sp>
-      <p:sp>
-        <p:nvSpPr>
-          <p:cNvPr id="3" name="Content Placeholder 2"/>
-          <p:cNvSpPr>
-            <a:spLocks noGrp="1"/>
-          </p:cNvSpPr>
-          <p:nvPr>
-            <p:ph idx="1"/>
-          </p:nvPr>
-        </p:nvSpPr>
-        <p:spPr/>
-        <p:txBody>
-          <a:bodyPr>
-            <a:normAutofit/>
-          </a:bodyPr>
-          <a:lstStyle/>
-          <a:p>
-            <a:r>
-              <a:rPr lang="en-US" dirty="0" smtClean="0"/>
-              <a:t>SAGA_LOCATION must point to your Core Components installation </a:t>
-            </a:r>
-          </a:p>
-          <a:p>
-            <a:r>
-              <a:rPr lang="en-US" dirty="0"/>
-              <a:t>D</a:t>
-            </a:r>
-            <a:r>
-              <a:rPr lang="en-US" dirty="0" smtClean="0"/>
-              <a:t>ifferent Adaptors may have different configure options</a:t>
-            </a:r>
-            <a:r>
-              <a:rPr lang="en-US" b="1" dirty="0" smtClean="0"/>
-              <a:t>. ./configure --help </a:t>
-            </a:r>
-            <a:r>
-              <a:rPr lang="en-US" dirty="0" smtClean="0"/>
-              <a:t>might help ;-) </a:t>
-            </a:r>
-          </a:p>
-          <a:p>
-            <a:r>
-              <a:rPr lang="en-US" dirty="0" smtClean="0"/>
-              <a:t>Each adaptor comes with a file called: </a:t>
-            </a:r>
-            <a:br>
-              <a:rPr lang="en-US" dirty="0" smtClean="0"/>
-            </a:br>
-            <a:r>
-              <a:rPr lang="en-US" dirty="0" smtClean="0"/>
-              <a:t/>
-            </a:r>
-            <a:br>
-              <a:rPr lang="en-US" dirty="0" smtClean="0"/>
-            </a:br>
-            <a:r>
-              <a:rPr lang="en-US" sz="4800" b="1" dirty="0" smtClean="0"/>
-              <a:t>INSTALL</a:t>
-            </a:r>
-            <a:r>
-              <a:rPr lang="en-US" sz="4800" dirty="0" smtClean="0"/>
-              <a:t/>
-            </a:r>
-            <a:br>
-              <a:rPr lang="en-US" sz="4800" dirty="0" smtClean="0"/>
-            </a:br>
-            <a:r>
-              <a:rPr lang="en-US" dirty="0" smtClean="0"/>
-              <a:t> </a:t>
-            </a:r>
-            <a:r>
-              <a:rPr lang="en-US" sz="4800" dirty="0" smtClean="0"/>
-              <a:t/>
-            </a:r>
-            <a:br>
-              <a:rPr lang="en-US" sz="4800" dirty="0" smtClean="0"/>
-            </a:br>
-            <a:r>
-              <a:rPr lang="en-US" sz="2200" dirty="0" smtClean="0"/>
-              <a:t>Read it! </a:t>
-            </a:r>
-          </a:p>
-        </p:txBody>
-      </p:sp>
-    </p:spTree>
-    <p:extLst>
-      <p:ext uri="{BB962C8B-B14F-4D97-AF65-F5344CB8AC3E}">
-        <p14:creationId xmlns:mc="http://schemas.openxmlformats.org/markup-compatibility/2006" xmlns:mv="urn:schemas-microsoft-com:mac:vml" xmlns:p14="http://schemas.microsoft.com/office/powerpoint/2010/main" xmlns:p="http://schemas.openxmlformats.org/presentationml/2006/main" xmlns:r="http://schemas.openxmlformats.org/officeDocument/2006/relationships" xmlns:a="http://schemas.openxmlformats.org/drawingml/2006/main" xmlns="" val="1068611830"/>
-      </p:ext>
-    </p:extLst>
-  </p:cSld>
-  <p:clrMapOvr>
-    <a:masterClrMapping/>
-  </p:clrMapOvr>
-</p:sld>
-</file>
-
-<file path=ppt/slides/slide16.xml><?xml version="1.0" encoding="utf-8"?>
-<p:sld xmlns:a="http://schemas.openxmlformats.org/drawingml/2006/main" xmlns:r="http://schemas.openxmlformats.org/officeDocument/2006/relationships" xmlns:mc="http://schemas.openxmlformats.org/markup-compatibility/2006" xmlns:mv="urn:schemas-microsoft-com:mac:vml" xmlns:p="http://schemas.openxmlformats.org/presentationml/2006/main" mc:Ignorable="mv" mc:PreserveAttributes="mv:*">
-  <p:cSld>
-    <p:spTree>
-      <p:nvGrpSpPr>
-        <p:cNvPr id="1" name=""/>
-        <p:cNvGrpSpPr/>
-        <p:nvPr/>
-      </p:nvGrpSpPr>
-      <p:grpSpPr>
-        <a:xfrm>
-          <a:off x="0" y="0"/>
-          <a:ext cx="0" cy="0"/>
-          <a:chOff x="0" y="0"/>
-          <a:chExt cx="0" cy="0"/>
-        </a:xfrm>
-      </p:grpSpPr>
-      <p:sp>
-        <p:nvSpPr>
-          <p:cNvPr id="2" name="Title 1"/>
-          <p:cNvSpPr>
-            <a:spLocks noGrp="1"/>
-          </p:cNvSpPr>
-          <p:nvPr>
-            <p:ph type="title"/>
-          </p:nvPr>
-        </p:nvSpPr>
-        <p:spPr/>
-        <p:txBody>
-          <a:bodyPr/>
-          <a:lstStyle/>
-          <a:p>
-            <a:r>
-              <a:rPr lang="en-US" dirty="0" smtClean="0"/>
-              <a:t>Configure Environment</a:t>
-            </a:r>
-            <a:endParaRPr lang="en-US" dirty="0"/>
-          </a:p>
-        </p:txBody>
-      </p:sp>
-      <p:sp>
-        <p:nvSpPr>
-          <p:cNvPr id="3" name="Content Placeholder 2"/>
-          <p:cNvSpPr>
-            <a:spLocks noGrp="1"/>
-          </p:cNvSpPr>
-          <p:nvPr>
-            <p:ph idx="1"/>
-          </p:nvPr>
-        </p:nvSpPr>
-        <p:spPr/>
-        <p:txBody>
-          <a:bodyPr/>
-          <a:lstStyle/>
-          <a:p>
-            <a:r>
-              <a:rPr lang="en-US" b="1" dirty="0" smtClean="0"/>
-              <a:t>SAGA_LOCATION </a:t>
-            </a:r>
-            <a:r>
-              <a:rPr lang="en-US" dirty="0" smtClean="0"/>
-              <a:t>is the only required environment variable. It makes sense to put it e.g. in your .</a:t>
-            </a:r>
-            <a:r>
-              <a:rPr lang="en-US" dirty="0" err="1" smtClean="0"/>
-              <a:t>bashrc</a:t>
-            </a:r>
-            <a:endParaRPr lang="en-US" dirty="0" smtClean="0"/>
-          </a:p>
-          <a:p>
-            <a:endParaRPr lang="en-US" dirty="0" smtClean="0"/>
-          </a:p>
-          <a:p>
-            <a:r>
-              <a:rPr lang="en-US" dirty="0" smtClean="0"/>
-              <a:t>You will also have to add SAGA to your loader and </a:t>
-            </a:r>
-            <a:br>
-              <a:rPr lang="en-US" dirty="0" smtClean="0"/>
-            </a:br>
-            <a:r>
-              <a:rPr lang="en-US" dirty="0" smtClean="0"/>
-              <a:t>Python paths if it is not installed in /</a:t>
-            </a:r>
-            <a:r>
-              <a:rPr lang="en-US" dirty="0" err="1" smtClean="0"/>
-              <a:t>usr</a:t>
-            </a:r>
-            <a:r>
-              <a:rPr lang="en-US" dirty="0" smtClean="0"/>
-              <a:t> or /</a:t>
-            </a:r>
-            <a:r>
-              <a:rPr lang="en-US" dirty="0" err="1" smtClean="0"/>
-              <a:t>usr</a:t>
-            </a:r>
-            <a:r>
-              <a:rPr lang="en-US" dirty="0" smtClean="0"/>
-              <a:t>/local</a:t>
-            </a:r>
-            <a:endParaRPr lang="en-US" dirty="0"/>
-          </a:p>
-        </p:txBody>
-      </p:sp>
-      <p:sp>
-        <p:nvSpPr>
-          <p:cNvPr id="4" name="TextBox 3"/>
-          <p:cNvSpPr txBox="1"/>
-          <p:nvPr/>
-        </p:nvSpPr>
-        <p:spPr>
-          <a:xfrm>
-            <a:off x="1481601" y="2979801"/>
-            <a:ext cx="7243299" cy="276999"/>
-          </a:xfrm>
-          <a:prstGeom prst="rect">
-            <a:avLst/>
-          </a:prstGeom>
-          <a:solidFill>
-            <a:srgbClr val="D7D9CD"/>
-          </a:solidFill>
-          <a:ln>
-            <a:solidFill>
-              <a:srgbClr val="8BADBD"/>
-            </a:solidFill>
-          </a:ln>
-        </p:spPr>
-        <p:style>
-          <a:lnRef idx="2">
-            <a:schemeClr val="accent4"/>
-          </a:lnRef>
-          <a:fillRef idx="1">
-            <a:schemeClr val="lt1"/>
-          </a:fillRef>
-          <a:effectRef idx="0">
-            <a:schemeClr val="accent4"/>
-          </a:effectRef>
-          <a:fontRef idx="minor">
-            <a:schemeClr val="dk1"/>
-          </a:fontRef>
-        </p:style>
-        <p:txBody>
-          <a:bodyPr wrap="square" rtlCol="0">
-            <a:spAutoFit/>
-          </a:bodyPr>
-          <a:lstStyle/>
-          <a:p>
-            <a:r>
-              <a:rPr lang="en-US" sz="1200" dirty="0" smtClean="0">
-                <a:latin typeface="Andale Mono"/>
-                <a:cs typeface="Andale Mono"/>
-              </a:rPr>
-              <a:t>export SAGA_LOCATION=/install/location/dir/</a:t>
-            </a:r>
-          </a:p>
-        </p:txBody>
-      </p:sp>
-      <p:sp>
-        <p:nvSpPr>
-          <p:cNvPr id="5" name="TextBox 4"/>
-          <p:cNvSpPr txBox="1"/>
-          <p:nvPr/>
-        </p:nvSpPr>
-        <p:spPr>
-          <a:xfrm>
-            <a:off x="1481601" y="4380002"/>
-            <a:ext cx="7243299" cy="830997"/>
-          </a:xfrm>
-          <a:prstGeom prst="rect">
-            <a:avLst/>
-          </a:prstGeom>
-          <a:solidFill>
-            <a:srgbClr val="D7D9CD"/>
-          </a:solidFill>
-          <a:ln>
-            <a:solidFill>
-              <a:srgbClr val="8BADBD"/>
-            </a:solidFill>
-          </a:ln>
-        </p:spPr>
-        <p:style>
-          <a:lnRef idx="2">
-            <a:schemeClr val="accent4"/>
-          </a:lnRef>
-          <a:fillRef idx="1">
-            <a:schemeClr val="lt1"/>
-          </a:fillRef>
-          <a:effectRef idx="0">
-            <a:schemeClr val="accent4"/>
-          </a:effectRef>
-          <a:fontRef idx="minor">
-            <a:schemeClr val="dk1"/>
-          </a:fontRef>
-        </p:style>
-        <p:txBody>
-          <a:bodyPr wrap="square" rtlCol="0">
-            <a:spAutoFit/>
-          </a:bodyPr>
-          <a:lstStyle/>
-          <a:p>
-            <a:r>
-              <a:rPr lang="en-US" sz="1200" dirty="0" smtClean="0">
-                <a:latin typeface="Andale Mono"/>
-                <a:cs typeface="Andale Mono"/>
-              </a:rPr>
-              <a:t>export LD_LIBRARY_PATH=${SAGA_LOCATION}/</a:t>
-            </a:r>
-            <a:r>
-              <a:rPr lang="en-US" sz="1200" dirty="0" err="1" smtClean="0">
-                <a:latin typeface="Andale Mono"/>
-                <a:cs typeface="Andale Mono"/>
-              </a:rPr>
-              <a:t>lib:$LD_LIBRARY_PATH</a:t>
-            </a:r>
-            <a:endParaRPr lang="en-US" sz="1200" dirty="0" smtClean="0">
-              <a:solidFill>
-                <a:srgbClr val="7F7F7F"/>
-              </a:solidFill>
-              <a:latin typeface="Andale Mono"/>
-              <a:cs typeface="Andale Mono"/>
-            </a:endParaRPr>
-          </a:p>
-          <a:p>
-            <a:r>
-              <a:rPr lang="en-US" sz="1200" dirty="0" smtClean="0">
-                <a:solidFill>
-                  <a:schemeClr val="bg1">
-                    <a:lumMod val="50000"/>
-                  </a:schemeClr>
-                </a:solidFill>
-                <a:latin typeface="Andale Mono"/>
-                <a:cs typeface="Andale Mono"/>
-              </a:rPr>
-              <a:t>export DYLD_LIBRARY_PATH=${SAGA_LOCATION}/</a:t>
-            </a:r>
-            <a:r>
-              <a:rPr lang="en-US" sz="1200" dirty="0" err="1" smtClean="0">
-                <a:solidFill>
-                  <a:schemeClr val="bg1">
-                    <a:lumMod val="50000"/>
-                  </a:schemeClr>
-                </a:solidFill>
-                <a:latin typeface="Andale Mono"/>
-                <a:cs typeface="Andale Mono"/>
-              </a:rPr>
-              <a:t>lib:$DYLD_LIBRARY_PATH</a:t>
-            </a:r>
-            <a:r>
-              <a:rPr lang="en-US" sz="1200" dirty="0" smtClean="0">
-                <a:solidFill>
-                  <a:schemeClr val="bg1">
-                    <a:lumMod val="50000"/>
-                  </a:schemeClr>
-                </a:solidFill>
-                <a:latin typeface="Andale Mono"/>
-                <a:cs typeface="Andale Mono"/>
-              </a:rPr>
-              <a:t>  # On </a:t>
-            </a:r>
-            <a:r>
-              <a:rPr lang="en-US" sz="1200" dirty="0" err="1" smtClean="0">
-                <a:solidFill>
-                  <a:schemeClr val="bg1">
-                    <a:lumMod val="50000"/>
-                  </a:schemeClr>
-                </a:solidFill>
-                <a:latin typeface="Andale Mono"/>
-                <a:cs typeface="Andale Mono"/>
-              </a:rPr>
-              <a:t>MacOS</a:t>
-            </a:r>
-            <a:endParaRPr lang="en-US" sz="1200" dirty="0" smtClean="0">
-              <a:solidFill>
-                <a:schemeClr val="bg1">
-                  <a:lumMod val="50000"/>
-                </a:schemeClr>
-              </a:solidFill>
-              <a:latin typeface="Andale Mono"/>
-              <a:cs typeface="Andale Mono"/>
-            </a:endParaRPr>
-          </a:p>
-          <a:p>
-            <a:endParaRPr lang="en-US" sz="1200" dirty="0" smtClean="0">
-              <a:solidFill>
-                <a:srgbClr val="7F7F7F"/>
-              </a:solidFill>
-              <a:latin typeface="Andale Mono"/>
-              <a:cs typeface="Andale Mono"/>
-            </a:endParaRPr>
-          </a:p>
-          <a:p>
-            <a:r>
-              <a:rPr lang="en-US" sz="1200" dirty="0" smtClean="0">
-                <a:latin typeface="Andale Mono"/>
-                <a:cs typeface="Andale Mono"/>
-              </a:rPr>
-              <a:t>export PYTHONPATH=${SAGA_LOCATION/lib/</a:t>
-            </a:r>
-            <a:r>
-              <a:rPr lang="en-US" sz="1200" dirty="0" err="1" smtClean="0">
-                <a:latin typeface="Andale Mono"/>
-                <a:cs typeface="Andale Mono"/>
-              </a:rPr>
-              <a:t>pythonX.Y</a:t>
-            </a:r>
-            <a:r>
-              <a:rPr lang="en-US" sz="1200" dirty="0" smtClean="0">
-                <a:latin typeface="Andale Mono"/>
-                <a:cs typeface="Andale Mono"/>
-              </a:rPr>
-              <a:t>/site-packages/:${PYTHONPATH}</a:t>
-            </a:r>
-            <a:endParaRPr lang="en-US" sz="1200" dirty="0" smtClean="0">
-              <a:solidFill>
-                <a:srgbClr val="7F7F7F"/>
-              </a:solidFill>
-              <a:latin typeface="Andale Mono"/>
-              <a:cs typeface="Andale Mono"/>
-            </a:endParaRPr>
-          </a:p>
-        </p:txBody>
-      </p:sp>
-    </p:spTree>
-  </p:cSld>
-  <p:clrMapOvr>
-    <a:masterClrMapping/>
-  </p:clrMapOvr>
-</p:sld>
-</file>
-
-<file path=ppt/slides/slide17.xml><?xml version="1.0" encoding="utf-8"?>
-<p:sld xmlns:a="http://schemas.openxmlformats.org/drawingml/2006/main" xmlns:r="http://schemas.openxmlformats.org/officeDocument/2006/relationships" xmlns:mc="http://schemas.openxmlformats.org/markup-compatibility/2006" xmlns:mv="urn:schemas-microsoft-com:mac:vml" xmlns:p="http://schemas.openxmlformats.org/presentationml/2006/main" mc:Ignorable="mv" mc:PreserveAttributes="mv:*">
-  <p:cSld>
-    <p:spTree>
-      <p:nvGrpSpPr>
-        <p:cNvPr id="1" name=""/>
-        <p:cNvGrpSpPr/>
-        <p:nvPr/>
-      </p:nvGrpSpPr>
-      <p:grpSpPr>
-        <a:xfrm>
-          <a:off x="0" y="0"/>
-          <a:ext cx="0" cy="0"/>
-          <a:chOff x="0" y="0"/>
-          <a:chExt cx="0" cy="0"/>
-        </a:xfrm>
-      </p:grpSpPr>
-      <p:sp>
-        <p:nvSpPr>
-          <p:cNvPr id="2" name="Title 1"/>
-          <p:cNvSpPr>
-            <a:spLocks noGrp="1"/>
-          </p:cNvSpPr>
-          <p:nvPr>
-            <p:ph type="title"/>
-          </p:nvPr>
-        </p:nvSpPr>
-        <p:spPr/>
-        <p:txBody>
-          <a:bodyPr/>
-          <a:lstStyle/>
-          <a:p>
-            <a:r>
-              <a:rPr lang="en-US" dirty="0" smtClean="0"/>
-              <a:t>Test The Installation</a:t>
-            </a:r>
-            <a:endParaRPr lang="en-US" dirty="0"/>
-          </a:p>
-        </p:txBody>
-      </p:sp>
-      <p:sp>
-        <p:nvSpPr>
-          <p:cNvPr id="3" name="Content Placeholder 2"/>
-          <p:cNvSpPr>
-            <a:spLocks noGrp="1"/>
-          </p:cNvSpPr>
-          <p:nvPr>
-            <p:ph idx="1"/>
-          </p:nvPr>
-        </p:nvSpPr>
-        <p:spPr/>
-        <p:txBody>
-          <a:bodyPr/>
-          <a:lstStyle/>
-          <a:p>
-            <a:r>
-              <a:rPr lang="en-US" dirty="0" smtClean="0"/>
-              <a:t>Use the SAGA file tool to print the contents of a file</a:t>
-            </a:r>
-          </a:p>
-          <a:p>
-            <a:endParaRPr lang="en-US" dirty="0" smtClean="0"/>
-          </a:p>
-          <a:p>
-            <a:endParaRPr lang="en-US" dirty="0" smtClean="0"/>
-          </a:p>
-          <a:p>
-            <a:r>
-              <a:rPr lang="en-US" dirty="0" smtClean="0"/>
-              <a:t>Import the SAGA module into Python</a:t>
-            </a:r>
-          </a:p>
-        </p:txBody>
-      </p:sp>
-      <p:sp>
-        <p:nvSpPr>
-          <p:cNvPr id="4" name="TextBox 3"/>
-          <p:cNvSpPr txBox="1"/>
-          <p:nvPr/>
-        </p:nvSpPr>
-        <p:spPr>
-          <a:xfrm>
-            <a:off x="1481601" y="4380002"/>
-            <a:ext cx="7243299" cy="1569660"/>
-          </a:xfrm>
-          <a:prstGeom prst="rect">
-            <a:avLst/>
-          </a:prstGeom>
-          <a:solidFill>
-            <a:srgbClr val="D7D9CD"/>
-          </a:solidFill>
-          <a:ln>
-            <a:solidFill>
-              <a:srgbClr val="8BADBD"/>
-            </a:solidFill>
-          </a:ln>
-        </p:spPr>
-        <p:style>
-          <a:lnRef idx="2">
-            <a:schemeClr val="accent4"/>
-          </a:lnRef>
-          <a:fillRef idx="1">
-            <a:schemeClr val="lt1"/>
-          </a:fillRef>
-          <a:effectRef idx="0">
-            <a:schemeClr val="accent4"/>
-          </a:effectRef>
-          <a:fontRef idx="minor">
-            <a:schemeClr val="dk1"/>
-          </a:fontRef>
-        </p:style>
-        <p:txBody>
-          <a:bodyPr wrap="square" rtlCol="0">
-            <a:spAutoFit/>
-          </a:bodyPr>
-          <a:lstStyle/>
-          <a:p>
-            <a:r>
-              <a:rPr lang="en-US" sz="1200" dirty="0" smtClean="0">
-                <a:latin typeface="Andale Mono"/>
-                <a:cs typeface="Andale Mono"/>
-              </a:rPr>
-              <a:t>$ python</a:t>
-            </a:r>
-          </a:p>
-          <a:p>
-            <a:r>
-              <a:rPr lang="en-US" sz="1200" dirty="0" smtClean="0">
-                <a:solidFill>
-                  <a:srgbClr val="7F7F7F"/>
-                </a:solidFill>
-                <a:latin typeface="Andale Mono"/>
-                <a:cs typeface="Andale Mono"/>
-              </a:rPr>
-              <a:t>Python 2.6.1 (r261:67515, Feb 11 2010, 00:51:29) </a:t>
-            </a:r>
-          </a:p>
-          <a:p>
-            <a:r>
-              <a:rPr lang="en-US" sz="1200" dirty="0" smtClean="0">
-                <a:solidFill>
-                  <a:srgbClr val="7F7F7F"/>
-                </a:solidFill>
-                <a:latin typeface="Andale Mono"/>
-                <a:cs typeface="Andale Mono"/>
-              </a:rPr>
-              <a:t>[GCC 4.2.1 (Apple Inc. build 5646)] on </a:t>
-            </a:r>
-            <a:r>
-              <a:rPr lang="en-US" sz="1200" dirty="0" err="1" smtClean="0">
-                <a:solidFill>
-                  <a:srgbClr val="7F7F7F"/>
-                </a:solidFill>
-                <a:latin typeface="Andale Mono"/>
-                <a:cs typeface="Andale Mono"/>
-              </a:rPr>
-              <a:t>darwin</a:t>
-            </a:r>
-            <a:endParaRPr lang="en-US" sz="1200" dirty="0" smtClean="0">
-              <a:solidFill>
-                <a:srgbClr val="7F7F7F"/>
-              </a:solidFill>
-              <a:latin typeface="Andale Mono"/>
-              <a:cs typeface="Andale Mono"/>
-            </a:endParaRPr>
-          </a:p>
-          <a:p>
-            <a:r>
-              <a:rPr lang="en-US" sz="1200" dirty="0" smtClean="0">
-                <a:solidFill>
-                  <a:srgbClr val="7F7F7F"/>
-                </a:solidFill>
-                <a:latin typeface="Andale Mono"/>
-                <a:cs typeface="Andale Mono"/>
-              </a:rPr>
-              <a:t>Type "help", "copyright", "credits" or "license" for more information.</a:t>
-            </a:r>
-          </a:p>
-          <a:p>
-            <a:r>
-              <a:rPr lang="en-US" sz="1200" dirty="0" smtClean="0">
-                <a:latin typeface="Andale Mono"/>
-                <a:cs typeface="Andale Mono"/>
-              </a:rPr>
-              <a:t>&gt;&gt;&gt; import saga</a:t>
-            </a:r>
-          </a:p>
-          <a:p>
-            <a:r>
-              <a:rPr lang="en-US" sz="1200" dirty="0" smtClean="0">
-                <a:latin typeface="Andale Mono"/>
-                <a:cs typeface="Andale Mono"/>
-              </a:rPr>
-              <a:t>&gt;&gt;&gt; saga</a:t>
-            </a:r>
-          </a:p>
-          <a:p>
-            <a:r>
-              <a:rPr lang="en-US" sz="1200" dirty="0" smtClean="0">
-                <a:solidFill>
-                  <a:srgbClr val="7F7F7F"/>
-                </a:solidFill>
-                <a:latin typeface="Andale Mono"/>
-                <a:cs typeface="Andale Mono"/>
-              </a:rPr>
-              <a:t>&lt;module 'saga' from '/opt/saga-svn/lib/python2.6.1/site-packages/saga/__init__.pyc'&gt;</a:t>
-            </a:r>
-          </a:p>
-        </p:txBody>
-      </p:sp>
-      <p:sp>
-        <p:nvSpPr>
-          <p:cNvPr id="5" name="TextBox 4"/>
-          <p:cNvSpPr txBox="1"/>
-          <p:nvPr/>
-        </p:nvSpPr>
-        <p:spPr>
-          <a:xfrm>
-            <a:off x="1481601" y="2662194"/>
-            <a:ext cx="7243299" cy="830997"/>
-          </a:xfrm>
-          <a:prstGeom prst="rect">
-            <a:avLst/>
-          </a:prstGeom>
-          <a:solidFill>
-            <a:srgbClr val="D7D9CD"/>
-          </a:solidFill>
-          <a:ln>
-            <a:solidFill>
-              <a:srgbClr val="8BADBD"/>
-            </a:solidFill>
-          </a:ln>
-        </p:spPr>
-        <p:style>
-          <a:lnRef idx="2">
-            <a:schemeClr val="accent4"/>
-          </a:lnRef>
-          <a:fillRef idx="1">
-            <a:schemeClr val="lt1"/>
-          </a:fillRef>
-          <a:effectRef idx="0">
-            <a:schemeClr val="accent4"/>
-          </a:effectRef>
-          <a:fontRef idx="minor">
-            <a:schemeClr val="dk1"/>
-          </a:fontRef>
-        </p:style>
-        <p:txBody>
-          <a:bodyPr wrap="square" rtlCol="0">
-            <a:spAutoFit/>
-          </a:bodyPr>
-          <a:lstStyle/>
-          <a:p>
-            <a:r>
-              <a:rPr lang="en-US" sz="1200" dirty="0" smtClean="0">
-                <a:latin typeface="Andale Mono"/>
-                <a:cs typeface="Andale Mono"/>
-              </a:rPr>
-              <a:t>$ SAGA_LOCATION/bin/saga-file cat file://</a:t>
-            </a:r>
-            <a:r>
-              <a:rPr lang="en-US" sz="1200" dirty="0" err="1" smtClean="0">
-                <a:latin typeface="Andale Mono"/>
-                <a:cs typeface="Andale Mono"/>
-              </a:rPr>
-              <a:t>localhost/etc/passwd</a:t>
-            </a:r>
-            <a:endParaRPr lang="en-US" sz="1200" dirty="0" smtClean="0">
-              <a:latin typeface="Andale Mono"/>
-              <a:cs typeface="Andale Mono"/>
-            </a:endParaRPr>
-          </a:p>
-          <a:p>
-            <a:r>
-              <a:rPr lang="en-US" sz="1200" dirty="0" smtClean="0">
-                <a:solidFill>
-                  <a:srgbClr val="7F7F7F"/>
-                </a:solidFill>
-                <a:latin typeface="Andale Mono"/>
-                <a:cs typeface="Andale Mono"/>
-              </a:rPr>
-              <a:t>..</a:t>
-            </a:r>
-          </a:p>
-          <a:p>
-            <a:r>
-              <a:rPr lang="en-US" sz="1200" dirty="0" smtClean="0">
-                <a:solidFill>
-                  <a:srgbClr val="7F7F7F"/>
-                </a:solidFill>
-                <a:latin typeface="Andale Mono"/>
-                <a:cs typeface="Andale Mono"/>
-              </a:rPr>
-              <a:t>..</a:t>
-            </a:r>
-          </a:p>
-          <a:p>
-            <a:r>
-              <a:rPr lang="en-US" sz="1200" dirty="0" smtClean="0">
-                <a:solidFill>
-                  <a:srgbClr val="7F7F7F"/>
-                </a:solidFill>
-                <a:latin typeface="Andale Mono"/>
-                <a:cs typeface="Andale Mono"/>
-              </a:rPr>
-              <a:t>..</a:t>
-            </a:r>
           </a:p>
         </p:txBody>
       </p:sp>
@@ -7906,39 +6502,30 @@
             <a:pPr lvl="1"/>
             <a:r>
               <a:rPr lang="en-US" dirty="0" smtClean="0"/>
-              <a:t>Available</a:t>
-            </a:r>
-            <a:r>
-              <a:rPr lang="en-US" dirty="0" smtClean="0"/>
-              <a:t> middleware bindings</a:t>
+              <a:t>Available middleware bindings</a:t>
+            </a:r>
+          </a:p>
+          <a:p>
+            <a:r>
+              <a:rPr lang="en-US" dirty="0" smtClean="0"/>
+              <a:t>The SAGA build system</a:t>
+            </a:r>
+          </a:p>
+          <a:p>
+            <a:r>
+              <a:rPr lang="en-US" dirty="0" smtClean="0"/>
+              <a:t>Mephisto:  A SAGA bootstrapping tool</a:t>
             </a:r>
             <a:endParaRPr lang="en-US" dirty="0" smtClean="0"/>
           </a:p>
           <a:p>
             <a:r>
               <a:rPr lang="en-US" dirty="0" smtClean="0"/>
-              <a:t>The SAGA </a:t>
-            </a:r>
-            <a:r>
-              <a:rPr lang="en-US" dirty="0" smtClean="0"/>
-              <a:t>build system</a:t>
-            </a:r>
-            <a:endParaRPr lang="en-US" dirty="0" smtClean="0"/>
-          </a:p>
-          <a:p>
-            <a:r>
-              <a:rPr lang="en-US" dirty="0" smtClean="0"/>
-              <a:t>Mephisto:</a:t>
-            </a:r>
-            <a:r>
-              <a:rPr lang="en-US" dirty="0" smtClean="0"/>
-              <a:t> a SAGA deployment/testing tool</a:t>
-            </a:r>
-          </a:p>
-          <a:p>
-            <a:r>
-              <a:rPr lang="en-US" dirty="0" smtClean="0"/>
-              <a:t>Cyber-infrastructure deployment</a:t>
+              <a:t>Ongoing cyber</a:t>
+            </a:r>
+            <a:r>
+              <a:rPr lang="en-US" dirty="0" smtClean="0"/>
+              <a:t>-infrastructure deployment</a:t>
             </a:r>
           </a:p>
           <a:p>
@@ -7961,14 +6548,12 @@
               <a:rPr lang="en-US" dirty="0" smtClean="0"/>
               <a:t>FutureGrid</a:t>
             </a:r>
-            <a:endParaRPr lang="en-US" dirty="0" smtClean="0"/>
           </a:p>
           <a:p>
             <a:r>
               <a:rPr lang="en-US" dirty="0" smtClean="0"/>
               <a:t>Outlook</a:t>
             </a:r>
-            <a:endParaRPr lang="en-US" dirty="0" smtClean="0"/>
           </a:p>
         </p:txBody>
       </p:sp>
@@ -8421,11 +7006,7 @@
             </a:r>
             <a:r>
               <a:rPr lang="en-US" dirty="0" smtClean="0"/>
-              <a:t> file </a:t>
-            </a:r>
-            <a:r>
-              <a:rPr lang="en-US" dirty="0" smtClean="0"/>
-              <a:t>op., </a:t>
+              <a:t> file op., </a:t>
             </a:r>
             <a:r>
               <a:rPr lang="en-US" i="1" dirty="0" smtClean="0"/>
@@ -8652,7 +7233,228 @@
           <a:bodyPr/>
           <a:lstStyle/>
           <a:p>
-            <a:endParaRPr lang="en-US"/>
+            <a:r>
+              <a:rPr lang="en-US" dirty="0" smtClean="0"/>
+              <a:t>Sophisticated configure/make-based build system</a:t>
+            </a:r>
+          </a:p>
+          <a:p>
+            <a:r>
+              <a:rPr lang="en-US" dirty="0" smtClean="0"/>
+              <a:t>External dependencies are checked by configure/m4</a:t>
+            </a:r>
+          </a:p>
+          <a:p>
+            <a:r>
+              <a:rPr lang="en-US" dirty="0" smtClean="0"/>
+              <a:t>Internal dependencies between components are checked via the environment variable </a:t>
+            </a:r>
+            <a:r>
+              <a:rPr lang="en-US" b="1" dirty="0" smtClean="0"/>
+              <a:t>SAGA_LOCATION</a:t>
+            </a:r>
+          </a:p>
+        </p:txBody>
+      </p:sp>
+      <p:sp>
+        <p:nvSpPr>
+          <p:cNvPr id="6" name="TextBox 5"/>
+          <p:cNvSpPr txBox="1"/>
+          <p:nvPr/>
+        </p:nvSpPr>
+        <p:spPr>
+          <a:xfrm>
+            <a:off x="1481601" y="4013200"/>
+            <a:ext cx="6913099" cy="2492990"/>
+          </a:xfrm>
+          <a:prstGeom prst="rect">
+            <a:avLst/>
+          </a:prstGeom>
+          <a:solidFill>
+            <a:srgbClr val="D7D9CD"/>
+          </a:solidFill>
+          <a:ln>
+            <a:solidFill>
+              <a:srgbClr val="8BADBD"/>
+            </a:solidFill>
+          </a:ln>
+        </p:spPr>
+        <p:style>
+          <a:lnRef idx="2">
+            <a:schemeClr val="accent4"/>
+          </a:lnRef>
+          <a:fillRef idx="1">
+            <a:schemeClr val="lt1"/>
+          </a:fillRef>
+          <a:effectRef idx="0">
+            <a:schemeClr val="accent4"/>
+          </a:effectRef>
+          <a:fontRef idx="minor">
+            <a:schemeClr val="dk1"/>
+          </a:fontRef>
+        </p:style>
+        <p:txBody>
+          <a:bodyPr wrap="square" rtlCol="0">
+            <a:spAutoFit/>
+          </a:bodyPr>
+          <a:lstStyle/>
+          <a:p>
+            <a:r>
+              <a:rPr lang="en-US" sz="1200" dirty="0" smtClean="0">
+                <a:latin typeface="Andale Mono"/>
+                <a:cs typeface="Andale Mono"/>
+              </a:rPr>
+              <a:t>$&gt; export </a:t>
+            </a:r>
+            <a:r>
+              <a:rPr lang="en-US" sz="1200" b="1" dirty="0" smtClean="0">
+                <a:latin typeface="Andale Mono"/>
+                <a:cs typeface="Andale Mono"/>
+              </a:rPr>
+              <a:t>SAGA_LOCATION</a:t>
+            </a:r>
+            <a:r>
+              <a:rPr lang="en-US" sz="1200" dirty="0" smtClean="0">
+                <a:latin typeface="Andale Mono"/>
+                <a:cs typeface="Andale Mono"/>
+              </a:rPr>
+              <a:t>=/install/location/</a:t>
+            </a:r>
+          </a:p>
+          <a:p>
+            <a:r>
+              <a:rPr lang="en-US" sz="1200" dirty="0" smtClean="0">
+                <a:latin typeface="Andale Mono"/>
+                <a:cs typeface="Andale Mono"/>
+              </a:rPr>
+              <a:t>$&gt; </a:t>
+            </a:r>
+            <a:r>
+              <a:rPr lang="en-US" sz="1200" dirty="0" err="1" smtClean="0">
+                <a:latin typeface="Andale Mono"/>
+                <a:cs typeface="Andale Mono"/>
+              </a:rPr>
+              <a:t>cd</a:t>
+            </a:r>
+            <a:r>
+              <a:rPr lang="en-US" sz="1200" dirty="0" smtClean="0">
+                <a:latin typeface="Andale Mono"/>
+                <a:cs typeface="Andale Mono"/>
+              </a:rPr>
+              <a:t> saga-bindings-python-0.9.3</a:t>
+            </a:r>
+          </a:p>
+          <a:p>
+            <a:r>
+              <a:rPr lang="en-US" sz="1200" dirty="0" smtClean="0">
+                <a:latin typeface="Andale Mono"/>
+                <a:cs typeface="Andale Mono"/>
+              </a:rPr>
+              <a:t>$&gt; ./configure</a:t>
+            </a:r>
+            <a:endParaRPr lang="en-US" sz="1200" dirty="0" smtClean="0">
+              <a:solidFill>
+                <a:schemeClr val="bg1">
+                  <a:lumMod val="50000"/>
+                </a:schemeClr>
+              </a:solidFill>
+              <a:latin typeface="Andale Mono"/>
+              <a:cs typeface="Andale Mono"/>
+            </a:endParaRPr>
+          </a:p>
+          <a:p>
+            <a:endParaRPr lang="en-US" sz="1200" dirty="0" smtClean="0">
+              <a:latin typeface="Andale Mono"/>
+              <a:cs typeface="Andale Mono"/>
+            </a:endParaRPr>
+          </a:p>
+          <a:p>
+            <a:r>
+              <a:rPr lang="en-US" sz="1200" dirty="0" smtClean="0">
+                <a:latin typeface="Andale Mono"/>
+                <a:cs typeface="Andale Mono"/>
+              </a:rPr>
+              <a:t> ========================================================              </a:t>
+            </a:r>
+          </a:p>
+          <a:p>
+            <a:r>
+              <a:rPr lang="en-US" sz="1200" dirty="0" smtClean="0">
+                <a:latin typeface="Andale Mono"/>
+                <a:cs typeface="Andale Mono"/>
+              </a:rPr>
+              <a:t> SAGA Python BINDINGS - Configuration Summary                          </a:t>
+            </a:r>
+          </a:p>
+          <a:p>
+            <a:r>
+              <a:rPr lang="en-US" sz="1200" dirty="0" smtClean="0">
+                <a:latin typeface="Andale Mono"/>
+                <a:cs typeface="Andale Mono"/>
+              </a:rPr>
+              <a:t> ========================================================              </a:t>
+            </a:r>
+          </a:p>
+          <a:p>
+            <a:r>
+              <a:rPr lang="en-US" sz="1200" dirty="0" smtClean="0">
+                <a:latin typeface="Andale Mono"/>
+                <a:cs typeface="Andale Mono"/>
+              </a:rPr>
+              <a:t>                                                                       </a:t>
+            </a:r>
+          </a:p>
+          <a:p>
+            <a:r>
+              <a:rPr lang="en-US" sz="1200" dirty="0" smtClean="0">
+                <a:latin typeface="Andale Mono"/>
+                <a:cs typeface="Andale Mono"/>
+              </a:rPr>
+              <a:t> </a:t>
+            </a:r>
+            <a:r>
+              <a:rPr lang="en-US" sz="1200" b="1" dirty="0" smtClean="0">
+                <a:latin typeface="Andale Mono"/>
+                <a:cs typeface="Andale Mono"/>
+              </a:rPr>
+              <a:t>Using SAGA from       : /opt/saga-1.5.3-pre/ (install)       </a:t>
+            </a:r>
+          </a:p>
+          <a:p>
+            <a:r>
+              <a:rPr lang="en-US" sz="1200" dirty="0" smtClean="0">
+                <a:latin typeface="Andale Mono"/>
+                <a:cs typeface="Andale Mono"/>
+              </a:rPr>
+              <a:t>                                                                       </a:t>
+            </a:r>
+          </a:p>
+          <a:p>
+            <a:r>
+              <a:rPr lang="en-US" sz="1200" dirty="0" smtClean="0">
+                <a:latin typeface="Andale Mono"/>
+                <a:cs typeface="Andale Mono"/>
+              </a:rPr>
+              <a:t> Python Found          : yes                                  </a:t>
+            </a:r>
+          </a:p>
+          <a:p>
+            <a:r>
+              <a:rPr lang="en-US" sz="1200" dirty="0" smtClean="0">
+                <a:latin typeface="Andale Mono"/>
+                <a:cs typeface="Andale Mono"/>
+              </a:rPr>
+              <a:t> Python Version        : 2.6.1</a:t>
+            </a:r>
+          </a:p>
+          <a:p>
+            <a:r>
+              <a:rPr lang="en-US" sz="1200" dirty="0" smtClean="0">
+                <a:latin typeface="Andale Mono"/>
+                <a:cs typeface="Andale Mono"/>
+              </a:rPr>
+              <a:t> ...</a:t>
+            </a:r>
           </a:p>
         </p:txBody>
       </p:sp>
@@ -8698,82 +7500,322 @@
           <a:p>
             <a:r>
               <a:rPr lang="en-US" dirty="0" smtClean="0"/>
-              <a:t>Mephisto:</a:t>
-            </a:r>
-            <a:r>
-              <a:rPr lang="en-US" dirty="0" smtClean="0"/>
-              <a:t> SAGA Deployment | Testing</a:t>
+              <a:t>SAGA’s Build System (cont.)</a:t>
             </a:r>
             <a:endParaRPr lang="en-US" dirty="0"/>
           </a:p>
         </p:txBody>
       </p:sp>
-      <p:pic>
-        <p:nvPicPr>
-          <p:cNvPr id="6" name="Content Placeholder 3" descr="screenshot.png"/>
-          <p:cNvPicPr>
-            <a:picLocks noGrp="1" noChangeAspect="1"/>
-          </p:cNvPicPr>
+      <p:sp>
+        <p:nvSpPr>
+          <p:cNvPr id="3" name="Content Placeholder 2"/>
+          <p:cNvSpPr>
+            <a:spLocks noGrp="1"/>
+          </p:cNvSpPr>
           <p:nvPr>
             <p:ph idx="1"/>
           </p:nvPr>
-        </p:nvPicPr>
-        <p:blipFill>
-          <a:blip r:embed="rId2"/>
-          <a:srcRect l="-12297" r="-12297"/>
-          <a:stretch>
-            <a:fillRect/>
-          </a:stretch>
-        </p:blipFill>
+        </p:nvSpPr>
+        <p:spPr/>
+        <p:txBody>
+          <a:bodyPr/>
+          <a:lstStyle/>
+          <a:p>
+            <a:r>
+              <a:rPr lang="en-US" dirty="0" smtClean="0"/>
+              <a:t>./configure will tell you if requirements are not met:</a:t>
+            </a:r>
+          </a:p>
+          <a:p>
+            <a:pPr>
+              <a:buNone/>
+            </a:pPr>
+            <a:endParaRPr lang="en-US" dirty="0" smtClean="0"/>
+          </a:p>
+          <a:p>
+            <a:pPr>
+              <a:buNone/>
+            </a:pPr>
+            <a:endParaRPr lang="en-US" dirty="0" smtClean="0"/>
+          </a:p>
+          <a:p>
+            <a:r>
+              <a:rPr lang="en-US" dirty="0" smtClean="0"/>
+              <a:t>And if SAGA_LOCATION is not set, you will definitely end up with an error:</a:t>
+            </a:r>
+            <a:endParaRPr lang="en-US" b="1" dirty="0" smtClean="0"/>
+          </a:p>
+        </p:txBody>
+      </p:sp>
+      <p:sp>
+        <p:nvSpPr>
+          <p:cNvPr id="6" name="TextBox 5"/>
+          <p:cNvSpPr txBox="1"/>
+          <p:nvPr/>
+        </p:nvSpPr>
         <p:spPr>
           <a:xfrm>
-            <a:off x="465296" y="2305050"/>
-            <a:ext cx="8359617" cy="4552950"/>
-          </a:xfrm>
-        </p:spPr>
-      </p:pic>
-      <p:sp>
-        <p:nvSpPr>
-          <p:cNvPr id="4" name="Rectangle 3"/>
-          <p:cNvSpPr/>
-          <p:nvPr/>
-        </p:nvSpPr>
-        <p:spPr>
-          <a:xfrm>
-            <a:off x="1585912" y="1935718"/>
-            <a:ext cx="7837487" cy="369332"/>
+            <a:off x="1481601" y="4575502"/>
+            <a:ext cx="6913099" cy="1754327"/>
           </a:xfrm>
           <a:prstGeom prst="rect">
             <a:avLst/>
           </a:prstGeom>
+          <a:solidFill>
+            <a:srgbClr val="D7D9CD"/>
+          </a:solidFill>
+          <a:ln>
+            <a:solidFill>
+              <a:srgbClr val="8BADBD"/>
+            </a:solidFill>
+          </a:ln>
         </p:spPr>
-        <p:txBody>
-          <a:bodyPr wrap="square">
+        <p:style>
+          <a:lnRef idx="2">
+            <a:schemeClr val="accent4"/>
+          </a:lnRef>
+          <a:fillRef idx="1">
+            <a:schemeClr val="lt1"/>
+          </a:fillRef>
+          <a:effectRef idx="0">
+            <a:schemeClr val="accent4"/>
+          </a:effectRef>
+          <a:fontRef idx="minor">
+            <a:schemeClr val="dk1"/>
+          </a:fontRef>
+        </p:style>
+        <p:txBody>
+          <a:bodyPr wrap="square" rtlCol="0">
             <a:spAutoFit/>
           </a:bodyPr>
           <a:lstStyle/>
           <a:p>
             <a:r>
-              <a:rPr lang="en-US" b="1" dirty="0" smtClean="0">
+              <a:rPr lang="en-US" sz="1200" dirty="0" smtClean="0">
+                <a:latin typeface="Andale Mono"/>
+                <a:cs typeface="Andale Mono"/>
+              </a:rPr>
+              <a:t>$&gt; unset </a:t>
+            </a:r>
+            <a:r>
+              <a:rPr lang="en-US" sz="1200" b="1" dirty="0" smtClean="0">
+                <a:latin typeface="Andale Mono"/>
+                <a:cs typeface="Andale Mono"/>
+              </a:rPr>
+              <a:t>SAGA_LOCATION</a:t>
+            </a:r>
+            <a:r>
+              <a:rPr lang="en-US" sz="1200" dirty="0" smtClean="0">
+                <a:latin typeface="Andale Mono"/>
+                <a:cs typeface="Andale Mono"/>
+              </a:rPr>
+              <a:t>=/install/location/</a:t>
+            </a:r>
+          </a:p>
+          <a:p>
+            <a:r>
+              <a:rPr lang="en-US" sz="1200" dirty="0" smtClean="0">
+                <a:latin typeface="Andale Mono"/>
+                <a:cs typeface="Andale Mono"/>
+              </a:rPr>
+              <a:t>$&gt; </a:t>
+            </a:r>
+            <a:r>
+              <a:rPr lang="en-US" sz="1200" dirty="0" err="1" smtClean="0">
+                <a:latin typeface="Andale Mono"/>
+                <a:cs typeface="Andale Mono"/>
+              </a:rPr>
+              <a:t>cd</a:t>
+            </a:r>
+            <a:r>
+              <a:rPr lang="en-US" sz="1200" dirty="0" smtClean="0">
+                <a:latin typeface="Andale Mono"/>
+                <a:cs typeface="Andale Mono"/>
+              </a:rPr>
+              <a:t> saga-bindings-python-0.9.3</a:t>
+            </a:r>
+          </a:p>
+          <a:p>
+            <a:r>
+              <a:rPr lang="en-US" sz="1200" dirty="0" smtClean="0">
+                <a:latin typeface="Andale Mono"/>
+                <a:cs typeface="Andale Mono"/>
+              </a:rPr>
+              <a:t>$&gt; ./configure</a:t>
+            </a:r>
+            <a:endParaRPr lang="en-US" sz="1200" dirty="0" smtClean="0">
+              <a:solidFill>
+                <a:schemeClr val="bg1">
+                  <a:lumMod val="50000"/>
+                </a:schemeClr>
+              </a:solidFill>
+              <a:latin typeface="Andale Mono"/>
+              <a:cs typeface="Andale Mono"/>
+            </a:endParaRPr>
+          </a:p>
+          <a:p>
+            <a:endParaRPr lang="en-US" sz="1200" dirty="0" smtClean="0">
+              <a:latin typeface="Andale Mono"/>
+              <a:cs typeface="Andale Mono"/>
+            </a:endParaRPr>
+          </a:p>
+          <a:p>
+            <a:r>
+              <a:rPr lang="en-US" sz="1200" dirty="0" smtClean="0">
+                <a:latin typeface="Andale Mono"/>
+                <a:cs typeface="Andale Mono"/>
+              </a:rPr>
+              <a:t>checking SAGA sources... not found</a:t>
+            </a:r>
+          </a:p>
+          <a:p>
+            <a:r>
+              <a:rPr lang="en-US" sz="1200" dirty="0" smtClean="0">
+                <a:latin typeface="Andale Mono"/>
+                <a:cs typeface="Andale Mono"/>
+              </a:rPr>
+              <a:t>checking SAGA installation... not found</a:t>
+            </a:r>
+          </a:p>
+          <a:p>
+            <a:r>
+              <a:rPr lang="en-US" sz="1200" dirty="0" smtClean="0">
+                <a:latin typeface="Andale Mono"/>
+                <a:cs typeface="Andale Mono"/>
+              </a:rPr>
+              <a:t>checking for saga-</a:t>
+            </a:r>
+            <a:r>
+              <a:rPr lang="en-US" sz="1200" dirty="0" err="1" smtClean="0">
+                <a:latin typeface="Andale Mono"/>
+                <a:cs typeface="Andale Mono"/>
+              </a:rPr>
+              <a:t>config</a:t>
+            </a:r>
+            <a:r>
+              <a:rPr lang="en-US" sz="1200" dirty="0" smtClean="0">
+                <a:latin typeface="Andale Mono"/>
+                <a:cs typeface="Andale Mono"/>
+              </a:rPr>
+              <a:t>... no</a:t>
+            </a:r>
+          </a:p>
+          <a:p>
+            <a:r>
+              <a:rPr lang="en-US" sz="1200" dirty="0" smtClean="0">
+                <a:latin typeface="Andale Mono"/>
+                <a:cs typeface="Andale Mono"/>
+              </a:rPr>
+              <a:t>checking saga-</a:t>
+            </a:r>
+            <a:r>
+              <a:rPr lang="en-US" sz="1200" dirty="0" err="1" smtClean="0">
+                <a:latin typeface="Andale Mono"/>
+                <a:cs typeface="Andale Mono"/>
+              </a:rPr>
+              <a:t>config</a:t>
+            </a:r>
+            <a:r>
+              <a:rPr lang="en-US" sz="1200" dirty="0" smtClean="0">
+                <a:latin typeface="Andale Mono"/>
+                <a:cs typeface="Andale Mono"/>
+              </a:rPr>
+              <a:t> prefix... invalid</a:t>
+            </a:r>
+          </a:p>
+          <a:p>
+            <a:r>
+              <a:rPr lang="en-US" sz="1200" b="1" dirty="0" smtClean="0">
+                <a:latin typeface="Andale Mono"/>
+                <a:cs typeface="Andale Mono"/>
+              </a:rPr>
+              <a:t>configure: error: Could find neither SAGA source tree nor installation.</a:t>
+            </a:r>
+          </a:p>
+        </p:txBody>
+      </p:sp>
+      <p:sp>
+        <p:nvSpPr>
+          <p:cNvPr id="5" name="TextBox 4"/>
+          <p:cNvSpPr txBox="1"/>
+          <p:nvPr/>
+        </p:nvSpPr>
+        <p:spPr>
+          <a:xfrm>
+            <a:off x="1481601" y="2628900"/>
+            <a:ext cx="6913099" cy="830997"/>
+          </a:xfrm>
+          <a:prstGeom prst="rect">
+            <a:avLst/>
+          </a:prstGeom>
+          <a:solidFill>
+            <a:srgbClr val="D7D9CD"/>
+          </a:solidFill>
+          <a:ln>
+            <a:solidFill>
+              <a:srgbClr val="8BADBD"/>
+            </a:solidFill>
+          </a:ln>
+        </p:spPr>
+        <p:style>
+          <a:lnRef idx="2">
+            <a:schemeClr val="accent4"/>
+          </a:lnRef>
+          <a:fillRef idx="1">
+            <a:schemeClr val="lt1"/>
+          </a:fillRef>
+          <a:effectRef idx="0">
+            <a:schemeClr val="accent4"/>
+          </a:effectRef>
+          <a:fontRef idx="minor">
+            <a:schemeClr val="dk1"/>
+          </a:fontRef>
+        </p:style>
+        <p:txBody>
+          <a:bodyPr wrap="square" rtlCol="0">
+            <a:spAutoFit/>
+          </a:bodyPr>
+          <a:lstStyle/>
+          <a:p>
+            <a:r>
+              <a:rPr lang="en-US" sz="1200" dirty="0" smtClean="0">
+                <a:latin typeface="Andale Mono"/>
+                <a:cs typeface="Andale Mono"/>
+              </a:rPr>
+              <a:t>$&gt; ./configure</a:t>
+            </a:r>
+          </a:p>
+          <a:p>
+            <a:r>
+              <a:rPr lang="en-US" sz="1200" dirty="0" smtClean="0">
                 <a:solidFill>
-                  <a:srgbClr val="595959"/>
+                  <a:schemeClr val="bg1">
+                    <a:lumMod val="50000"/>
+                  </a:schemeClr>
                 </a:solidFill>
+                <a:latin typeface="Andale Mono"/>
+                <a:cs typeface="Andale Mono"/>
               </a:rPr>
-              <a:t>http://</a:t>
-            </a:r>
-            <a:r>
-              <a:rPr lang="en-US" b="1" dirty="0" err="1" smtClean="0">
-                <a:solidFill>
-                  <a:srgbClr val="595959"/>
-                </a:solidFill>
+              <a:t>...</a:t>
+            </a:r>
+          </a:p>
+          <a:p>
+            <a:r>
+              <a:rPr lang="en-US" sz="1200" dirty="0" smtClean="0">
+                <a:latin typeface="Andale Mono"/>
+                <a:cs typeface="Andale Mono"/>
               </a:rPr>
-              <a:t>faust.cct.lsu.edu/trac/mephisto</a:t>
-            </a:r>
-            <a:endParaRPr lang="en-US" b="1" dirty="0">
-              <a:solidFill>
-                <a:srgbClr val="595959"/>
-              </a:solidFill>
-            </a:endParaRPr>
+              <a:t>checking for Boost headers version &gt;= 1.33... no</a:t>
+            </a:r>
+          </a:p>
+          <a:p>
+            <a:r>
+              <a:rPr lang="en-US" sz="1200" b="1" dirty="0" smtClean="0">
+                <a:latin typeface="Andale Mono"/>
+                <a:cs typeface="Andale Mono"/>
+              </a:rPr>
+              <a:t>configure: error: Could not find Boost headers version &gt;= 1.33</a:t>
+            </a:r>
           </a:p>
         </p:txBody>
       </p:sp>
@@ -8782,13 +7824,6 @@
   <p:clrMapOvr>
     <a:masterClrMapping/>
   </p:clrMapOvr>
-  <p:timing>
-    <p:tnLst>
-      <p:par>
-        <p:cTn id="1" dur="indefinite" restart="never" nodeType="tmRoot"/>
-      </p:par>
-    </p:tnLst>
-  </p:timing>
 </p:sld>
 </file>
 
@@ -8826,7 +7861,7 @@
           <a:p>
             <a:r>
               <a:rPr lang="en-US" dirty="0" smtClean="0"/>
-              <a:t>Installation</a:t>
+              <a:t>SAGA’s Build System (cont.)</a:t>
             </a:r>
             <a:endParaRPr lang="en-US" dirty="0"/>
           </a:p>
@@ -8850,118 +7885,86 @@
           <a:lstStyle/>
           <a:p>
             <a:r>
-              <a:rPr lang="en-US" dirty="0" smtClean="0"/>
-              <a:t>SAGA consists of several components that can be installed on demand and separately:</a:t>
-            </a:r>
-          </a:p>
-          <a:p>
-            <a:pPr lvl="1"/>
-            <a:r>
-              <a:rPr lang="en-US" b="1" i="1" dirty="0" smtClean="0"/>
-              <a:t>Core Components </a:t>
-            </a:r>
-            <a:r>
-              <a:rPr lang="en-US" dirty="0" smtClean="0"/>
-              <a:t>(required)</a:t>
-            </a:r>
-            <a:endParaRPr lang="en-US" b="1" i="1" dirty="0" smtClean="0"/>
-          </a:p>
-          <a:p>
-            <a:pPr lvl="2"/>
-            <a:r>
-              <a:rPr lang="en-US" dirty="0" smtClean="0"/>
-              <a:t>Also contains the default adaptors (local files, local jobs </a:t>
+              <a:rPr lang="en-US" b="1" dirty="0" smtClean="0"/>
+              <a:t>SAGA_LOCATION </a:t>
+            </a:r>
+            <a:r>
+              <a:rPr lang="en-US" dirty="0" smtClean="0"/>
+              <a:t>must point to your saga installation directory </a:t>
+            </a:r>
+          </a:p>
+          <a:p>
+            <a:r>
+              <a:rPr lang="en-US" dirty="0"/>
+              <a:t>D</a:t>
+            </a:r>
+            <a:r>
+              <a:rPr lang="en-US" dirty="0" smtClean="0"/>
+              <a:t>ifferent Adaptors may have different configure options</a:t>
+            </a:r>
+            <a:r>
+              <a:rPr lang="en-US" b="1" dirty="0" smtClean="0"/>
+              <a:t>. ./configure --help </a:t>
+            </a:r>
+            <a:r>
+              <a:rPr lang="en-US" dirty="0" smtClean="0"/>
+              <a:t>is your friend </a:t>
+            </a:r>
+          </a:p>
+          <a:p>
+            <a:r>
+              <a:rPr lang="en-US" dirty="0" smtClean="0"/>
+              <a:t>Each component comes with a file called: </a:t>
             </a:r>
             <a:br>
               <a:rPr lang="en-US" dirty="0" smtClean="0"/>
             </a:br>
             <a:r>
               <a:rPr lang="en-US" dirty="0" smtClean="0"/>
-              <a:t>and SQL-based advert and replica adaptors) </a:t>
-            </a:r>
-          </a:p>
-          <a:p>
-            <a:pPr lvl="1"/>
-            <a:r>
-              <a:rPr lang="en-US" b="1" i="1" dirty="0" smtClean="0"/>
-              <a:t>Python Language Bindings </a:t>
-            </a:r>
-            <a:r>
-              <a:rPr lang="en-US" dirty="0" smtClean="0"/>
-              <a:t>(optional)</a:t>
-            </a:r>
-          </a:p>
-          <a:p>
-            <a:pPr lvl="1"/>
-            <a:r>
-              <a:rPr lang="en-US" b="1" i="1" dirty="0" smtClean="0"/>
-              <a:t>Adaptors </a:t>
-            </a:r>
-            <a:r>
-              <a:rPr lang="en-US" dirty="0" smtClean="0"/>
-              <a:t>(optional)</a:t>
-            </a:r>
-            <a:endParaRPr lang="en-US" b="1" i="1" dirty="0" smtClean="0"/>
-          </a:p>
-          <a:p>
-            <a:pPr lvl="2"/>
-            <a:r>
-              <a:rPr lang="en-US" dirty="0" err="1" smtClean="0"/>
-              <a:t>Globus</a:t>
-            </a:r>
-            <a:r>
-              <a:rPr lang="en-US" dirty="0" smtClean="0"/>
-              <a:t>, LSF, </a:t>
-            </a:r>
-            <a:r>
-              <a:rPr lang="en-US" dirty="0" err="1" smtClean="0"/>
-              <a:t>gLite</a:t>
-            </a:r>
-            <a:r>
-              <a:rPr lang="en-US" dirty="0" smtClean="0"/>
-              <a:t>, SSH, Cloud, …</a:t>
-            </a:r>
-          </a:p>
-          <a:p>
-            <a:r>
-              <a:rPr lang="en-US" dirty="0" smtClean="0"/>
-              <a:t>The latest versions of all components can be downloaded from the SAGA website: </a:t>
-            </a:r>
-            <a:r>
-              <a:rPr lang="en-US" dirty="0" smtClean="0">
-                <a:hlinkClick r:id="rId2"/>
-              </a:rPr>
-              <a:t>http://saga.cct.lsu.edu/</a:t>
-            </a:r>
-            <a:endParaRPr lang="en-US" dirty="0" smtClean="0"/>
-          </a:p>
-          <a:p>
-            <a:r>
-              <a:rPr lang="en-US" dirty="0" smtClean="0"/>
-              <a:t>SVN: </a:t>
-            </a:r>
-            <a:r>
-              <a:rPr lang="en-US" dirty="0" smtClean="0">
-                <a:hlinkClick r:id="rId3"/>
-              </a:rPr>
-              <a:t>https://svn.cct.lsu.edu/repos/saga/</a:t>
-            </a:r>
-            <a:endParaRPr lang="en-US" dirty="0" smtClean="0"/>
+              <a:t/>
+            </a:r>
+            <a:br>
+              <a:rPr lang="en-US" dirty="0" smtClean="0"/>
+            </a:br>
+            <a:r>
+              <a:rPr lang="en-US" sz="4800" b="1" dirty="0" smtClean="0"/>
+              <a:t>INSTALL</a:t>
+            </a:r>
+            <a:r>
+              <a:rPr lang="en-US" sz="4800" dirty="0" smtClean="0"/>
+              <a:t/>
+            </a:r>
+            <a:br>
+              <a:rPr lang="en-US" sz="4800" dirty="0" smtClean="0"/>
+            </a:br>
+            <a:r>
+              <a:rPr lang="en-US" dirty="0" smtClean="0"/>
+              <a:t> </a:t>
+            </a:r>
+            <a:r>
+              <a:rPr lang="en-US" sz="4800" dirty="0" smtClean="0"/>
+              <a:t/>
+            </a:r>
+            <a:br>
+              <a:rPr lang="en-US" sz="4800" dirty="0" smtClean="0"/>
+            </a:br>
+            <a:r>
+              <a:rPr lang="en-US" sz="2200" dirty="0" smtClean="0"/>
+              <a:t>Read it! </a:t>
+            </a:r>
           </a:p>
         </p:txBody>
       </p:sp>
     </p:spTree>
+    <p:extLst>
+      <p:ext uri="{BB962C8B-B14F-4D97-AF65-F5344CB8AC3E}">
+        <p14:creationId xmlns="" xmlns:a="http://schemas.openxmlformats.org/drawingml/2006/main" xmlns:r="http://schemas.openxmlformats.org/officeDocument/2006/relationships" xmlns:p="http://schemas.openxmlformats.org/presentationml/2006/main" xmlns:p14="http://schemas.microsoft.com/office/powerpoint/2010/main" xmlns:mv="urn:schemas-microsoft-com:mac:vml" xmlns:mc="http://schemas.openxmlformats.org/markup-compatibility/2006" val="1068611830"/>
+      </p:ext>
+    </p:extLst>
   </p:cSld>
   <p:clrMapOvr>
     <a:masterClrMapping/>
   </p:clrMapOvr>
-  <p:timing>
-    <p:tnLst>
-      <p:par>
-        <p:cTn id="1" dur="indefinite" restart="never" nodeType="tmRoot"/>
-      </p:par>
-    </p:tnLst>
-  </p:timing>
 </p:sld>
 </file>
 
@@ -8999,7 +8002,7 @@
           <a:p>
             <a:r>
               <a:rPr lang="en-US" dirty="0" smtClean="0"/>
-              <a:t>Latest Available Components / Adaptors</a:t>
+              <a:t>Mephisto: SAGA Bootstrapping</a:t>
             </a:r>
             <a:endParaRPr lang="en-US" dirty="0"/>
           </a:p>
@@ -9017,372 +8020,65 @@
         </p:nvSpPr>
         <p:spPr/>
         <p:txBody>
-          <a:bodyPr>
-            <a:normAutofit/>
-          </a:bodyPr>
+          <a:bodyPr/>
           <a:lstStyle/>
           <a:p>
             <a:r>
               <a:rPr lang="en-US" dirty="0" smtClean="0"/>
-              <a:t>TODO</a:t>
-            </a:r>
-          </a:p>
-        </p:txBody>
-      </p:sp>
-      <p:sp>
-        <p:nvSpPr>
-          <p:cNvPr id="4" name="Rectangle 3"/>
-          <p:cNvSpPr/>
-          <p:nvPr/>
-        </p:nvSpPr>
-        <p:spPr>
-          <a:xfrm>
-            <a:off x="236799" y="1817641"/>
-            <a:ext cx="8677014" cy="5632312"/>
-          </a:xfrm>
-          <a:prstGeom prst="rect">
-            <a:avLst/>
-          </a:prstGeom>
-        </p:spPr>
-        <p:txBody>
-          <a:bodyPr wrap="square">
-            <a:spAutoFit/>
-          </a:bodyPr>
-          <a:lstStyle/>
-          <a:p>
+              <a:t>SAGA’s build system is standard for a *NIX library… </a:t>
+            </a:r>
             <a:r>
               <a:rPr lang="en-US" b="1" dirty="0" smtClean="0"/>
-              <a:t>Adaptor Name	SAGA Package	Requirements	</a:t>
-            </a:r>
-          </a:p>
-          <a:p>
-            <a:r>
-              <a:rPr lang="en-US" dirty="0" smtClean="0"/>
-              <a:t>AWS/EC2	</a:t>
-            </a:r>
-            <a:r>
-              <a:rPr lang="en-US" dirty="0" err="1" smtClean="0"/>
-              <a:t>saga::job</a:t>
-            </a:r>
-            <a:r>
-              <a:rPr lang="en-US" dirty="0" smtClean="0"/>
-              <a:t>	Amazon EC2 API tools	</a:t>
-            </a:r>
-          </a:p>
-          <a:p>
-            <a:r>
-              <a:rPr lang="en-US" dirty="0" smtClean="0"/>
-              <a:t>Condor	</a:t>
-            </a:r>
-            <a:r>
-              <a:rPr lang="en-US" dirty="0" err="1" smtClean="0"/>
-              <a:t>saga::job</a:t>
-            </a:r>
-            <a:r>
-              <a:rPr lang="en-US" dirty="0" smtClean="0"/>
-              <a:t>	Condor cmd. line tools	</a:t>
-            </a:r>
-          </a:p>
-          <a:p>
-            <a:r>
-              <a:rPr lang="en-US" dirty="0" smtClean="0"/>
-              <a:t>Local (Fork) Exec	</a:t>
-            </a:r>
-            <a:r>
-              <a:rPr lang="en-US" dirty="0" err="1" smtClean="0"/>
-              <a:t>saga::job</a:t>
-            </a:r>
-            <a:r>
-              <a:rPr lang="en-US" dirty="0" smtClean="0"/>
-              <a:t>	-	</a:t>
-            </a:r>
-          </a:p>
-          <a:p>
-            <a:r>
-              <a:rPr lang="en-US" dirty="0" smtClean="0"/>
-              <a:t>Local Files	</a:t>
-            </a:r>
-            <a:r>
-              <a:rPr lang="en-US" dirty="0" err="1" smtClean="0"/>
-              <a:t>saga::file</a:t>
-            </a:r>
-            <a:r>
-              <a:rPr lang="en-US" dirty="0" smtClean="0"/>
-              <a:t>	-	</a:t>
-            </a:r>
-          </a:p>
-          <a:p>
+              <a:t>BUT</a:t>
+            </a:r>
+            <a:r>
+              <a:rPr lang="en-US" dirty="0" smtClean="0"/>
+              <a:t>:</a:t>
+            </a:r>
+          </a:p>
+          <a:p>
+            <a:r>
+              <a:rPr lang="en-US" dirty="0" smtClean="0"/>
+              <a:t>Installing SAGA on a machine that doesn’t  meet any of the prerequisites can be a tedious and lengthy process:</a:t>
+            </a:r>
+          </a:p>
+          <a:p>
+            <a:pPr lvl="1"/>
+            <a:r>
+              <a:rPr lang="en-US" dirty="0" smtClean="0"/>
+              <a:t>E.g. downloading and installing the Boost C++ Libraries, </a:t>
+            </a:r>
             <a:r>
               <a:rPr lang="en-US" dirty="0" err="1" smtClean="0"/>
               <a:t>PostgreSQL</a:t>
             </a:r>
             <a:r>
               <a:rPr lang="en-US" dirty="0" smtClean="0"/>
-              <a:t> 	</a:t>
-            </a:r>
-            <a:r>
-              <a:rPr lang="en-US" dirty="0" err="1" smtClean="0"/>
-              <a:t>saga::advert</a:t>
-            </a:r>
-            <a:r>
-              <a:rPr lang="en-US" dirty="0" smtClean="0"/>
-              <a:t>	</a:t>
-            </a:r>
-            <a:r>
-              <a:rPr lang="en-US" dirty="0" err="1" smtClean="0"/>
-              <a:t>postgresql</a:t>
-            </a:r>
-            <a:r>
-              <a:rPr lang="en-US" dirty="0" smtClean="0"/>
-              <a:t> client libraries	</a:t>
-            </a:r>
-          </a:p>
-          <a:p>
-            <a:r>
-              <a:rPr lang="en-US" dirty="0" err="1" smtClean="0"/>
-              <a:t>PostgreSQL</a:t>
-            </a:r>
-            <a:r>
-              <a:rPr lang="en-US" dirty="0" smtClean="0"/>
-              <a:t> 	</a:t>
-            </a:r>
-            <a:r>
-              <a:rPr lang="en-US" dirty="0" err="1" smtClean="0"/>
-              <a:t>saga::replica</a:t>
-            </a:r>
-            <a:r>
-              <a:rPr lang="en-US" dirty="0" smtClean="0"/>
-              <a:t>	</a:t>
-            </a:r>
-            <a:r>
-              <a:rPr lang="en-US" dirty="0" err="1" smtClean="0"/>
-              <a:t>postgresql</a:t>
-            </a:r>
-            <a:r>
-              <a:rPr lang="en-US" dirty="0" smtClean="0"/>
-              <a:t> client libraries	</a:t>
-            </a:r>
-          </a:p>
-          <a:p>
-            <a:r>
-              <a:rPr lang="en-US" dirty="0" smtClean="0"/>
-              <a:t>SQLite3	</a:t>
-            </a:r>
-            <a:r>
-              <a:rPr lang="en-US" dirty="0" err="1" smtClean="0"/>
-              <a:t>saga::advert</a:t>
-            </a:r>
-            <a:r>
-              <a:rPr lang="en-US" dirty="0" smtClean="0"/>
-              <a:t>	sqlite3 client libraries	</a:t>
-            </a:r>
-          </a:p>
-          <a:p>
-            <a:r>
-              <a:rPr lang="en-US" dirty="0" smtClean="0"/>
-              <a:t>SQLite3 	</a:t>
-            </a:r>
-            <a:r>
-              <a:rPr lang="en-US" dirty="0" err="1" smtClean="0"/>
-              <a:t>saga::replica</a:t>
-            </a:r>
-            <a:r>
-              <a:rPr lang="en-US" dirty="0" smtClean="0"/>
-              <a:t>	sqlite3 client libraries	</a:t>
-            </a:r>
-          </a:p>
-          <a:p>
-            <a:r>
-              <a:rPr lang="en-US" dirty="0" err="1" smtClean="0"/>
-              <a:t>gLite</a:t>
-            </a:r>
-            <a:r>
-              <a:rPr lang="en-US" dirty="0" smtClean="0"/>
-              <a:t> Cream	</a:t>
-            </a:r>
-            <a:r>
-              <a:rPr lang="en-US" dirty="0" err="1" smtClean="0"/>
-              <a:t>saga::job</a:t>
-            </a:r>
-            <a:r>
-              <a:rPr lang="en-US" dirty="0" smtClean="0"/>
-              <a:t>	</a:t>
-            </a:r>
-            <a:r>
-              <a:rPr lang="en-US" dirty="0" err="1" smtClean="0"/>
-              <a:t>gLite</a:t>
-            </a:r>
-            <a:r>
-              <a:rPr lang="en-US" dirty="0" smtClean="0"/>
-              <a:t> Cream client-side libraries	</a:t>
-            </a:r>
-          </a:p>
-          <a:p>
+              <a:t>, Python, FUSE, </a:t>
+            </a:r>
             <a:r>
               <a:rPr lang="en-US" dirty="0" err="1" smtClean="0"/>
               <a:t>Globus</a:t>
             </a:r>
             <a:r>
               <a:rPr lang="en-US" dirty="0" smtClean="0"/>
-              <a:t> GRAM2 / GRAM5	</a:t>
+              <a:t> Toolkit client </a:t>
             </a:r>
             <a:r>
               <a:rPr lang="en-US" dirty="0" err="1" smtClean="0"/>
-              <a:t>saga::job</a:t>
-            </a:r>
-            <a:r>
-              <a:rPr lang="en-US" dirty="0" smtClean="0"/>
-              <a:t>	</a:t>
+              <a:t>libs</a:t>
+            </a:r>
+            <a:r>
+              <a:rPr lang="en-US" dirty="0" smtClean="0"/>
+              <a:t>, saga-core, saga-bindings-python, saga-adaptors-x509, saga-adaptors-</a:t>
             </a:r>
             <a:r>
               <a:rPr lang="en-US" dirty="0" err="1" smtClean="0"/>
-              <a:t>Globus</a:t>
-            </a:r>
-            <a:r>
-              <a:rPr lang="en-US" dirty="0" smtClean="0"/>
-              <a:t> Toolkit &gt;= 4.x	</a:t>
-            </a:r>
-          </a:p>
-          <a:p>
-            <a:r>
-              <a:rPr lang="en-US" dirty="0" err="1" smtClean="0"/>
-              <a:t>Globus</a:t>
-            </a:r>
-            <a:r>
-              <a:rPr lang="en-US" dirty="0" smtClean="0"/>
-              <a:t> </a:t>
-            </a:r>
-            <a:r>
-              <a:rPr lang="en-US" dirty="0" err="1" smtClean="0"/>
-              <a:t>GridFTP</a:t>
-            </a:r>
-            <a:r>
-              <a:rPr lang="en-US" dirty="0" smtClean="0"/>
-              <a:t>	</a:t>
-            </a:r>
-            <a:r>
-              <a:rPr lang="en-US" dirty="0" err="1" smtClean="0"/>
-              <a:t>saga::file</a:t>
-            </a:r>
-            <a:r>
-              <a:rPr lang="en-US" dirty="0" smtClean="0"/>
-              <a:t>	</a:t>
-            </a:r>
-            <a:r>
-              <a:rPr lang="en-US" dirty="0" err="1" smtClean="0"/>
-              <a:t>Globus</a:t>
-            </a:r>
-            <a:r>
-              <a:rPr lang="en-US" dirty="0" smtClean="0"/>
-              <a:t> Toolkit &gt;= 4.x	</a:t>
-            </a:r>
-          </a:p>
-          <a:p>
-            <a:r>
-              <a:rPr lang="en-US" dirty="0" err="1" smtClean="0"/>
-              <a:t>Globus</a:t>
-            </a:r>
-            <a:r>
-              <a:rPr lang="en-US" dirty="0" smtClean="0"/>
-              <a:t> RLS	</a:t>
-            </a:r>
-            <a:r>
-              <a:rPr lang="en-US" dirty="0" err="1" smtClean="0"/>
-              <a:t>saga::replica</a:t>
-            </a:r>
-            <a:r>
-              <a:rPr lang="en-US" dirty="0" smtClean="0"/>
-              <a:t>	</a:t>
-            </a:r>
-            <a:r>
-              <a:rPr lang="en-US" dirty="0" err="1" smtClean="0"/>
-              <a:t>Globus</a:t>
-            </a:r>
-            <a:r>
-              <a:rPr lang="en-US" dirty="0" smtClean="0"/>
-              <a:t> Toolkit &gt;= 4.x	</a:t>
-            </a:r>
-          </a:p>
-          <a:p>
-            <a:r>
-              <a:rPr lang="en-US" dirty="0" err="1" smtClean="0"/>
-              <a:t>GridSAM</a:t>
-            </a:r>
-            <a:r>
-              <a:rPr lang="en-US" dirty="0" smtClean="0"/>
-              <a:t>	</a:t>
-            </a:r>
-            <a:r>
-              <a:rPr lang="en-US" dirty="0" err="1" smtClean="0"/>
-              <a:t>saga::job</a:t>
-            </a:r>
-            <a:r>
-              <a:rPr lang="en-US" dirty="0" smtClean="0"/>
-              <a:t>	</a:t>
-            </a:r>
-            <a:r>
-              <a:rPr lang="en-US" dirty="0" err="1" smtClean="0"/>
-              <a:t>OpenSSL</a:t>
-            </a:r>
-            <a:r>
-              <a:rPr lang="en-US" dirty="0" smtClean="0"/>
-              <a:t>	</a:t>
-            </a:r>
-          </a:p>
-          <a:p>
-            <a:r>
-              <a:rPr lang="en-US" dirty="0" smtClean="0"/>
-              <a:t>Platform LSF	</a:t>
-            </a:r>
-            <a:r>
-              <a:rPr lang="en-US" dirty="0" err="1" smtClean="0"/>
-              <a:t>saga::job</a:t>
-            </a:r>
-            <a:r>
-              <a:rPr lang="en-US" dirty="0" smtClean="0"/>
-              <a:t>	LSF cmd. line tools	</a:t>
-            </a:r>
-          </a:p>
-          <a:p>
-            <a:r>
-              <a:rPr lang="en-US" dirty="0" smtClean="0"/>
-              <a:t>NAREGI	</a:t>
-            </a:r>
-            <a:r>
-              <a:rPr lang="en-US" dirty="0" err="1" smtClean="0"/>
-              <a:t>saga::job</a:t>
-            </a:r>
-            <a:r>
-              <a:rPr lang="en-US" dirty="0" smtClean="0"/>
-              <a:t>	NAREGI cmd. line tools	</a:t>
-            </a:r>
-          </a:p>
-          <a:p>
-            <a:r>
-              <a:rPr lang="en-US" dirty="0" smtClean="0"/>
-              <a:t>PBS Pro	</a:t>
-            </a:r>
-            <a:r>
-              <a:rPr lang="en-US" dirty="0" err="1" smtClean="0"/>
-              <a:t>saga::job</a:t>
-            </a:r>
-            <a:r>
-              <a:rPr lang="en-US" dirty="0" smtClean="0"/>
-              <a:t>	PBS cmd. line tools	</a:t>
-            </a:r>
-          </a:p>
-          <a:p>
-            <a:r>
-              <a:rPr lang="en-US" dirty="0" smtClean="0"/>
-              <a:t>SSH 	</a:t>
-            </a:r>
-            <a:r>
-              <a:rPr lang="en-US" dirty="0" err="1" smtClean="0"/>
-              <a:t>saga::job</a:t>
-            </a:r>
-            <a:r>
-              <a:rPr lang="en-US" dirty="0" smtClean="0"/>
-              <a:t>	</a:t>
+              <a:t>globus</a:t>
+            </a:r>
+            <a:r>
+              <a:rPr lang="en-US" dirty="0" smtClean="0"/>
+              <a:t>, saga-adaptors-</a:t>
             </a:r>
             <a:r>
               <a:rPr lang="en-US" dirty="0" err="1" smtClean="0"/>
@@ -9390,51 +8086,43 @@
             </a:r>
             <a:r>
               <a:rPr lang="en-US" dirty="0" smtClean="0"/>
-              <a:t> </a:t>
-            </a:r>
-            <a:r>
-              <a:rPr lang="en-US" dirty="0" err="1" smtClean="0"/>
-              <a:t>libs</a:t>
-            </a:r>
-            <a:r>
-              <a:rPr lang="en-US" dirty="0" smtClean="0"/>
-              <a:t>	</a:t>
-            </a:r>
-          </a:p>
-          <a:p>
-            <a:r>
-              <a:rPr lang="en-US" dirty="0" smtClean="0"/>
-              <a:t>SCP	</a:t>
-            </a:r>
-            <a:r>
-              <a:rPr lang="en-US" dirty="0" err="1" smtClean="0"/>
-              <a:t>saga::file</a:t>
-            </a:r>
-            <a:r>
-              <a:rPr lang="en-US" dirty="0" smtClean="0"/>
-              <a:t>	fuse </a:t>
-            </a:r>
-            <a:r>
-              <a:rPr lang="en-US" dirty="0" err="1" smtClean="0"/>
-              <a:t>libs</a:t>
-            </a:r>
-            <a:r>
-              <a:rPr lang="en-US" dirty="0" smtClean="0"/>
-              <a:t>	</a:t>
-            </a:r>
-          </a:p>
-          <a:p>
-            <a:r>
-              <a:rPr lang="en-US" dirty="0" smtClean="0"/>
-              <a:t>Torque	</a:t>
-            </a:r>
-            <a:r>
-              <a:rPr lang="en-US" dirty="0" err="1" smtClean="0"/>
-              <a:t>saga::job</a:t>
-            </a:r>
-            <a:r>
-              <a:rPr lang="en-US" dirty="0" smtClean="0"/>
-              <a:t>	torque cmd. line tools	</a:t>
+              <a:t> … will take </a:t>
+            </a:r>
+            <a:r>
+              <a:rPr lang="en-US" b="1" dirty="0" smtClean="0"/>
+              <a:t>forever</a:t>
+            </a:r>
+            <a:r>
+              <a:rPr lang="en-US" dirty="0" smtClean="0"/>
+              <a:t>.</a:t>
+            </a:r>
+          </a:p>
+          <a:p>
+            <a:pPr lvl="1"/>
+            <a:r>
+              <a:rPr lang="en-US" dirty="0" smtClean="0"/>
+              <a:t>Knowledge of certain configuration options that are relevant to saga (e.g. Python’s --enable-shared option)</a:t>
+            </a:r>
+          </a:p>
+          <a:p>
+            <a:pPr lvl="1"/>
+            <a:r>
+              <a:rPr lang="en-US" dirty="0" smtClean="0"/>
+              <a:t>Requires constant attention and interaction</a:t>
+            </a:r>
+          </a:p>
+          <a:p>
+            <a:r>
+              <a:rPr lang="en-US" dirty="0" smtClean="0"/>
+              <a:t>Luckily, </a:t>
+            </a:r>
+            <a:r>
+              <a:rPr lang="en-US" i="1" dirty="0" smtClean="0"/>
+              <a:t>There’s an App for That! </a:t>
+            </a:r>
+            <a:r>
+              <a:rPr lang="en-US" dirty="0" smtClean="0"/>
+              <a:t>™ </a:t>
             </a:r>
           </a:p>
         </p:txBody>

</xml_diff>

<commit_message>
Minor minor change ("C" --> "c")
git-svn-id: file://localhost/tmp/svn2git/svn@3262 defb5e50-622e-49ec-a68e-d72c7db87b45
</commit_message>
<xml_diff>
--- a/tutorial/general_tutorial/Installation.pptx
+++ b/tutorial/general_tutorial/Installation.pptx
@@ -285,7 +285,7 @@
     </p:spTree>
     <p:extLst>
       <p:ext uri="{BB962C8B-B14F-4D97-AF65-F5344CB8AC3E}">
-        <p14:creationId xmlns="" xmlns:a="http://schemas.openxmlformats.org/drawingml/2006/main" xmlns:r="http://schemas.openxmlformats.org/officeDocument/2006/relationships" xmlns:p="http://schemas.openxmlformats.org/presentationml/2006/main" xmlns:p14="http://schemas.microsoft.com/office/powerpoint/2010/main" xmlns:mv="urn:schemas-microsoft-com:mac:vml" xmlns:mc="http://schemas.openxmlformats.org/markup-compatibility/2006" val="4188242058"/>
+        <p14:creationId xmlns:mc="http://schemas.openxmlformats.org/markup-compatibility/2006" xmlns:mv="urn:schemas-microsoft-com:mac:vml" xmlns:p14="http://schemas.microsoft.com/office/powerpoint/2010/main" xmlns:p="http://schemas.openxmlformats.org/presentationml/2006/main" xmlns:r="http://schemas.openxmlformats.org/officeDocument/2006/relationships" xmlns:a="http://schemas.openxmlformats.org/drawingml/2006/main" xmlns="" val="4188242058"/>
       </p:ext>
     </p:extLst>
   </p:cSld>
@@ -548,7 +548,7 @@
     </p:spTree>
     <p:extLst>
       <p:ext uri="{BB962C8B-B14F-4D97-AF65-F5344CB8AC3E}">
-        <p14:creationId xmlns="" xmlns:a="http://schemas.openxmlformats.org/drawingml/2006/main" xmlns:r="http://schemas.openxmlformats.org/officeDocument/2006/relationships" xmlns:p="http://schemas.openxmlformats.org/presentationml/2006/main" xmlns:p14="http://schemas.microsoft.com/office/powerpoint/2010/main" xmlns:mv="urn:schemas-microsoft-com:mac:vml" xmlns:mc="http://schemas.openxmlformats.org/markup-compatibility/2006" val="2951771260"/>
+        <p14:creationId xmlns:mc="http://schemas.openxmlformats.org/markup-compatibility/2006" xmlns:mv="urn:schemas-microsoft-com:mac:vml" xmlns:p14="http://schemas.microsoft.com/office/powerpoint/2010/main" xmlns:p="http://schemas.openxmlformats.org/presentationml/2006/main" xmlns:r="http://schemas.openxmlformats.org/officeDocument/2006/relationships" xmlns:a="http://schemas.openxmlformats.org/drawingml/2006/main" xmlns="" val="2951771260"/>
       </p:ext>
     </p:extLst>
   </p:cSld>
@@ -6012,7 +6012,15 @@
             <a:pPr lvl="1"/>
             <a:r>
               <a:rPr lang="en-US" dirty="0" smtClean="0"/>
-              <a:t>On Custom-tailored, system-space deployments</a:t>
+              <a:t>On</a:t>
+            </a:r>
+            <a:r>
+              <a:rPr lang="en-US" dirty="0" smtClean="0"/>
+              <a:t> custom</a:t>
+            </a:r>
+            <a:r>
+              <a:rPr lang="en-US" dirty="0" smtClean="0"/>
+              <a:t>-tailored, system-space deployments</a:t>
             </a:r>
           </a:p>
           <a:p>
@@ -6104,11 +6112,7 @@
             <a:pPr lvl="1"/>
             <a:r>
               <a:rPr lang="en-US" dirty="0" smtClean="0"/>
-              <a:t>Part of the Cyber-</a:t>
-            </a:r>
-            <a:r>
-              <a:rPr lang="en-US" dirty="0" smtClean="0"/>
-              <a:t>tools toolkit:</a:t>
+              <a:t>Part of the Cyber-tools toolkit:</a:t>
             </a:r>
             <a:br>
               <a:rPr lang="en-US" dirty="0" smtClean="0"/>
@@ -6117,13 +6121,7 @@
               <a:rPr lang="en-US" dirty="0" smtClean="0">
                 <a:hlinkClick r:id="rId2"/>
               </a:rPr>
-              <a:t>http://cybertools.loni.org</a:t>
-            </a:r>
-            <a:r>
-              <a:rPr lang="en-US" dirty="0" smtClean="0">
-                <a:hlinkClick r:id="rId2"/>
-              </a:rPr>
-              <a:t>/</a:t>
+              <a:t>http://cybertools.loni.org/</a:t>
             </a:r>
             <a:endParaRPr lang="en-US" dirty="0" smtClean="0"/>
           </a:p>
@@ -6160,11 +6158,7 @@
             <a:pPr lvl="1"/>
             <a:r>
               <a:rPr lang="en-US" dirty="0" smtClean="0"/>
-              <a:t>SAGA is part of TG’s distributed programming toolkit</a:t>
-            </a:r>
-            <a:r>
-              <a:rPr lang="en-US" dirty="0" smtClean="0"/>
-              <a:t>: </a:t>
+              <a:t>SAGA is part of TG’s distributed programming toolkit: </a:t>
             </a:r>
             <a:br>
               <a:rPr lang="en-US" dirty="0" smtClean="0"/>
@@ -6173,13 +6167,7 @@
               <a:rPr lang="en-US" dirty="0" smtClean="0">
                 <a:hlinkClick r:id="rId3"/>
               </a:rPr>
-              <a:t>http://bit.ly/</a:t>
-            </a:r>
-            <a:r>
-              <a:rPr lang="en-US" dirty="0" smtClean="0">
-                <a:hlinkClick r:id="rId3"/>
-              </a:rPr>
-              <a:t>ff9c5B</a:t>
+              <a:t>http://bit.ly/ff9c5B</a:t>
             </a:r>
             <a:endParaRPr lang="en-US" dirty="0" smtClean="0"/>
           </a:p>
@@ -6263,11 +6251,7 @@
           <a:p>
             <a:r>
               <a:rPr lang="en-US" dirty="0" smtClean="0"/>
-              <a:t>Deployment </a:t>
-            </a:r>
-            <a:r>
-              <a:rPr lang="en-US" dirty="0" smtClean="0"/>
-              <a:t>Status (cont.)</a:t>
+              <a:t>Deployment Status (cont.)</a:t>
             </a:r>
             <a:endParaRPr lang="en-US" dirty="0"/>
           </a:p>
@@ -6516,16 +6500,11 @@
               <a:rPr lang="en-US" dirty="0" smtClean="0"/>
               <a:t>Mephisto:  A SAGA bootstrapping tool</a:t>
             </a:r>
-            <a:endParaRPr lang="en-US" dirty="0" smtClean="0"/>
-          </a:p>
-          <a:p>
-            <a:r>
-              <a:rPr lang="en-US" dirty="0" smtClean="0"/>
-              <a:t>Ongoing cyber</a:t>
-            </a:r>
-            <a:r>
-              <a:rPr lang="en-US" dirty="0" smtClean="0"/>
-              <a:t>-infrastructure deployment</a:t>
+          </a:p>
+          <a:p>
+            <a:r>
+              <a:rPr lang="en-US" dirty="0" smtClean="0"/>
+              <a:t>Ongoing cyber-infrastructure deployment</a:t>
             </a:r>
           </a:p>
           <a:p>
@@ -7958,7 +7937,7 @@
     </p:spTree>
     <p:extLst>
       <p:ext uri="{BB962C8B-B14F-4D97-AF65-F5344CB8AC3E}">
-        <p14:creationId xmlns="" xmlns:a="http://schemas.openxmlformats.org/drawingml/2006/main" xmlns:r="http://schemas.openxmlformats.org/officeDocument/2006/relationships" xmlns:p="http://schemas.openxmlformats.org/presentationml/2006/main" xmlns:p14="http://schemas.microsoft.com/office/powerpoint/2010/main" xmlns:mv="urn:schemas-microsoft-com:mac:vml" xmlns:mc="http://schemas.openxmlformats.org/markup-compatibility/2006" val="1068611830"/>
+        <p14:creationId xmlns:mc="http://schemas.openxmlformats.org/markup-compatibility/2006" xmlns:mv="urn:schemas-microsoft-com:mac:vml" xmlns:p14="http://schemas.microsoft.com/office/powerpoint/2010/main" xmlns:p="http://schemas.openxmlformats.org/presentationml/2006/main" xmlns:r="http://schemas.openxmlformats.org/officeDocument/2006/relationships" xmlns:a="http://schemas.openxmlformats.org/drawingml/2006/main" xmlns="" val="1068611830"/>
       </p:ext>
     </p:extLst>
   </p:cSld>

</xml_diff>